<commit_message>
Added ppm reference coment
</commit_message>
<xml_diff>
--- a/protocol/Invisible-Flicker_aka_MEG-AHAT_project_PPM.pptx
+++ b/protocol/Invisible-Flicker_aka_MEG-AHAT_project_PPM.pptx
@@ -141,35 +141,26 @@
 
 <file path=ppt/comments/modernComment_10E_C5D15BFF.xml><?xml version="1.0" encoding="utf-8"?>
 <p188:cmLst xmlns:a="http://schemas.openxmlformats.org/drawingml/2006/main" xmlns:r="http://schemas.openxmlformats.org/officeDocument/2006/relationships" xmlns:p188="http://schemas.microsoft.com/office/powerpoint/2018/8/main">
-  <p188:cm id="{60C00449-EE9E-BD4C-B6EF-FACACEF2BDEA}" authorId="{4753B669-0155-FC55-31EB-2DD8AA4EAA47}" created="2023-11-14T08:21:49.730">
+  <p188:cm id="{B2983DAC-4712-C041-9D5F-EF2CF1B1114E}" authorId="{4753B669-0155-FC55-31EB-2DD8AA4EAA47}" created="2023-11-27T07:19:16.516">
     <ac:txMkLst xmlns:ac="http://schemas.microsoft.com/office/drawing/2013/main/command">
       <pc:docMk xmlns:pc="http://schemas.microsoft.com/office/powerpoint/2013/main/command"/>
       <pc:sldMk xmlns:pc="http://schemas.microsoft.com/office/powerpoint/2013/main/command" cId="3318832127" sldId="270"/>
       <ac:spMk id="5" creationId="{00000000-0000-0000-0000-000000000000}"/>
-      <ac:txMk cp="395" len="2">
+      <ac:txMk cp="104" len="125">
         <ac:context len="700" hash="4177526356"/>
       </ac:txMk>
     </ac:txMkLst>
-    <p188:pos x="7524153" y="1128178"/>
+    <p188:pos x="7151533" y="657359"/>
     <p188:txBody>
       <a:bodyPr/>
       <a:lstStyle/>
       <a:p>
         <a:r>
-          <a:rPr lang="en-US"/>
-          <a:t>compact</a:t>
+          <a:rPr lang="en-GB"/>
+          <a:t>Iaccarino 2016 and Addaikan 2019 both use only visual flicker</a:t>
         </a:r>
       </a:p>
     </p188:txBody>
-    <p188:extLst>
-      <p:ext xmlns:p="http://schemas.openxmlformats.org/presentationml/2006/main" uri="{57CB4572-C831-44C2-8A1C-0ADB6CCDFE69}">
-        <p223:reactions xmlns:p223="http://schemas.microsoft.com/office/powerpoint/2022/03/main">
-          <p223:rxn type="👍">
-            <p223:instance time="2023-11-14T13:19:43.652" authorId="{4753B669-0155-FC55-31EB-2DD8AA4EAA47}"/>
-          </p223:rxn>
-        </p223:reactions>
-      </p:ext>
-    </p188:extLst>
   </p188:cm>
 </p188:cmLst>
 </file>
@@ -256,7 +247,7 @@
           <a:p>
             <a:fld id="{24EB8EBF-EE54-5F4A-9A96-36AE8BE19C24}" type="datetimeFigureOut">
               <a:rPr lang="en-US" smtClean="0"/>
-              <a:t>11/22/23</a:t>
+              <a:t>11/27/23</a:t>
             </a:fld>
             <a:endParaRPr lang="en-US"/>
           </a:p>
@@ -5945,7 +5936,7 @@
             </a:r>
             <a:r>
               <a:rPr lang="en-GB" baseline="30000" dirty="0"/>
-              <a:t>1,2,3</a:t>
+              <a:t>1,2,4</a:t>
             </a:r>
             <a:endParaRPr lang="en-GB" dirty="0"/>
           </a:p>

</xml_diff>

<commit_message>
neutralised impact statement direactions
</commit_message>
<xml_diff>
--- a/protocol/Invisible-Flicker_aka_MEG-AHAT_project_PPM.pptx
+++ b/protocol/Invisible-Flicker_aka_MEG-AHAT_project_PPM.pptx
@@ -247,7 +247,7 @@
           <a:p>
             <a:fld id="{24EB8EBF-EE54-5F4A-9A96-36AE8BE19C24}" type="datetimeFigureOut">
               <a:rPr lang="en-US" smtClean="0"/>
-              <a:t>11/27/23</a:t>
+              <a:t>11/29/23</a:t>
             </a:fld>
             <a:endParaRPr lang="en-US"/>
           </a:p>
@@ -9363,7 +9363,7 @@
         <p:spPr>
           <a:xfrm>
             <a:off x="496111" y="1080000"/>
-            <a:ext cx="8453336" cy="4179606"/>
+            <a:ext cx="8453336" cy="3964162"/>
           </a:xfrm>
         </p:spPr>
         <p:txBody>
@@ -9447,7 +9447,7 @@
             </a:pPr>
             <a:r>
               <a:rPr lang="en-US" sz="1400" dirty="0"/>
-              <a:t>If we find that the 40 Hz response propagation from visible flicker is modulated by lateral visual attention to a higher degree than invisible flicker, it suggests that improved </a:t>
+              <a:t>If we find that the 40 Hz response propagation from visible flicker is modulated by lateral visual attention to a different degree than invisible flicker, it suggests that improved </a:t>
             </a:r>
             <a:r>
               <a:rPr lang="en-US" sz="1400" b="1" dirty="0"/>
@@ -9543,7 +9543,15 @@
             </a:pPr>
             <a:r>
               <a:rPr lang="en-US" sz="1400" dirty="0"/>
-              <a:t>If we find that the 40 Hz response propagation from visible flicker is modulated by cognitive load to a higher degree than invisible flicker, it suggests that improved </a:t>
+              <a:t>If we find that the 40 Hz response propagation from visible flicker is modulated by cognitive load to </a:t>
+            </a:r>
+            <a:r>
+              <a:rPr lang="en-US" sz="1400"/>
+              <a:t>a different </a:t>
+            </a:r>
+            <a:r>
+              <a:rPr lang="en-US" sz="1400" dirty="0"/>
+              <a:t>degree than invisible flicker, it suggests that improved </a:t>
             </a:r>
             <a:r>
               <a:rPr lang="en-US" sz="1400" b="1" dirty="0"/>

</xml_diff>

<commit_message>
DRAFT changes to ppm slides
</commit_message>
<xml_diff>
--- a/protocol/Invisible-Flicker_aka_MEG-AHAT_project_PPM.pptx
+++ b/protocol/Invisible-Flicker_aka_MEG-AHAT_project_PPM.pptx
@@ -5967,7 +5967,15 @@
           <a:p>
             <a:r>
               <a:rPr lang="en-GB" dirty="0"/>
-              <a:t>Robert Oostenveld</a:t>
+              <a:t>Robert </a:t>
+            </a:r>
+            <a:r>
+              <a:rPr lang="en-GB" dirty="0" err="1"/>
+              <a:t>Oostenveld</a:t>
+            </a:r>
+            <a:r>
+              <a:rPr lang="en-GB" dirty="0"/>
+              <a:t> (PI)</a:t>
             </a:r>
             <a:r>
               <a:rPr lang="en-GB" baseline="30000" dirty="0"/>
@@ -6973,7 +6981,7 @@
           <a:p>
             <a:r>
               <a:rPr lang="en-US" dirty="0"/>
-              <a:t>* We consider the three types of visual stimulation as somewhat </a:t>
+              <a:t>We consider the three types of visual stimulation as somewhat </a:t>
             </a:r>
             <a:r>
               <a:rPr lang="en-US" i="1" dirty="0"/>
@@ -7063,7 +7071,7 @@
               <a:buAutoNum type="arabicPeriod"/>
             </a:pPr>
             <a:r>
-              <a:rPr lang="en-GB" dirty="0"/>
+              <a:rPr lang="en-GB" strike="sngStrike" dirty="0"/>
               <a:t>Given the use of the visual pathway for stimulation; is the modulation effect based on the task being visual, or is it dependent on the difficulty?</a:t>
             </a:r>
           </a:p>
@@ -7073,11 +7081,17 @@
             </a:pPr>
             <a:r>
               <a:rPr lang="en-GB" dirty="0"/>
-              <a:t>How does 40 Hz invisible flicker affect task performance? Does task performance resemble the baseline condition (continuous light) or visible flicker more?*</a:t>
-            </a:r>
-          </a:p>
-          <a:p>
-            <a:endParaRPr lang="en-GB" dirty="0"/>
+              <a:t>Is the effect on propagation caused by the cognitive engagement or by a specifically visual task?</a:t>
+            </a:r>
+          </a:p>
+          <a:p>
+            <a:pPr marL="342900" indent="-342900">
+              <a:buAutoNum type="arabicPeriod"/>
+            </a:pPr>
+            <a:r>
+              <a:rPr lang="en-GB" dirty="0"/>
+              <a:t>How does 40 Hz flicker affect cognitive performance?</a:t>
+            </a:r>
           </a:p>
           <a:p>
             <a:pPr marL="342900" indent="-342900">
@@ -7200,15 +7214,33 @@
                                   </p:childTnLst>
                                 </p:cTn>
                               </p:par>
+                            </p:childTnLst>
+                          </p:cTn>
+                        </p:par>
+                      </p:childTnLst>
+                    </p:cTn>
+                  </p:par>
+                  <p:par>
+                    <p:cTn id="11" fill="hold">
+                      <p:stCondLst>
+                        <p:cond delay="indefinite"/>
+                      </p:stCondLst>
+                      <p:childTnLst>
+                        <p:par>
+                          <p:cTn id="12" fill="hold">
+                            <p:stCondLst>
+                              <p:cond delay="0"/>
+                            </p:stCondLst>
+                            <p:childTnLst>
                               <p:par>
-                                <p:cTn id="11" presetID="1" presetClass="entr" presetSubtype="0" fill="hold" grpId="0" nodeType="withEffect">
+                                <p:cTn id="13" presetID="1" presetClass="entr" presetSubtype="0" fill="hold" grpId="0" nodeType="clickEffect">
                                   <p:stCondLst>
                                     <p:cond delay="0"/>
                                   </p:stCondLst>
                                   <p:childTnLst>
                                     <p:set>
                                       <p:cBhvr>
-                                        <p:cTn id="12" dur="1" fill="hold">
+                                        <p:cTn id="14" dur="1" fill="hold">
                                           <p:stCondLst>
                                             <p:cond delay="0"/>
                                           </p:stCondLst>
@@ -7217,6 +7249,37 @@
                                           <p:spTgt spid="5">
                                             <p:txEl>
                                               <p:pRg st="2" end="2"/>
+                                            </p:txEl>
+                                          </p:spTgt>
+                                        </p:tgtEl>
+                                        <p:attrNameLst>
+                                          <p:attrName>style.visibility</p:attrName>
+                                        </p:attrNameLst>
+                                      </p:cBhvr>
+                                      <p:to>
+                                        <p:strVal val="visible"/>
+                                      </p:to>
+                                    </p:set>
+                                  </p:childTnLst>
+                                </p:cTn>
+                              </p:par>
+                              <p:par>
+                                <p:cTn id="15" presetID="1" presetClass="entr" presetSubtype="0" fill="hold" grpId="0" nodeType="withEffect">
+                                  <p:stCondLst>
+                                    <p:cond delay="0"/>
+                                  </p:stCondLst>
+                                  <p:childTnLst>
+                                    <p:set>
+                                      <p:cBhvr>
+                                        <p:cTn id="16" dur="1" fill="hold">
+                                          <p:stCondLst>
+                                            <p:cond delay="0"/>
+                                          </p:stCondLst>
+                                        </p:cTn>
+                                        <p:tgtEl>
+                                          <p:spTgt spid="5">
+                                            <p:txEl>
+                                              <p:pRg st="3" end="3"/>
                                             </p:txEl>
                                           </p:spTgt>
                                         </p:tgtEl>

</xml_diff>

<commit_message>
Added long title to slide
</commit_message>
<xml_diff>
--- a/protocol/Invisible-Flicker_aka_MEG-AHAT_project_PPM.pptx
+++ b/protocol/Invisible-Flicker_aka_MEG-AHAT_project_PPM.pptx
@@ -247,7 +247,7 @@
           <a:p>
             <a:fld id="{24EB8EBF-EE54-5F4A-9A96-36AE8BE19C24}" type="datetimeFigureOut">
               <a:rPr lang="en-US" smtClean="0"/>
-              <a:t>11/29/23</a:t>
+              <a:t>12/4/23</a:t>
             </a:fld>
             <a:endParaRPr lang="en-US"/>
           </a:p>
@@ -5911,8 +5911,8 @@
           <a:lstStyle/>
           <a:p>
             <a:r>
-              <a:rPr lang="en-GB" dirty="0"/>
-              <a:t>MEG-AHAT</a:t>
+              <a:rPr lang="en-GB" sz="2800" dirty="0"/>
+              <a:t>MEG-AHAT: Propagation of spectral flicker during visual- and non-visual cognitive tasks</a:t>
             </a:r>
           </a:p>
         </p:txBody>

</xml_diff>

<commit_message>
Updated PPM slides animations/transitions
</commit_message>
<xml_diff>
--- a/protocol/Invisible-Flicker_aka_MEG-AHAT_project_PPM.pptx
+++ b/protocol/Invisible-Flicker_aka_MEG-AHAT_project_PPM.pptx
@@ -1,6 +1,6 @@
 
 <file path=ppt/presentation.xml><?xml version="1.0" encoding="utf-8"?>
-<p:presentation xmlns:a="http://schemas.openxmlformats.org/drawingml/2006/main" xmlns:r="http://schemas.openxmlformats.org/officeDocument/2006/relationships" xmlns:p="http://schemas.openxmlformats.org/presentationml/2006/main" saveSubsetFonts="1" autoCompressPictures="0">
+<p:presentation xmlns:a="http://schemas.openxmlformats.org/drawingml/2006/main" xmlns:r="http://schemas.openxmlformats.org/officeDocument/2006/relationships" xmlns:p="http://schemas.openxmlformats.org/presentationml/2006/main" showSpecialPlsOnTitleSld="0" saveSubsetFonts="1" autoCompressPictures="0">
   <p:sldMasterIdLst>
     <p:sldMasterId id="2147483660" r:id="rId1"/>
   </p:sldMasterIdLst>
@@ -222,7 +222,7 @@
           <a:p>
             <a:fld id="{24EB8EBF-EE54-5F4A-9A96-36AE8BE19C24}" type="datetimeFigureOut">
               <a:rPr lang="en-US" smtClean="0"/>
-              <a:t>12/5/23</a:t>
+              <a:t>12/6/23</a:t>
             </a:fld>
             <a:endParaRPr lang="en-US"/>
           </a:p>
@@ -536,6 +536,15 @@
           <a:p>
             <a:r>
               <a:rPr lang="en-GB" dirty="0"/>
+              <a:t>Enrolled as a PhD student at the Technical University of Denmark, Department of Applied Mathematics and Computer Science, Section for Cognitive Systems.</a:t>
+            </a:r>
+          </a:p>
+          <a:p>
+            <a:endParaRPr lang="en-GB" dirty="0"/>
+          </a:p>
+          <a:p>
+            <a:r>
+              <a:rPr lang="en-GB" dirty="0"/>
               <a:t>Disclosures:</a:t>
             </a:r>
           </a:p>
@@ -634,6 +643,28 @@
         <p:txBody>
           <a:bodyPr/>
           <a:lstStyle/>
+          <a:p>
+            <a:r>
+              <a:rPr lang="en-GB" dirty="0"/>
+              <a:t>AD is a progressive, </a:t>
+            </a:r>
+            <a:r>
+              <a:rPr lang="en-GB"/>
+              <a:t>neurological disorder </a:t>
+            </a:r>
+            <a:r>
+              <a:rPr lang="en-GB" dirty="0"/>
+              <a:t>that eventually leads to dementia and death. Current treatment is symptomatic (based on cholinesterase inhibitors), though there has been recent progress </a:t>
+            </a:r>
+            <a:r>
+              <a:rPr lang="en-GB"/>
+              <a:t>with anti</a:t>
+            </a:r>
+            <a:endParaRPr lang="en-GB" dirty="0"/>
+          </a:p>
+          <a:p>
+            <a:endParaRPr lang="en-GB" dirty="0"/>
+          </a:p>
           <a:p>
             <a:r>
               <a:rPr lang="en-GB" dirty="0"/>
@@ -5672,6 +5703,7 @@
     <p:sldLayoutId id="2147483717" r:id="rId12"/>
     <p:sldLayoutId id="2147483718" r:id="rId13"/>
   </p:sldLayoutIdLst>
+  <p:hf hdr="0" ftr="0" dt="0"/>
   <p:txStyles>
     <p:titleStyle>
       <a:lvl1pPr algn="ctr" defTabSz="457200" rtl="0" eaLnBrk="1" latinLnBrk="0" hangingPunct="1">
@@ -6557,7 +6589,7 @@
         <p:spPr>
           <a:xfrm>
             <a:off x="542191" y="1080001"/>
-            <a:ext cx="5712835" cy="492443"/>
+            <a:ext cx="5712835" cy="787908"/>
           </a:xfrm>
         </p:spPr>
         <p:txBody>
@@ -6570,7 +6602,17 @@
             </a:pPr>
             <a:r>
               <a:rPr lang="en-GB" dirty="0"/>
-              <a:t>Non-invasive 40 Hz sensory stimulation has been proposed as treatment for Alzheimer’s disease (AD)</a:t>
+              <a:t>Alzheimer’s Disease (AD)</a:t>
+            </a:r>
+          </a:p>
+          <a:p>
+            <a:pPr marL="285750" indent="-285750">
+              <a:buFont typeface="Arial" panose="020B0604020202020204" pitchFamily="34" charset="0"/>
+              <a:buChar char="•"/>
+            </a:pPr>
+            <a:r>
+              <a:rPr lang="en-GB" dirty="0"/>
+              <a:t>Non-invasive 40 Hz sensory stimulation has been proposed as treatment for AD</a:t>
             </a:r>
             <a:r>
               <a:rPr lang="en-GB" baseline="30000" dirty="0"/>
@@ -6794,7 +6836,7 @@
         </p:nvSpPr>
         <p:spPr>
           <a:xfrm>
-            <a:off x="542191" y="2853143"/>
+            <a:off x="542191" y="3038959"/>
             <a:ext cx="5712835" cy="1034129"/>
           </a:xfrm>
           <a:prstGeom prst="rect">
@@ -7201,7 +7243,7 @@
         </p:nvSpPr>
         <p:spPr>
           <a:xfrm>
-            <a:off x="544116" y="1743894"/>
+            <a:off x="544116" y="1929710"/>
             <a:ext cx="5712835" cy="1034129"/>
           </a:xfrm>
           <a:prstGeom prst="rect">
@@ -7453,15 +7495,64 @@
                                   </p:childTnLst>
                                 </p:cTn>
                               </p:par>
+                            </p:childTnLst>
+                          </p:cTn>
+                        </p:par>
+                      </p:childTnLst>
+                    </p:cTn>
+                  </p:par>
+                  <p:par>
+                    <p:cTn id="7" fill="hold">
+                      <p:stCondLst>
+                        <p:cond delay="indefinite"/>
+                      </p:stCondLst>
+                      <p:childTnLst>
+                        <p:par>
+                          <p:cTn id="8" fill="hold">
+                            <p:stCondLst>
+                              <p:cond delay="0"/>
+                            </p:stCondLst>
+                            <p:childTnLst>
                               <p:par>
-                                <p:cTn id="7" presetID="1" presetClass="entr" presetSubtype="0" fill="hold" grpId="0" nodeType="withEffect">
+                                <p:cTn id="9" presetID="1" presetClass="entr" presetSubtype="0" fill="hold" grpId="0" nodeType="clickEffect">
                                   <p:stCondLst>
                                     <p:cond delay="0"/>
                                   </p:stCondLst>
                                   <p:childTnLst>
                                     <p:set>
                                       <p:cBhvr>
-                                        <p:cTn id="8" dur="1" fill="hold">
+                                        <p:cTn id="10" dur="1" fill="hold">
+                                          <p:stCondLst>
+                                            <p:cond delay="0"/>
+                                          </p:stCondLst>
+                                        </p:cTn>
+                                        <p:tgtEl>
+                                          <p:spTgt spid="5">
+                                            <p:txEl>
+                                              <p:pRg st="1" end="1"/>
+                                            </p:txEl>
+                                          </p:spTgt>
+                                        </p:tgtEl>
+                                        <p:attrNameLst>
+                                          <p:attrName>style.visibility</p:attrName>
+                                        </p:attrNameLst>
+                                      </p:cBhvr>
+                                      <p:to>
+                                        <p:strVal val="visible"/>
+                                      </p:to>
+                                    </p:set>
+                                  </p:childTnLst>
+                                </p:cTn>
+                              </p:par>
+                              <p:par>
+                                <p:cTn id="11" presetID="1" presetClass="entr" presetSubtype="0" fill="hold" grpId="0" nodeType="withEffect">
+                                  <p:stCondLst>
+                                    <p:cond delay="0"/>
+                                  </p:stCondLst>
+                                  <p:childTnLst>
+                                    <p:set>
+                                      <p:cBhvr>
+                                        <p:cTn id="12" dur="1" fill="hold">
                                           <p:stCondLst>
                                             <p:cond delay="0"/>
                                           </p:stCondLst>
@@ -7485,14 +7576,14 @@
                                 </p:cTn>
                               </p:par>
                               <p:par>
-                                <p:cTn id="9" presetID="1" presetClass="entr" presetSubtype="0" fill="hold" grpId="0" nodeType="withEffect">
+                                <p:cTn id="13" presetID="1" presetClass="entr" presetSubtype="0" fill="hold" grpId="0" nodeType="withEffect">
                                   <p:stCondLst>
                                     <p:cond delay="0"/>
                                   </p:stCondLst>
                                   <p:childTnLst>
                                     <p:set>
                                       <p:cBhvr>
-                                        <p:cTn id="10" dur="1" fill="hold">
+                                        <p:cTn id="14" dur="1" fill="hold">
                                           <p:stCondLst>
                                             <p:cond delay="0"/>
                                           </p:stCondLst>
@@ -7522,26 +7613,26 @@
                     </p:cTn>
                   </p:par>
                   <p:par>
-                    <p:cTn id="11" fill="hold">
+                    <p:cTn id="15" fill="hold">
                       <p:stCondLst>
                         <p:cond delay="indefinite"/>
                       </p:stCondLst>
                       <p:childTnLst>
                         <p:par>
-                          <p:cTn id="12" fill="hold">
+                          <p:cTn id="16" fill="hold">
                             <p:stCondLst>
                               <p:cond delay="0"/>
                             </p:stCondLst>
                             <p:childTnLst>
                               <p:par>
-                                <p:cTn id="13" presetID="1" presetClass="entr" presetSubtype="0" fill="hold" grpId="0" nodeType="clickEffect">
+                                <p:cTn id="17" presetID="1" presetClass="entr" presetSubtype="0" fill="hold" grpId="0" nodeType="clickEffect">
                                   <p:stCondLst>
                                     <p:cond delay="0"/>
                                   </p:stCondLst>
                                   <p:childTnLst>
                                     <p:set>
                                       <p:cBhvr>
-                                        <p:cTn id="14" dur="1" fill="hold">
+                                        <p:cTn id="18" dur="1" fill="hold">
                                           <p:stCondLst>
                                             <p:cond delay="0"/>
                                           </p:stCondLst>
@@ -7564,15 +7655,33 @@
                                   </p:childTnLst>
                                 </p:cTn>
                               </p:par>
+                            </p:childTnLst>
+                          </p:cTn>
+                        </p:par>
+                      </p:childTnLst>
+                    </p:cTn>
+                  </p:par>
+                  <p:par>
+                    <p:cTn id="19" fill="hold">
+                      <p:stCondLst>
+                        <p:cond delay="indefinite"/>
+                      </p:stCondLst>
+                      <p:childTnLst>
+                        <p:par>
+                          <p:cTn id="20" fill="hold">
+                            <p:stCondLst>
+                              <p:cond delay="0"/>
+                            </p:stCondLst>
+                            <p:childTnLst>
                               <p:par>
-                                <p:cTn id="15" presetID="1" presetClass="entr" presetSubtype="0" fill="hold" nodeType="withEffect">
+                                <p:cTn id="21" presetID="1" presetClass="entr" presetSubtype="0" fill="hold" nodeType="clickEffect">
                                   <p:stCondLst>
                                     <p:cond delay="0"/>
                                   </p:stCondLst>
                                   <p:childTnLst>
                                     <p:set>
                                       <p:cBhvr>
-                                        <p:cTn id="16" dur="1" fill="hold">
+                                        <p:cTn id="22" dur="1" fill="hold">
                                           <p:stCondLst>
                                             <p:cond delay="0"/>
                                           </p:stCondLst>
@@ -7592,14 +7701,14 @@
                                 </p:cTn>
                               </p:par>
                               <p:par>
-                                <p:cTn id="17" presetID="1" presetClass="entr" presetSubtype="0" fill="hold" grpId="0" nodeType="withEffect">
+                                <p:cTn id="23" presetID="1" presetClass="entr" presetSubtype="0" fill="hold" grpId="0" nodeType="withEffect">
                                   <p:stCondLst>
                                     <p:cond delay="0"/>
                                   </p:stCondLst>
                                   <p:childTnLst>
                                     <p:set>
                                       <p:cBhvr>
-                                        <p:cTn id="18" dur="1" fill="hold">
+                                        <p:cTn id="24" dur="1" fill="hold">
                                           <p:stCondLst>
                                             <p:cond delay="0"/>
                                           </p:stCondLst>
@@ -7623,14 +7732,14 @@
                                 </p:cTn>
                               </p:par>
                               <p:par>
-                                <p:cTn id="19" presetID="1" presetClass="entr" presetSubtype="0" fill="hold" grpId="0" nodeType="withEffect">
+                                <p:cTn id="25" presetID="1" presetClass="entr" presetSubtype="0" fill="hold" grpId="0" nodeType="withEffect">
                                   <p:stCondLst>
                                     <p:cond delay="0"/>
                                   </p:stCondLst>
                                   <p:childTnLst>
                                     <p:set>
                                       <p:cBhvr>
-                                        <p:cTn id="20" dur="1" fill="hold">
+                                        <p:cTn id="26" dur="1" fill="hold">
                                           <p:stCondLst>
                                             <p:cond delay="0"/>
                                           </p:stCondLst>
@@ -7654,14 +7763,14 @@
                                 </p:cTn>
                               </p:par>
                               <p:par>
-                                <p:cTn id="21" presetID="1" presetClass="entr" presetSubtype="0" fill="hold" grpId="0" nodeType="withEffect">
+                                <p:cTn id="27" presetID="1" presetClass="entr" presetSubtype="0" fill="hold" grpId="0" nodeType="withEffect">
                                   <p:stCondLst>
                                     <p:cond delay="0"/>
                                   </p:stCondLst>
                                   <p:childTnLst>
                                     <p:set>
                                       <p:cBhvr>
-                                        <p:cTn id="22" dur="1" fill="hold">
+                                        <p:cTn id="28" dur="1" fill="hold">
                                           <p:stCondLst>
                                             <p:cond delay="0"/>
                                           </p:stCondLst>
@@ -7687,104 +7796,19 @@
                     </p:cTn>
                   </p:par>
                   <p:par>
-                    <p:cTn id="23" fill="hold">
+                    <p:cTn id="29" fill="hold">
                       <p:stCondLst>
                         <p:cond delay="indefinite"/>
                       </p:stCondLst>
                       <p:childTnLst>
                         <p:par>
-                          <p:cTn id="24" fill="hold">
+                          <p:cTn id="30" fill="hold">
                             <p:stCondLst>
                               <p:cond delay="0"/>
                             </p:stCondLst>
                             <p:childTnLst>
                               <p:par>
-                                <p:cTn id="25" presetID="1" presetClass="entr" presetSubtype="0" fill="hold" grpId="0" nodeType="clickEffect">
-                                  <p:stCondLst>
-                                    <p:cond delay="0"/>
-                                  </p:stCondLst>
-                                  <p:childTnLst>
-                                    <p:set>
-                                      <p:cBhvr>
-                                        <p:cTn id="26" dur="1" fill="hold">
-                                          <p:stCondLst>
-                                            <p:cond delay="0"/>
-                                          </p:stCondLst>
-                                        </p:cTn>
-                                        <p:tgtEl>
-                                          <p:spTgt spid="16">
-                                            <p:txEl>
-                                              <p:pRg st="1" end="1"/>
-                                            </p:txEl>
-                                          </p:spTgt>
-                                        </p:tgtEl>
-                                        <p:attrNameLst>
-                                          <p:attrName>style.visibility</p:attrName>
-                                        </p:attrNameLst>
-                                      </p:cBhvr>
-                                      <p:to>
-                                        <p:strVal val="visible"/>
-                                      </p:to>
-                                    </p:set>
-                                  </p:childTnLst>
-                                </p:cTn>
-                              </p:par>
-                              <p:par>
-                                <p:cTn id="27" presetID="1" presetClass="entr" presetSubtype="0" fill="hold" nodeType="withEffect">
-                                  <p:stCondLst>
-                                    <p:cond delay="0"/>
-                                  </p:stCondLst>
-                                  <p:childTnLst>
-                                    <p:set>
-                                      <p:cBhvr>
-                                        <p:cTn id="28" dur="1" fill="hold">
-                                          <p:stCondLst>
-                                            <p:cond delay="0"/>
-                                          </p:stCondLst>
-                                        </p:cTn>
-                                        <p:tgtEl>
-                                          <p:spTgt spid="14"/>
-                                        </p:tgtEl>
-                                        <p:attrNameLst>
-                                          <p:attrName>style.visibility</p:attrName>
-                                        </p:attrNameLst>
-                                      </p:cBhvr>
-                                      <p:to>
-                                        <p:strVal val="visible"/>
-                                      </p:to>
-                                    </p:set>
-                                  </p:childTnLst>
-                                </p:cTn>
-                              </p:par>
-                              <p:par>
-                                <p:cTn id="29" presetID="1" presetClass="entr" presetSubtype="0" fill="hold" grpId="1" nodeType="withEffect">
-                                  <p:stCondLst>
-                                    <p:cond delay="0"/>
-                                  </p:stCondLst>
-                                  <p:childTnLst>
-                                    <p:set>
-                                      <p:cBhvr>
-                                        <p:cTn id="30" dur="1" fill="hold">
-                                          <p:stCondLst>
-                                            <p:cond delay="0"/>
-                                          </p:stCondLst>
-                                        </p:cTn>
-                                        <p:tgtEl>
-                                          <p:spTgt spid="15"/>
-                                        </p:tgtEl>
-                                        <p:attrNameLst>
-                                          <p:attrName>style.visibility</p:attrName>
-                                        </p:attrNameLst>
-                                      </p:cBhvr>
-                                      <p:to>
-                                        <p:strVal val="visible"/>
-                                      </p:to>
-                                    </p:set>
-                                  </p:childTnLst>
-                                </p:cTn>
-                              </p:par>
-                              <p:par>
-                                <p:cTn id="31" presetID="1" presetClass="entr" presetSubtype="0" fill="hold" grpId="0" nodeType="withEffect">
+                                <p:cTn id="31" presetID="1" presetClass="entr" presetSubtype="0" fill="hold" grpId="0" nodeType="clickEffect">
                                   <p:stCondLst>
                                     <p:cond delay="0"/>
                                   </p:stCondLst>
@@ -7797,9 +7821,9 @@
                                           </p:stCondLst>
                                         </p:cTn>
                                         <p:tgtEl>
-                                          <p:spTgt spid="3">
+                                          <p:spTgt spid="16">
                                             <p:txEl>
-                                              <p:pRg st="4" end="4"/>
+                                              <p:pRg st="1" end="1"/>
                                             </p:txEl>
                                           </p:spTgt>
                                         </p:tgtEl>
@@ -7833,7 +7857,7 @@
                             </p:stCondLst>
                             <p:childTnLst>
                               <p:par>
-                                <p:cTn id="35" presetID="1" presetClass="entr" presetSubtype="0" fill="hold" grpId="0" nodeType="clickEffect">
+                                <p:cTn id="35" presetID="1" presetClass="entr" presetSubtype="0" fill="hold" nodeType="clickEffect">
                                   <p:stCondLst>
                                     <p:cond delay="0"/>
                                   </p:stCondLst>
@@ -7841,6 +7865,109 @@
                                     <p:set>
                                       <p:cBhvr>
                                         <p:cTn id="36" dur="1" fill="hold">
+                                          <p:stCondLst>
+                                            <p:cond delay="0"/>
+                                          </p:stCondLst>
+                                        </p:cTn>
+                                        <p:tgtEl>
+                                          <p:spTgt spid="14"/>
+                                        </p:tgtEl>
+                                        <p:attrNameLst>
+                                          <p:attrName>style.visibility</p:attrName>
+                                        </p:attrNameLst>
+                                      </p:cBhvr>
+                                      <p:to>
+                                        <p:strVal val="visible"/>
+                                      </p:to>
+                                    </p:set>
+                                  </p:childTnLst>
+                                </p:cTn>
+                              </p:par>
+                              <p:par>
+                                <p:cTn id="37" presetID="1" presetClass="entr" presetSubtype="0" fill="hold" grpId="1" nodeType="withEffect">
+                                  <p:stCondLst>
+                                    <p:cond delay="0"/>
+                                  </p:stCondLst>
+                                  <p:childTnLst>
+                                    <p:set>
+                                      <p:cBhvr>
+                                        <p:cTn id="38" dur="1" fill="hold">
+                                          <p:stCondLst>
+                                            <p:cond delay="0"/>
+                                          </p:stCondLst>
+                                        </p:cTn>
+                                        <p:tgtEl>
+                                          <p:spTgt spid="15"/>
+                                        </p:tgtEl>
+                                        <p:attrNameLst>
+                                          <p:attrName>style.visibility</p:attrName>
+                                        </p:attrNameLst>
+                                      </p:cBhvr>
+                                      <p:to>
+                                        <p:strVal val="visible"/>
+                                      </p:to>
+                                    </p:set>
+                                  </p:childTnLst>
+                                </p:cTn>
+                              </p:par>
+                              <p:par>
+                                <p:cTn id="39" presetID="1" presetClass="entr" presetSubtype="0" fill="hold" grpId="0" nodeType="withEffect">
+                                  <p:stCondLst>
+                                    <p:cond delay="0"/>
+                                  </p:stCondLst>
+                                  <p:childTnLst>
+                                    <p:set>
+                                      <p:cBhvr>
+                                        <p:cTn id="40" dur="1" fill="hold">
+                                          <p:stCondLst>
+                                            <p:cond delay="0"/>
+                                          </p:stCondLst>
+                                        </p:cTn>
+                                        <p:tgtEl>
+                                          <p:spTgt spid="3">
+                                            <p:txEl>
+                                              <p:pRg st="4" end="4"/>
+                                            </p:txEl>
+                                          </p:spTgt>
+                                        </p:tgtEl>
+                                        <p:attrNameLst>
+                                          <p:attrName>style.visibility</p:attrName>
+                                        </p:attrNameLst>
+                                      </p:cBhvr>
+                                      <p:to>
+                                        <p:strVal val="visible"/>
+                                      </p:to>
+                                    </p:set>
+                                  </p:childTnLst>
+                                </p:cTn>
+                              </p:par>
+                            </p:childTnLst>
+                          </p:cTn>
+                        </p:par>
+                      </p:childTnLst>
+                    </p:cTn>
+                  </p:par>
+                  <p:par>
+                    <p:cTn id="41" fill="hold">
+                      <p:stCondLst>
+                        <p:cond delay="indefinite"/>
+                      </p:stCondLst>
+                      <p:childTnLst>
+                        <p:par>
+                          <p:cTn id="42" fill="hold">
+                            <p:stCondLst>
+                              <p:cond delay="0"/>
+                            </p:stCondLst>
+                            <p:childTnLst>
+                              <p:par>
+                                <p:cTn id="43" presetID="1" presetClass="entr" presetSubtype="0" fill="hold" grpId="0" nodeType="clickEffect">
+                                  <p:stCondLst>
+                                    <p:cond delay="0"/>
+                                  </p:stCondLst>
+                                  <p:childTnLst>
+                                    <p:set>
+                                      <p:cBhvr>
+                                        <p:cTn id="44" dur="1" fill="hold">
                                           <p:stCondLst>
                                             <p:cond delay="0"/>
                                           </p:stCondLst>
@@ -7864,14 +7991,14 @@
                                 </p:cTn>
                               </p:par>
                               <p:par>
-                                <p:cTn id="37" presetID="1" presetClass="entr" presetSubtype="0" fill="hold" grpId="0" nodeType="withEffect">
+                                <p:cTn id="45" presetID="1" presetClass="entr" presetSubtype="0" fill="hold" grpId="0" nodeType="withEffect">
                                   <p:stCondLst>
                                     <p:cond delay="0"/>
                                   </p:stCondLst>
                                   <p:childTnLst>
                                     <p:set>
                                       <p:cBhvr>
-                                        <p:cTn id="38" dur="1" fill="hold">
+                                        <p:cTn id="46" dur="1" fill="hold">
                                           <p:stCondLst>
                                             <p:cond delay="0"/>
                                           </p:stCondLst>
@@ -7901,26 +8028,26 @@
                     </p:cTn>
                   </p:par>
                   <p:par>
-                    <p:cTn id="39" fill="hold">
+                    <p:cTn id="47" fill="hold">
                       <p:stCondLst>
                         <p:cond delay="indefinite"/>
                       </p:stCondLst>
                       <p:childTnLst>
                         <p:par>
-                          <p:cTn id="40" fill="hold">
+                          <p:cTn id="48" fill="hold">
                             <p:stCondLst>
                               <p:cond delay="0"/>
                             </p:stCondLst>
                             <p:childTnLst>
                               <p:par>
-                                <p:cTn id="41" presetID="1" presetClass="entr" presetSubtype="0" fill="hold" grpId="0" nodeType="clickEffect">
+                                <p:cTn id="49" presetID="1" presetClass="entr" presetSubtype="0" fill="hold" grpId="0" nodeType="clickEffect">
                                   <p:stCondLst>
                                     <p:cond delay="0"/>
                                   </p:stCondLst>
                                   <p:childTnLst>
                                     <p:set>
                                       <p:cBhvr>
-                                        <p:cTn id="42" dur="1" fill="hold">
+                                        <p:cTn id="50" dur="1" fill="hold">
                                           <p:stCondLst>
                                             <p:cond delay="0"/>
                                           </p:stCondLst>
@@ -7944,14 +8071,14 @@
                                 </p:cTn>
                               </p:par>
                               <p:par>
-                                <p:cTn id="43" presetID="1" presetClass="entr" presetSubtype="0" fill="hold" grpId="0" nodeType="withEffect">
+                                <p:cTn id="51" presetID="1" presetClass="entr" presetSubtype="0" fill="hold" grpId="0" nodeType="withEffect">
                                   <p:stCondLst>
                                     <p:cond delay="0"/>
                                   </p:stCondLst>
                                   <p:childTnLst>
                                     <p:set>
                                       <p:cBhvr>
-                                        <p:cTn id="44" dur="1" fill="hold">
+                                        <p:cTn id="52" dur="1" fill="hold">
                                           <p:stCondLst>
                                             <p:cond delay="0"/>
                                           </p:stCondLst>
@@ -8645,45 +8772,45 @@
           <a:lstStyle/>
           <a:p>
             <a:r>
-              <a:rPr lang="en-GB" dirty="0"/>
+              <a:rPr lang="en-GB" sz="800" dirty="0"/>
               <a:t>* With 10% probability, the fixation grating will only last 500 – 1000 </a:t>
             </a:r>
             <a:r>
-              <a:rPr lang="en-GB" dirty="0" err="1"/>
+              <a:rPr lang="en-GB" sz="800" dirty="0" err="1"/>
               <a:t>ms</a:t>
             </a:r>
             <a:r>
-              <a:rPr lang="en-GB" dirty="0"/>
+              <a:rPr lang="en-GB" sz="800" dirty="0"/>
               <a:t> (uniform distribution), otherwise 1000 – 2500 </a:t>
             </a:r>
             <a:r>
-              <a:rPr lang="en-GB" dirty="0" err="1"/>
+              <a:rPr lang="en-GB" sz="800" dirty="0" err="1"/>
               <a:t>ms</a:t>
             </a:r>
             <a:r>
-              <a:rPr lang="en-GB" dirty="0"/>
+              <a:rPr lang="en-GB" sz="800" dirty="0"/>
               <a:t> (uniform distribution)</a:t>
             </a:r>
           </a:p>
           <a:p>
             <a:r>
-              <a:rPr lang="en-GB" dirty="0"/>
+              <a:rPr lang="en-GB" sz="800" dirty="0"/>
               <a:t>** Given the fixation grating duration exceeds 1000 </a:t>
             </a:r>
             <a:r>
-              <a:rPr lang="en-GB" dirty="0" err="1"/>
+              <a:rPr lang="en-GB" sz="800" dirty="0" err="1"/>
               <a:t>ms</a:t>
             </a:r>
             <a:r>
-              <a:rPr lang="en-GB" dirty="0"/>
+              <a:rPr lang="en-GB" sz="800" dirty="0"/>
               <a:t>, there is 10 % chance the fixation grating lasts 2500 </a:t>
             </a:r>
             <a:r>
-              <a:rPr lang="en-GB" dirty="0" err="1"/>
+              <a:rPr lang="en-GB" sz="800" dirty="0" err="1"/>
               <a:t>ms</a:t>
             </a:r>
             <a:r>
-              <a:rPr lang="en-GB" dirty="0"/>
+              <a:rPr lang="en-GB" sz="800" dirty="0"/>
               <a:t>, and the discrimination grating never shows</a:t>
             </a:r>
           </a:p>
@@ -8753,7 +8880,7 @@
           <p:nvPr>
             <p:extLst>
               <p:ext uri="{D42A27DB-BD31-4B8C-83A1-F6EECF244321}">
-                <p14:modId xmlns:p14="http://schemas.microsoft.com/office/powerpoint/2010/main" val="2880267923"/>
+                <p14:modId xmlns:p14="http://schemas.microsoft.com/office/powerpoint/2010/main" val="1653943015"/>
               </p:ext>
             </p:extLst>
           </p:nvPr>
@@ -9243,7 +9370,7 @@
                     <a:bodyPr/>
                     <a:lstStyle/>
                     <a:p>
-                      <a:pPr algn="ctr"/>
+                      <a:pPr algn="l"/>
                       <a:r>
                         <a:rPr lang="en-GB" sz="900" dirty="0"/>
                         <a:t>Light Stimulation</a:t>
@@ -10182,7 +10309,7 @@
         </p:nvCxnSpPr>
         <p:spPr>
           <a:xfrm>
-            <a:off x="511228" y="4035766"/>
+            <a:off x="511228" y="4055326"/>
             <a:ext cx="5266484" cy="0"/>
           </a:xfrm>
           <a:prstGeom prst="straightConnector1">
@@ -10790,6 +10917,165 @@
           </a:solidFill>
           <a:ln>
             <a:noFill/>
+          </a:ln>
+          <a:effectLst/>
+        </p:spPr>
+        <p:style>
+          <a:lnRef idx="1">
+            <a:schemeClr val="accent1"/>
+          </a:lnRef>
+          <a:fillRef idx="3">
+            <a:schemeClr val="accent1"/>
+          </a:fillRef>
+          <a:effectRef idx="2">
+            <a:schemeClr val="accent1"/>
+          </a:effectRef>
+          <a:fontRef idx="minor">
+            <a:schemeClr val="lt1"/>
+          </a:fontRef>
+        </p:style>
+        <p:txBody>
+          <a:bodyPr rtlCol="0" anchor="ctr"/>
+          <a:lstStyle/>
+          <a:p>
+            <a:pPr algn="ctr"/>
+            <a:endParaRPr lang="en-GB"/>
+          </a:p>
+        </p:txBody>
+      </p:sp>
+      <p:sp>
+        <p:nvSpPr>
+          <p:cNvPr id="3" name="Rectangle 2">
+            <a:extLst>
+              <a:ext uri="{FF2B5EF4-FFF2-40B4-BE49-F238E27FC236}">
+                <a16:creationId xmlns:a16="http://schemas.microsoft.com/office/drawing/2014/main" id="{41662B63-100E-1D43-ADA1-86BCA97BEF51}"/>
+              </a:ext>
+            </a:extLst>
+          </p:cNvPr>
+          <p:cNvSpPr/>
+          <p:nvPr/>
+        </p:nvSpPr>
+        <p:spPr>
+          <a:xfrm>
+            <a:off x="2342233" y="2381352"/>
+            <a:ext cx="787264" cy="1618537"/>
+          </a:xfrm>
+          <a:prstGeom prst="rect">
+            <a:avLst/>
+          </a:prstGeom>
+          <a:solidFill>
+            <a:schemeClr val="bg1"/>
+          </a:solidFill>
+          <a:ln>
+            <a:solidFill>
+              <a:schemeClr val="bg1"/>
+            </a:solidFill>
+          </a:ln>
+          <a:effectLst/>
+        </p:spPr>
+        <p:style>
+          <a:lnRef idx="1">
+            <a:schemeClr val="accent1"/>
+          </a:lnRef>
+          <a:fillRef idx="3">
+            <a:schemeClr val="accent1"/>
+          </a:fillRef>
+          <a:effectRef idx="2">
+            <a:schemeClr val="accent1"/>
+          </a:effectRef>
+          <a:fontRef idx="minor">
+            <a:schemeClr val="lt1"/>
+          </a:fontRef>
+        </p:style>
+        <p:txBody>
+          <a:bodyPr rtlCol="0" anchor="ctr"/>
+          <a:lstStyle/>
+          <a:p>
+            <a:pPr algn="ctr"/>
+            <a:endParaRPr lang="en-GB"/>
+          </a:p>
+        </p:txBody>
+      </p:sp>
+      <p:sp>
+        <p:nvSpPr>
+          <p:cNvPr id="6" name="Rectangle 5">
+            <a:extLst>
+              <a:ext uri="{FF2B5EF4-FFF2-40B4-BE49-F238E27FC236}">
+                <a16:creationId xmlns:a16="http://schemas.microsoft.com/office/drawing/2014/main" id="{99AD31F6-8170-DCCF-EB36-5248E70E2AB4}"/>
+              </a:ext>
+            </a:extLst>
+          </p:cNvPr>
+          <p:cNvSpPr/>
+          <p:nvPr/>
+        </p:nvSpPr>
+        <p:spPr>
+          <a:xfrm>
+            <a:off x="3129497" y="2376463"/>
+            <a:ext cx="1137256" cy="1618537"/>
+          </a:xfrm>
+          <a:prstGeom prst="rect">
+            <a:avLst/>
+          </a:prstGeom>
+          <a:solidFill>
+            <a:schemeClr val="bg1"/>
+          </a:solidFill>
+          <a:ln>
+            <a:solidFill>
+              <a:schemeClr val="bg1"/>
+            </a:solidFill>
+          </a:ln>
+          <a:effectLst/>
+        </p:spPr>
+        <p:style>
+          <a:lnRef idx="1">
+            <a:schemeClr val="accent1"/>
+          </a:lnRef>
+          <a:fillRef idx="3">
+            <a:schemeClr val="accent1"/>
+          </a:fillRef>
+          <a:effectRef idx="2">
+            <a:schemeClr val="accent1"/>
+          </a:effectRef>
+          <a:fontRef idx="minor">
+            <a:schemeClr val="lt1"/>
+          </a:fontRef>
+        </p:style>
+        <p:txBody>
+          <a:bodyPr rtlCol="0" anchor="ctr"/>
+          <a:lstStyle/>
+          <a:p>
+            <a:pPr algn="ctr"/>
+            <a:endParaRPr lang="en-GB"/>
+          </a:p>
+        </p:txBody>
+      </p:sp>
+      <p:sp>
+        <p:nvSpPr>
+          <p:cNvPr id="11" name="Rectangle 10">
+            <a:extLst>
+              <a:ext uri="{FF2B5EF4-FFF2-40B4-BE49-F238E27FC236}">
+                <a16:creationId xmlns:a16="http://schemas.microsoft.com/office/drawing/2014/main" id="{0F071B4C-6AE3-DD1F-8EF8-1360454F9AE4}"/>
+              </a:ext>
+            </a:extLst>
+          </p:cNvPr>
+          <p:cNvSpPr/>
+          <p:nvPr/>
+        </p:nvSpPr>
+        <p:spPr>
+          <a:xfrm>
+            <a:off x="4266754" y="2387083"/>
+            <a:ext cx="1547264" cy="1618537"/>
+          </a:xfrm>
+          <a:prstGeom prst="rect">
+            <a:avLst/>
+          </a:prstGeom>
+          <a:solidFill>
+            <a:schemeClr val="bg1"/>
+          </a:solidFill>
+          <a:ln>
+            <a:solidFill>
+              <a:schemeClr val="bg1"/>
+            </a:solidFill>
           </a:ln>
           <a:effectLst/>
         </p:spPr>
@@ -11093,7 +11379,7 @@
                                 </p:cTn>
                               </p:par>
                               <p:par>
-                                <p:cTn id="25" presetID="1" presetClass="entr" presetSubtype="0" fill="hold" grpId="0" nodeType="withEffect">
+                                <p:cTn id="25" presetID="1" presetClass="entr" presetSubtype="0" fill="hold" nodeType="withEffect">
                                   <p:stCondLst>
                                     <p:cond delay="0"/>
                                   </p:stCondLst>
@@ -11101,6 +11387,60 @@
                                     <p:set>
                                       <p:cBhvr>
                                         <p:cTn id="26" dur="1" fill="hold">
+                                          <p:stCondLst>
+                                            <p:cond delay="0"/>
+                                          </p:stCondLst>
+                                        </p:cTn>
+                                        <p:tgtEl>
+                                          <p:spTgt spid="29"/>
+                                        </p:tgtEl>
+                                        <p:attrNameLst>
+                                          <p:attrName>style.visibility</p:attrName>
+                                        </p:attrNameLst>
+                                      </p:cBhvr>
+                                      <p:to>
+                                        <p:strVal val="visible"/>
+                                      </p:to>
+                                    </p:set>
+                                  </p:childTnLst>
+                                </p:cTn>
+                              </p:par>
+                              <p:par>
+                                <p:cTn id="27" presetID="1" presetClass="entr" presetSubtype="0" fill="hold" nodeType="withEffect">
+                                  <p:stCondLst>
+                                    <p:cond delay="0"/>
+                                  </p:stCondLst>
+                                  <p:childTnLst>
+                                    <p:set>
+                                      <p:cBhvr>
+                                        <p:cTn id="28" dur="1" fill="hold">
+                                          <p:stCondLst>
+                                            <p:cond delay="0"/>
+                                          </p:stCondLst>
+                                        </p:cTn>
+                                        <p:tgtEl>
+                                          <p:spTgt spid="30"/>
+                                        </p:tgtEl>
+                                        <p:attrNameLst>
+                                          <p:attrName>style.visibility</p:attrName>
+                                        </p:attrNameLst>
+                                      </p:cBhvr>
+                                      <p:to>
+                                        <p:strVal val="visible"/>
+                                      </p:to>
+                                    </p:set>
+                                  </p:childTnLst>
+                                </p:cTn>
+                              </p:par>
+                              <p:par>
+                                <p:cTn id="29" presetID="1" presetClass="entr" presetSubtype="0" fill="hold" grpId="0" nodeType="withEffect">
+                                  <p:stCondLst>
+                                    <p:cond delay="0"/>
+                                  </p:stCondLst>
+                                  <p:childTnLst>
+                                    <p:set>
+                                      <p:cBhvr>
+                                        <p:cTn id="30" dur="1" fill="hold">
                                           <p:stCondLst>
                                             <p:cond delay="0"/>
                                           </p:stCondLst>
@@ -11126,26 +11466,26 @@
                     </p:cTn>
                   </p:par>
                   <p:par>
-                    <p:cTn id="27" fill="hold">
+                    <p:cTn id="31" fill="hold">
                       <p:stCondLst>
                         <p:cond delay="indefinite"/>
                       </p:stCondLst>
                       <p:childTnLst>
                         <p:par>
-                          <p:cTn id="28" fill="hold">
+                          <p:cTn id="32" fill="hold">
                             <p:stCondLst>
                               <p:cond delay="0"/>
                             </p:stCondLst>
                             <p:childTnLst>
                               <p:par>
-                                <p:cTn id="29" presetID="1" presetClass="entr" presetSubtype="0" fill="hold" grpId="0" nodeType="clickEffect">
+                                <p:cTn id="33" presetID="1" presetClass="entr" presetSubtype="0" fill="hold" grpId="0" nodeType="clickEffect">
                                   <p:stCondLst>
                                     <p:cond delay="0"/>
                                   </p:stCondLst>
                                   <p:childTnLst>
                                     <p:set>
                                       <p:cBhvr>
-                                        <p:cTn id="30" dur="1" fill="hold">
+                                        <p:cTn id="34" dur="1" fill="hold">
                                           <p:stCondLst>
                                             <p:cond delay="0"/>
                                           </p:stCondLst>
@@ -11165,14 +11505,41 @@
                                 </p:cTn>
                               </p:par>
                               <p:par>
-                                <p:cTn id="31" presetID="1" presetClass="exit" presetSubtype="0" fill="hold" grpId="1" nodeType="withEffect">
+                                <p:cTn id="35" presetID="1" presetClass="exit" presetSubtype="0" fill="hold" grpId="0" nodeType="withEffect">
                                   <p:stCondLst>
                                     <p:cond delay="0"/>
                                   </p:stCondLst>
                                   <p:childTnLst>
                                     <p:set>
                                       <p:cBhvr>
-                                        <p:cTn id="32" dur="1" fill="hold">
+                                        <p:cTn id="36" dur="1" fill="hold">
+                                          <p:stCondLst>
+                                            <p:cond delay="0"/>
+                                          </p:stCondLst>
+                                        </p:cTn>
+                                        <p:tgtEl>
+                                          <p:spTgt spid="3"/>
+                                        </p:tgtEl>
+                                        <p:attrNameLst>
+                                          <p:attrName>style.visibility</p:attrName>
+                                        </p:attrNameLst>
+                                      </p:cBhvr>
+                                      <p:to>
+                                        <p:strVal val="hidden"/>
+                                      </p:to>
+                                    </p:set>
+                                  </p:childTnLst>
+                                </p:cTn>
+                              </p:par>
+                              <p:par>
+                                <p:cTn id="37" presetID="1" presetClass="exit" presetSubtype="0" fill="hold" grpId="1" nodeType="withEffect">
+                                  <p:stCondLst>
+                                    <p:cond delay="0"/>
+                                  </p:stCondLst>
+                                  <p:childTnLst>
+                                    <p:set>
+                                      <p:cBhvr>
+                                        <p:cTn id="38" dur="1" fill="hold">
                                           <p:stCondLst>
                                             <p:cond delay="0"/>
                                           </p:stCondLst>
@@ -11186,78 +11553,6 @@
                                       </p:cBhvr>
                                       <p:to>
                                         <p:strVal val="hidden"/>
-                                      </p:to>
-                                    </p:set>
-                                  </p:childTnLst>
-                                </p:cTn>
-                              </p:par>
-                            </p:childTnLst>
-                          </p:cTn>
-                        </p:par>
-                      </p:childTnLst>
-                    </p:cTn>
-                  </p:par>
-                  <p:par>
-                    <p:cTn id="33" fill="hold">
-                      <p:stCondLst>
-                        <p:cond delay="indefinite"/>
-                      </p:stCondLst>
-                      <p:childTnLst>
-                        <p:par>
-                          <p:cTn id="34" fill="hold">
-                            <p:stCondLst>
-                              <p:cond delay="0"/>
-                            </p:stCondLst>
-                            <p:childTnLst>
-                              <p:par>
-                                <p:cTn id="35" presetID="1" presetClass="entr" presetSubtype="0" fill="hold" nodeType="clickEffect">
-                                  <p:stCondLst>
-                                    <p:cond delay="0"/>
-                                  </p:stCondLst>
-                                  <p:childTnLst>
-                                    <p:set>
-                                      <p:cBhvr>
-                                        <p:cTn id="36" dur="1" fill="hold">
-                                          <p:stCondLst>
-                                            <p:cond delay="0"/>
-                                          </p:stCondLst>
-                                        </p:cTn>
-                                        <p:tgtEl>
-                                          <p:spTgt spid="21"/>
-                                        </p:tgtEl>
-                                        <p:attrNameLst>
-                                          <p:attrName>style.visibility</p:attrName>
-                                        </p:attrNameLst>
-                                      </p:cBhvr>
-                                      <p:to>
-                                        <p:strVal val="visible"/>
-                                      </p:to>
-                                    </p:set>
-                                  </p:childTnLst>
-                                </p:cTn>
-                              </p:par>
-                              <p:par>
-                                <p:cTn id="37" presetID="1" presetClass="entr" presetSubtype="0" fill="hold" nodeType="withEffect">
-                                  <p:stCondLst>
-                                    <p:cond delay="0"/>
-                                  </p:stCondLst>
-                                  <p:childTnLst>
-                                    <p:set>
-                                      <p:cBhvr>
-                                        <p:cTn id="38" dur="1" fill="hold">
-                                          <p:stCondLst>
-                                            <p:cond delay="0"/>
-                                          </p:stCondLst>
-                                        </p:cTn>
-                                        <p:tgtEl>
-                                          <p:spTgt spid="17"/>
-                                        </p:tgtEl>
-                                        <p:attrNameLst>
-                                          <p:attrName>style.visibility</p:attrName>
-                                        </p:attrNameLst>
-                                      </p:cBhvr>
-                                      <p:to>
-                                        <p:strVal val="visible"/>
                                       </p:to>
                                     </p:set>
                                   </p:childTnLst>
@@ -11295,7 +11590,7 @@
                                           </p:stCondLst>
                                         </p:cTn>
                                         <p:tgtEl>
-                                          <p:spTgt spid="25"/>
+                                          <p:spTgt spid="21"/>
                                         </p:tgtEl>
                                         <p:attrNameLst>
                                           <p:attrName>style.visibility</p:attrName>
@@ -11322,7 +11617,7 @@
                                           </p:stCondLst>
                                         </p:cTn>
                                         <p:tgtEl>
-                                          <p:spTgt spid="19"/>
+                                          <p:spTgt spid="17"/>
                                         </p:tgtEl>
                                         <p:attrNameLst>
                                           <p:attrName>style.visibility</p:attrName>
@@ -11336,7 +11631,7 @@
                                 </p:cTn>
                               </p:par>
                               <p:par>
-                                <p:cTn id="45" presetID="1" presetClass="entr" presetSubtype="0" fill="hold" nodeType="withEffect">
+                                <p:cTn id="45" presetID="1" presetClass="exit" presetSubtype="0" fill="hold" grpId="0" nodeType="withEffect">
                                   <p:stCondLst>
                                     <p:cond delay="0"/>
                                   </p:stCondLst>
@@ -11349,127 +11644,28 @@
                                           </p:stCondLst>
                                         </p:cTn>
                                         <p:tgtEl>
-                                          <p:spTgt spid="1026"/>
+                                          <p:spTgt spid="6"/>
                                         </p:tgtEl>
                                         <p:attrNameLst>
                                           <p:attrName>style.visibility</p:attrName>
                                         </p:attrNameLst>
                                       </p:cBhvr>
                                       <p:to>
-                                        <p:strVal val="visible"/>
+                                        <p:strVal val="hidden"/>
                                       </p:to>
                                     </p:set>
                                   </p:childTnLst>
                                 </p:cTn>
                               </p:par>
-                            </p:childTnLst>
-                          </p:cTn>
-                        </p:par>
-                      </p:childTnLst>
-                    </p:cTn>
-                  </p:par>
-                  <p:par>
-                    <p:cTn id="47" fill="hold">
-                      <p:stCondLst>
-                        <p:cond delay="indefinite"/>
-                      </p:stCondLst>
-                      <p:childTnLst>
-                        <p:par>
-                          <p:cTn id="48" fill="hold">
-                            <p:stCondLst>
-                              <p:cond delay="0"/>
-                            </p:stCondLst>
-                            <p:childTnLst>
                               <p:par>
-                                <p:cTn id="49" presetID="1" presetClass="entr" presetSubtype="0" fill="hold" nodeType="clickEffect">
+                                <p:cTn id="47" presetID="1" presetClass="entr" presetSubtype="0" fill="hold" grpId="0" nodeType="withEffect">
                                   <p:stCondLst>
                                     <p:cond delay="0"/>
                                   </p:stCondLst>
                                   <p:childTnLst>
                                     <p:set>
                                       <p:cBhvr>
-                                        <p:cTn id="50" dur="1" fill="hold">
-                                          <p:stCondLst>
-                                            <p:cond delay="0"/>
-                                          </p:stCondLst>
-                                        </p:cTn>
-                                        <p:tgtEl>
-                                          <p:spTgt spid="29"/>
-                                        </p:tgtEl>
-                                        <p:attrNameLst>
-                                          <p:attrName>style.visibility</p:attrName>
-                                        </p:attrNameLst>
-                                      </p:cBhvr>
-                                      <p:to>
-                                        <p:strVal val="visible"/>
-                                      </p:to>
-                                    </p:set>
-                                  </p:childTnLst>
-                                </p:cTn>
-                              </p:par>
-                              <p:par>
-                                <p:cTn id="51" presetID="1" presetClass="entr" presetSubtype="0" fill="hold" grpId="0" nodeType="withEffect">
-                                  <p:stCondLst>
-                                    <p:cond delay="0"/>
-                                  </p:stCondLst>
-                                  <p:childTnLst>
-                                    <p:set>
-                                      <p:cBhvr>
-                                        <p:cTn id="52" dur="1" fill="hold">
-                                          <p:stCondLst>
-                                            <p:cond delay="0"/>
-                                          </p:stCondLst>
-                                        </p:cTn>
-                                        <p:tgtEl>
-                                          <p:spTgt spid="35"/>
-                                        </p:tgtEl>
-                                        <p:attrNameLst>
-                                          <p:attrName>style.visibility</p:attrName>
-                                        </p:attrNameLst>
-                                      </p:cBhvr>
-                                      <p:to>
-                                        <p:strVal val="visible"/>
-                                      </p:to>
-                                    </p:set>
-                                  </p:childTnLst>
-                                </p:cTn>
-                              </p:par>
-                              <p:par>
-                                <p:cTn id="53" presetID="1" presetClass="entr" presetSubtype="0" fill="hold" nodeType="withEffect">
-                                  <p:stCondLst>
-                                    <p:cond delay="0"/>
-                                  </p:stCondLst>
-                                  <p:childTnLst>
-                                    <p:set>
-                                      <p:cBhvr>
-                                        <p:cTn id="54" dur="1" fill="hold">
-                                          <p:stCondLst>
-                                            <p:cond delay="0"/>
-                                          </p:stCondLst>
-                                        </p:cTn>
-                                        <p:tgtEl>
-                                          <p:spTgt spid="30"/>
-                                        </p:tgtEl>
-                                        <p:attrNameLst>
-                                          <p:attrName>style.visibility</p:attrName>
-                                        </p:attrNameLst>
-                                      </p:cBhvr>
-                                      <p:to>
-                                        <p:strVal val="visible"/>
-                                      </p:to>
-                                    </p:set>
-                                  </p:childTnLst>
-                                </p:cTn>
-                              </p:par>
-                              <p:par>
-                                <p:cTn id="55" presetID="1" presetClass="entr" presetSubtype="0" fill="hold" grpId="0" nodeType="withEffect">
-                                  <p:stCondLst>
-                                    <p:cond delay="0"/>
-                                  </p:stCondLst>
-                                  <p:childTnLst>
-                                    <p:set>
-                                      <p:cBhvr>
-                                        <p:cTn id="56" dur="1" fill="hold">
+                                        <p:cTn id="48" dur="1" fill="hold">
                                           <p:stCondLst>
                                             <p:cond delay="0"/>
                                           </p:stCondLst>
@@ -11493,7 +11689,110 @@
                                 </p:cTn>
                               </p:par>
                               <p:par>
-                                <p:cTn id="57" presetID="1" presetClass="entr" presetSubtype="0" fill="hold" grpId="0" nodeType="withEffect">
+                                <p:cTn id="49" presetID="1" presetClass="entr" presetSubtype="0" fill="hold" grpId="0" nodeType="withEffect">
+                                  <p:stCondLst>
+                                    <p:cond delay="0"/>
+                                  </p:stCondLst>
+                                  <p:childTnLst>
+                                    <p:set>
+                                      <p:cBhvr>
+                                        <p:cTn id="50" dur="1" fill="hold">
+                                          <p:stCondLst>
+                                            <p:cond delay="0"/>
+                                          </p:stCondLst>
+                                        </p:cTn>
+                                        <p:tgtEl>
+                                          <p:spTgt spid="7">
+                                            <p:txEl>
+                                              <p:pRg st="1" end="1"/>
+                                            </p:txEl>
+                                          </p:spTgt>
+                                        </p:tgtEl>
+                                        <p:attrNameLst>
+                                          <p:attrName>style.visibility</p:attrName>
+                                        </p:attrNameLst>
+                                      </p:cBhvr>
+                                      <p:to>
+                                        <p:strVal val="visible"/>
+                                      </p:to>
+                                    </p:set>
+                                  </p:childTnLst>
+                                </p:cTn>
+                              </p:par>
+                            </p:childTnLst>
+                          </p:cTn>
+                        </p:par>
+                      </p:childTnLst>
+                    </p:cTn>
+                  </p:par>
+                  <p:par>
+                    <p:cTn id="51" fill="hold">
+                      <p:stCondLst>
+                        <p:cond delay="indefinite"/>
+                      </p:stCondLst>
+                      <p:childTnLst>
+                        <p:par>
+                          <p:cTn id="52" fill="hold">
+                            <p:stCondLst>
+                              <p:cond delay="0"/>
+                            </p:stCondLst>
+                            <p:childTnLst>
+                              <p:par>
+                                <p:cTn id="53" presetID="1" presetClass="entr" presetSubtype="0" fill="hold" nodeType="clickEffect">
+                                  <p:stCondLst>
+                                    <p:cond delay="0"/>
+                                  </p:stCondLst>
+                                  <p:childTnLst>
+                                    <p:set>
+                                      <p:cBhvr>
+                                        <p:cTn id="54" dur="1" fill="hold">
+                                          <p:stCondLst>
+                                            <p:cond delay="0"/>
+                                          </p:stCondLst>
+                                        </p:cTn>
+                                        <p:tgtEl>
+                                          <p:spTgt spid="25"/>
+                                        </p:tgtEl>
+                                        <p:attrNameLst>
+                                          <p:attrName>style.visibility</p:attrName>
+                                        </p:attrNameLst>
+                                      </p:cBhvr>
+                                      <p:to>
+                                        <p:strVal val="visible"/>
+                                      </p:to>
+                                    </p:set>
+                                  </p:childTnLst>
+                                </p:cTn>
+                              </p:par>
+                              <p:par>
+                                <p:cTn id="55" presetID="1" presetClass="entr" presetSubtype="0" fill="hold" nodeType="withEffect">
+                                  <p:stCondLst>
+                                    <p:cond delay="0"/>
+                                  </p:stCondLst>
+                                  <p:childTnLst>
+                                    <p:set>
+                                      <p:cBhvr>
+                                        <p:cTn id="56" dur="1" fill="hold">
+                                          <p:stCondLst>
+                                            <p:cond delay="0"/>
+                                          </p:stCondLst>
+                                        </p:cTn>
+                                        <p:tgtEl>
+                                          <p:spTgt spid="19"/>
+                                        </p:tgtEl>
+                                        <p:attrNameLst>
+                                          <p:attrName>style.visibility</p:attrName>
+                                        </p:attrNameLst>
+                                      </p:cBhvr>
+                                      <p:to>
+                                        <p:strVal val="visible"/>
+                                      </p:to>
+                                    </p:set>
+                                  </p:childTnLst>
+                                </p:cTn>
+                              </p:par>
+                              <p:par>
+                                <p:cTn id="57" presetID="1" presetClass="entr" presetSubtype="0" fill="hold" nodeType="withEffect">
                                   <p:stCondLst>
                                     <p:cond delay="0"/>
                                   </p:stCondLst>
@@ -11506,11 +11805,79 @@
                                           </p:stCondLst>
                                         </p:cTn>
                                         <p:tgtEl>
-                                          <p:spTgt spid="7">
-                                            <p:txEl>
-                                              <p:pRg st="1" end="1"/>
-                                            </p:txEl>
-                                          </p:spTgt>
+                                          <p:spTgt spid="1026"/>
+                                        </p:tgtEl>
+                                        <p:attrNameLst>
+                                          <p:attrName>style.visibility</p:attrName>
+                                        </p:attrNameLst>
+                                      </p:cBhvr>
+                                      <p:to>
+                                        <p:strVal val="visible"/>
+                                      </p:to>
+                                    </p:set>
+                                  </p:childTnLst>
+                                </p:cTn>
+                              </p:par>
+                              <p:par>
+                                <p:cTn id="59" presetID="1" presetClass="exit" presetSubtype="0" fill="hold" grpId="0" nodeType="withEffect">
+                                  <p:stCondLst>
+                                    <p:cond delay="0"/>
+                                  </p:stCondLst>
+                                  <p:childTnLst>
+                                    <p:set>
+                                      <p:cBhvr>
+                                        <p:cTn id="60" dur="1" fill="hold">
+                                          <p:stCondLst>
+                                            <p:cond delay="0"/>
+                                          </p:stCondLst>
+                                        </p:cTn>
+                                        <p:tgtEl>
+                                          <p:spTgt spid="11"/>
+                                        </p:tgtEl>
+                                        <p:attrNameLst>
+                                          <p:attrName>style.visibility</p:attrName>
+                                        </p:attrNameLst>
+                                      </p:cBhvr>
+                                      <p:to>
+                                        <p:strVal val="hidden"/>
+                                      </p:to>
+                                    </p:set>
+                                  </p:childTnLst>
+                                </p:cTn>
+                              </p:par>
+                            </p:childTnLst>
+                          </p:cTn>
+                        </p:par>
+                      </p:childTnLst>
+                    </p:cTn>
+                  </p:par>
+                  <p:par>
+                    <p:cTn id="61" fill="hold">
+                      <p:stCondLst>
+                        <p:cond delay="indefinite"/>
+                      </p:stCondLst>
+                      <p:childTnLst>
+                        <p:par>
+                          <p:cTn id="62" fill="hold">
+                            <p:stCondLst>
+                              <p:cond delay="0"/>
+                            </p:stCondLst>
+                            <p:childTnLst>
+                              <p:par>
+                                <p:cTn id="63" presetID="1" presetClass="entr" presetSubtype="0" fill="hold" grpId="0" nodeType="clickEffect">
+                                  <p:stCondLst>
+                                    <p:cond delay="0"/>
+                                  </p:stCondLst>
+                                  <p:childTnLst>
+                                    <p:set>
+                                      <p:cBhvr>
+                                        <p:cTn id="64" dur="1" fill="hold">
+                                          <p:stCondLst>
+                                            <p:cond delay="0"/>
+                                          </p:stCondLst>
+                                        </p:cTn>
+                                        <p:tgtEl>
+                                          <p:spTgt spid="35"/>
                                         </p:tgtEl>
                                         <p:attrNameLst>
                                           <p:attrName>style.visibility</p:attrName>
@@ -11559,6 +11926,9 @@
       <p:bldP spid="16" grpId="0" animBg="1"/>
       <p:bldP spid="20" grpId="0" animBg="1"/>
       <p:bldP spid="20" grpId="1" animBg="1"/>
+      <p:bldP spid="3" grpId="0" animBg="1"/>
+      <p:bldP spid="6" grpId="0" animBg="1"/>
+      <p:bldP spid="11" grpId="0" animBg="1"/>
     </p:bldLst>
   </p:timing>
 </p:sld>
@@ -11806,7 +12176,7 @@
           <p:nvPr>
             <p:extLst>
               <p:ext uri="{D42A27DB-BD31-4B8C-83A1-F6EECF244321}">
-                <p14:modId xmlns:p14="http://schemas.microsoft.com/office/powerpoint/2010/main" val="3630831540"/>
+                <p14:modId xmlns:p14="http://schemas.microsoft.com/office/powerpoint/2010/main" val="1019832509"/>
               </p:ext>
             </p:extLst>
           </p:nvPr>
@@ -12287,7 +12657,7 @@
                     <a:bodyPr/>
                     <a:lstStyle/>
                     <a:p>
-                      <a:pPr algn="ctr"/>
+                      <a:pPr algn="l"/>
                       <a:r>
                         <a:rPr lang="en-GB" sz="900" dirty="0"/>
                         <a:t>Light Stimulation</a:t>
@@ -13219,7 +13589,7 @@
         </p:nvCxnSpPr>
         <p:spPr>
           <a:xfrm>
-            <a:off x="511228" y="3791218"/>
+            <a:off x="511228" y="3820558"/>
             <a:ext cx="5266484" cy="0"/>
           </a:xfrm>
           <a:prstGeom prst="straightConnector1">
@@ -13995,6 +14365,165 @@
           </p:txBody>
         </p:sp>
       </p:grpSp>
+      <p:sp>
+        <p:nvSpPr>
+          <p:cNvPr id="3" name="Rectangle 2">
+            <a:extLst>
+              <a:ext uri="{FF2B5EF4-FFF2-40B4-BE49-F238E27FC236}">
+                <a16:creationId xmlns:a16="http://schemas.microsoft.com/office/drawing/2014/main" id="{1FA74782-E8E7-5B45-6CA4-3A15B995829C}"/>
+              </a:ext>
+            </a:extLst>
+          </p:cNvPr>
+          <p:cNvSpPr/>
+          <p:nvPr/>
+        </p:nvSpPr>
+        <p:spPr>
+          <a:xfrm>
+            <a:off x="2342233" y="2136857"/>
+            <a:ext cx="787264" cy="1618537"/>
+          </a:xfrm>
+          <a:prstGeom prst="rect">
+            <a:avLst/>
+          </a:prstGeom>
+          <a:solidFill>
+            <a:schemeClr val="bg1"/>
+          </a:solidFill>
+          <a:ln>
+            <a:solidFill>
+              <a:schemeClr val="bg1"/>
+            </a:solidFill>
+          </a:ln>
+          <a:effectLst/>
+        </p:spPr>
+        <p:style>
+          <a:lnRef idx="1">
+            <a:schemeClr val="accent1"/>
+          </a:lnRef>
+          <a:fillRef idx="3">
+            <a:schemeClr val="accent1"/>
+          </a:fillRef>
+          <a:effectRef idx="2">
+            <a:schemeClr val="accent1"/>
+          </a:effectRef>
+          <a:fontRef idx="minor">
+            <a:schemeClr val="lt1"/>
+          </a:fontRef>
+        </p:style>
+        <p:txBody>
+          <a:bodyPr rtlCol="0" anchor="ctr"/>
+          <a:lstStyle/>
+          <a:p>
+            <a:pPr algn="ctr"/>
+            <a:endParaRPr lang="en-GB"/>
+          </a:p>
+        </p:txBody>
+      </p:sp>
+      <p:sp>
+        <p:nvSpPr>
+          <p:cNvPr id="6" name="Rectangle 5">
+            <a:extLst>
+              <a:ext uri="{FF2B5EF4-FFF2-40B4-BE49-F238E27FC236}">
+                <a16:creationId xmlns:a16="http://schemas.microsoft.com/office/drawing/2014/main" id="{C3FC5F31-CA29-FC22-1FE5-D2472130CFFF}"/>
+              </a:ext>
+            </a:extLst>
+          </p:cNvPr>
+          <p:cNvSpPr/>
+          <p:nvPr/>
+        </p:nvSpPr>
+        <p:spPr>
+          <a:xfrm>
+            <a:off x="3139276" y="2141747"/>
+            <a:ext cx="1129553" cy="1618537"/>
+          </a:xfrm>
+          <a:prstGeom prst="rect">
+            <a:avLst/>
+          </a:prstGeom>
+          <a:solidFill>
+            <a:schemeClr val="bg1"/>
+          </a:solidFill>
+          <a:ln>
+            <a:solidFill>
+              <a:schemeClr val="bg1"/>
+            </a:solidFill>
+          </a:ln>
+          <a:effectLst/>
+        </p:spPr>
+        <p:style>
+          <a:lnRef idx="1">
+            <a:schemeClr val="accent1"/>
+          </a:lnRef>
+          <a:fillRef idx="3">
+            <a:schemeClr val="accent1"/>
+          </a:fillRef>
+          <a:effectRef idx="2">
+            <a:schemeClr val="accent1"/>
+          </a:effectRef>
+          <a:fontRef idx="minor">
+            <a:schemeClr val="lt1"/>
+          </a:fontRef>
+        </p:style>
+        <p:txBody>
+          <a:bodyPr rtlCol="0" anchor="ctr"/>
+          <a:lstStyle/>
+          <a:p>
+            <a:pPr algn="ctr"/>
+            <a:endParaRPr lang="en-GB"/>
+          </a:p>
+        </p:txBody>
+      </p:sp>
+      <p:sp>
+        <p:nvSpPr>
+          <p:cNvPr id="11" name="Rectangle 10">
+            <a:extLst>
+              <a:ext uri="{FF2B5EF4-FFF2-40B4-BE49-F238E27FC236}">
+                <a16:creationId xmlns:a16="http://schemas.microsoft.com/office/drawing/2014/main" id="{DC774599-0EE8-D533-971D-69AFC7C23189}"/>
+              </a:ext>
+            </a:extLst>
+          </p:cNvPr>
+          <p:cNvSpPr/>
+          <p:nvPr/>
+        </p:nvSpPr>
+        <p:spPr>
+          <a:xfrm>
+            <a:off x="4278609" y="2146637"/>
+            <a:ext cx="1508880" cy="1618537"/>
+          </a:xfrm>
+          <a:prstGeom prst="rect">
+            <a:avLst/>
+          </a:prstGeom>
+          <a:solidFill>
+            <a:schemeClr val="bg1"/>
+          </a:solidFill>
+          <a:ln>
+            <a:solidFill>
+              <a:schemeClr val="bg1"/>
+            </a:solidFill>
+          </a:ln>
+          <a:effectLst/>
+        </p:spPr>
+        <p:style>
+          <a:lnRef idx="1">
+            <a:schemeClr val="accent1"/>
+          </a:lnRef>
+          <a:fillRef idx="3">
+            <a:schemeClr val="accent1"/>
+          </a:fillRef>
+          <a:effectRef idx="2">
+            <a:schemeClr val="accent1"/>
+          </a:effectRef>
+          <a:fontRef idx="minor">
+            <a:schemeClr val="lt1"/>
+          </a:fontRef>
+        </p:style>
+        <p:txBody>
+          <a:bodyPr rtlCol="0" anchor="ctr"/>
+          <a:lstStyle/>
+          <a:p>
+            <a:pPr algn="ctr"/>
+            <a:endParaRPr lang="en-GB"/>
+          </a:p>
+        </p:txBody>
+      </p:sp>
     </p:spTree>
     <p:extLst>
       <p:ext uri="{BB962C8B-B14F-4D97-AF65-F5344CB8AC3E}">
@@ -14334,6 +14863,60 @@
                                   </p:childTnLst>
                                 </p:cTn>
                               </p:par>
+                              <p:par>
+                                <p:cTn id="29" presetID="1" presetClass="entr" presetSubtype="0" fill="hold" nodeType="withEffect">
+                                  <p:stCondLst>
+                                    <p:cond delay="0"/>
+                                  </p:stCondLst>
+                                  <p:childTnLst>
+                                    <p:set>
+                                      <p:cBhvr>
+                                        <p:cTn id="30" dur="1" fill="hold">
+                                          <p:stCondLst>
+                                            <p:cond delay="0"/>
+                                          </p:stCondLst>
+                                        </p:cTn>
+                                        <p:tgtEl>
+                                          <p:spTgt spid="29"/>
+                                        </p:tgtEl>
+                                        <p:attrNameLst>
+                                          <p:attrName>style.visibility</p:attrName>
+                                        </p:attrNameLst>
+                                      </p:cBhvr>
+                                      <p:to>
+                                        <p:strVal val="visible"/>
+                                      </p:to>
+                                    </p:set>
+                                  </p:childTnLst>
+                                </p:cTn>
+                              </p:par>
+                              <p:par>
+                                <p:cTn id="31" presetID="1" presetClass="entr" presetSubtype="0" fill="hold" nodeType="withEffect">
+                                  <p:stCondLst>
+                                    <p:cond delay="0"/>
+                                  </p:stCondLst>
+                                  <p:childTnLst>
+                                    <p:set>
+                                      <p:cBhvr>
+                                        <p:cTn id="32" dur="1" fill="hold">
+                                          <p:stCondLst>
+                                            <p:cond delay="0"/>
+                                          </p:stCondLst>
+                                        </p:cTn>
+                                        <p:tgtEl>
+                                          <p:spTgt spid="30"/>
+                                        </p:tgtEl>
+                                        <p:attrNameLst>
+                                          <p:attrName>style.visibility</p:attrName>
+                                        </p:attrNameLst>
+                                      </p:cBhvr>
+                                      <p:to>
+                                        <p:strVal val="visible"/>
+                                      </p:to>
+                                    </p:set>
+                                  </p:childTnLst>
+                                </p:cTn>
+                              </p:par>
                             </p:childTnLst>
                           </p:cTn>
                         </p:par>
@@ -14341,26 +14924,26 @@
                     </p:cTn>
                   </p:par>
                   <p:par>
-                    <p:cTn id="29" fill="hold">
+                    <p:cTn id="33" fill="hold">
                       <p:stCondLst>
                         <p:cond delay="indefinite"/>
                       </p:stCondLst>
                       <p:childTnLst>
                         <p:par>
-                          <p:cTn id="30" fill="hold">
+                          <p:cTn id="34" fill="hold">
                             <p:stCondLst>
                               <p:cond delay="0"/>
                             </p:stCondLst>
                             <p:childTnLst>
                               <p:par>
-                                <p:cTn id="31" presetID="1" presetClass="entr" presetSubtype="0" fill="hold" nodeType="clickEffect">
+                                <p:cTn id="35" presetID="1" presetClass="entr" presetSubtype="0" fill="hold" nodeType="clickEffect">
                                   <p:stCondLst>
                                     <p:cond delay="0"/>
                                   </p:stCondLst>
                                   <p:childTnLst>
                                     <p:set>
                                       <p:cBhvr>
-                                        <p:cTn id="32" dur="1" fill="hold">
+                                        <p:cTn id="36" dur="1" fill="hold">
                                           <p:stCondLst>
                                             <p:cond delay="0"/>
                                           </p:stCondLst>
@@ -14380,14 +14963,41 @@
                                 </p:cTn>
                               </p:par>
                               <p:par>
-                                <p:cTn id="33" presetID="1" presetClass="exit" presetSubtype="0" fill="hold" grpId="1" nodeType="withEffect">
+                                <p:cTn id="37" presetID="1" presetClass="exit" presetSubtype="0" fill="hold" grpId="0" nodeType="withEffect">
                                   <p:stCondLst>
                                     <p:cond delay="0"/>
                                   </p:stCondLst>
                                   <p:childTnLst>
                                     <p:set>
                                       <p:cBhvr>
-                                        <p:cTn id="34" dur="1" fill="hold">
+                                        <p:cTn id="38" dur="1" fill="hold">
+                                          <p:stCondLst>
+                                            <p:cond delay="0"/>
+                                          </p:stCondLst>
+                                        </p:cTn>
+                                        <p:tgtEl>
+                                          <p:spTgt spid="3"/>
+                                        </p:tgtEl>
+                                        <p:attrNameLst>
+                                          <p:attrName>style.visibility</p:attrName>
+                                        </p:attrNameLst>
+                                      </p:cBhvr>
+                                      <p:to>
+                                        <p:strVal val="hidden"/>
+                                      </p:to>
+                                    </p:set>
+                                  </p:childTnLst>
+                                </p:cTn>
+                              </p:par>
+                              <p:par>
+                                <p:cTn id="39" presetID="1" presetClass="exit" presetSubtype="0" fill="hold" grpId="1" nodeType="withEffect">
+                                  <p:stCondLst>
+                                    <p:cond delay="0"/>
+                                  </p:stCondLst>
+                                  <p:childTnLst>
+                                    <p:set>
+                                      <p:cBhvr>
+                                        <p:cTn id="40" dur="1" fill="hold">
                                           <p:stCondLst>
                                             <p:cond delay="0"/>
                                           </p:stCondLst>
@@ -14401,78 +15011,6 @@
                                       </p:cBhvr>
                                       <p:to>
                                         <p:strVal val="hidden"/>
-                                      </p:to>
-                                    </p:set>
-                                  </p:childTnLst>
-                                </p:cTn>
-                              </p:par>
-                            </p:childTnLst>
-                          </p:cTn>
-                        </p:par>
-                      </p:childTnLst>
-                    </p:cTn>
-                  </p:par>
-                  <p:par>
-                    <p:cTn id="35" fill="hold">
-                      <p:stCondLst>
-                        <p:cond delay="indefinite"/>
-                      </p:stCondLst>
-                      <p:childTnLst>
-                        <p:par>
-                          <p:cTn id="36" fill="hold">
-                            <p:stCondLst>
-                              <p:cond delay="0"/>
-                            </p:stCondLst>
-                            <p:childTnLst>
-                              <p:par>
-                                <p:cTn id="37" presetID="1" presetClass="entr" presetSubtype="0" fill="hold" nodeType="clickEffect">
-                                  <p:stCondLst>
-                                    <p:cond delay="0"/>
-                                  </p:stCondLst>
-                                  <p:childTnLst>
-                                    <p:set>
-                                      <p:cBhvr>
-                                        <p:cTn id="38" dur="1" fill="hold">
-                                          <p:stCondLst>
-                                            <p:cond delay="0"/>
-                                          </p:stCondLst>
-                                        </p:cTn>
-                                        <p:tgtEl>
-                                          <p:spTgt spid="47"/>
-                                        </p:tgtEl>
-                                        <p:attrNameLst>
-                                          <p:attrName>style.visibility</p:attrName>
-                                        </p:attrNameLst>
-                                      </p:cBhvr>
-                                      <p:to>
-                                        <p:strVal val="visible"/>
-                                      </p:to>
-                                    </p:set>
-                                  </p:childTnLst>
-                                </p:cTn>
-                              </p:par>
-                              <p:par>
-                                <p:cTn id="39" presetID="1" presetClass="entr" presetSubtype="0" fill="hold" nodeType="withEffect">
-                                  <p:stCondLst>
-                                    <p:cond delay="0"/>
-                                  </p:stCondLst>
-                                  <p:childTnLst>
-                                    <p:set>
-                                      <p:cBhvr>
-                                        <p:cTn id="40" dur="1" fill="hold">
-                                          <p:stCondLst>
-                                            <p:cond delay="0"/>
-                                          </p:stCondLst>
-                                        </p:cTn>
-                                        <p:tgtEl>
-                                          <p:spTgt spid="40"/>
-                                        </p:tgtEl>
-                                        <p:attrNameLst>
-                                          <p:attrName>style.visibility</p:attrName>
-                                        </p:attrNameLst>
-                                      </p:cBhvr>
-                                      <p:to>
-                                        <p:strVal val="visible"/>
                                       </p:to>
                                     </p:set>
                                   </p:childTnLst>
@@ -14510,7 +15048,7 @@
                                           </p:stCondLst>
                                         </p:cTn>
                                         <p:tgtEl>
-                                          <p:spTgt spid="25"/>
+                                          <p:spTgt spid="47"/>
                                         </p:tgtEl>
                                         <p:attrNameLst>
                                           <p:attrName>style.visibility</p:attrName>
@@ -14537,7 +15075,7 @@
                                           </p:stCondLst>
                                         </p:cTn>
                                         <p:tgtEl>
-                                          <p:spTgt spid="19"/>
+                                          <p:spTgt spid="40"/>
                                         </p:tgtEl>
                                         <p:attrNameLst>
                                           <p:attrName>style.visibility</p:attrName>
@@ -14551,7 +15089,7 @@
                                 </p:cTn>
                               </p:par>
                               <p:par>
-                                <p:cTn id="47" presetID="1" presetClass="entr" presetSubtype="0" fill="hold" nodeType="withEffect">
+                                <p:cTn id="47" presetID="1" presetClass="exit" presetSubtype="0" fill="hold" grpId="0" nodeType="withEffect">
                                   <p:stCondLst>
                                     <p:cond delay="0"/>
                                   </p:stCondLst>
@@ -14564,14 +15102,14 @@
                                           </p:stCondLst>
                                         </p:cTn>
                                         <p:tgtEl>
-                                          <p:spTgt spid="1026"/>
+                                          <p:spTgt spid="6"/>
                                         </p:tgtEl>
                                         <p:attrNameLst>
                                           <p:attrName>style.visibility</p:attrName>
                                         </p:attrNameLst>
                                       </p:cBhvr>
                                       <p:to>
-                                        <p:strVal val="visible"/>
+                                        <p:strVal val="hidden"/>
                                       </p:to>
                                     </p:set>
                                   </p:childTnLst>
@@ -14609,7 +15147,7 @@
                                           </p:stCondLst>
                                         </p:cTn>
                                         <p:tgtEl>
-                                          <p:spTgt spid="29"/>
+                                          <p:spTgt spid="25"/>
                                         </p:tgtEl>
                                         <p:attrNameLst>
                                           <p:attrName>style.visibility</p:attrName>
@@ -14623,7 +15161,7 @@
                                 </p:cTn>
                               </p:par>
                               <p:par>
-                                <p:cTn id="53" presetID="1" presetClass="entr" presetSubtype="0" fill="hold" grpId="0" nodeType="withEffect">
+                                <p:cTn id="53" presetID="1" presetClass="entr" presetSubtype="0" fill="hold" nodeType="withEffect">
                                   <p:stCondLst>
                                     <p:cond delay="0"/>
                                   </p:stCondLst>
@@ -14636,7 +15174,7 @@
                                           </p:stCondLst>
                                         </p:cTn>
                                         <p:tgtEl>
-                                          <p:spTgt spid="35"/>
+                                          <p:spTgt spid="19"/>
                                         </p:tgtEl>
                                         <p:attrNameLst>
                                           <p:attrName>style.visibility</p:attrName>
@@ -14663,7 +15201,79 @@
                                           </p:stCondLst>
                                         </p:cTn>
                                         <p:tgtEl>
-                                          <p:spTgt spid="30"/>
+                                          <p:spTgt spid="1026"/>
+                                        </p:tgtEl>
+                                        <p:attrNameLst>
+                                          <p:attrName>style.visibility</p:attrName>
+                                        </p:attrNameLst>
+                                      </p:cBhvr>
+                                      <p:to>
+                                        <p:strVal val="visible"/>
+                                      </p:to>
+                                    </p:set>
+                                  </p:childTnLst>
+                                </p:cTn>
+                              </p:par>
+                              <p:par>
+                                <p:cTn id="57" presetID="1" presetClass="exit" presetSubtype="0" fill="hold" grpId="0" nodeType="withEffect">
+                                  <p:stCondLst>
+                                    <p:cond delay="0"/>
+                                  </p:stCondLst>
+                                  <p:childTnLst>
+                                    <p:set>
+                                      <p:cBhvr>
+                                        <p:cTn id="58" dur="1" fill="hold">
+                                          <p:stCondLst>
+                                            <p:cond delay="0"/>
+                                          </p:stCondLst>
+                                        </p:cTn>
+                                        <p:tgtEl>
+                                          <p:spTgt spid="11"/>
+                                        </p:tgtEl>
+                                        <p:attrNameLst>
+                                          <p:attrName>style.visibility</p:attrName>
+                                        </p:attrNameLst>
+                                      </p:cBhvr>
+                                      <p:to>
+                                        <p:strVal val="hidden"/>
+                                      </p:to>
+                                    </p:set>
+                                  </p:childTnLst>
+                                </p:cTn>
+                              </p:par>
+                            </p:childTnLst>
+                          </p:cTn>
+                        </p:par>
+                      </p:childTnLst>
+                    </p:cTn>
+                  </p:par>
+                  <p:par>
+                    <p:cTn id="59" fill="hold">
+                      <p:stCondLst>
+                        <p:cond delay="indefinite"/>
+                      </p:stCondLst>
+                      <p:childTnLst>
+                        <p:par>
+                          <p:cTn id="60" fill="hold">
+                            <p:stCondLst>
+                              <p:cond delay="0"/>
+                            </p:stCondLst>
+                            <p:childTnLst>
+                              <p:par>
+                                <p:cTn id="61" presetID="1" presetClass="entr" presetSubtype="0" fill="hold" grpId="0" nodeType="clickEffect">
+                                  <p:stCondLst>
+                                    <p:cond delay="0"/>
+                                  </p:stCondLst>
+                                  <p:childTnLst>
+                                    <p:set>
+                                      <p:cBhvr>
+                                        <p:cTn id="62" dur="1" fill="hold">
+                                          <p:stCondLst>
+                                            <p:cond delay="0"/>
+                                          </p:stCondLst>
+                                        </p:cTn>
+                                        <p:tgtEl>
+                                          <p:spTgt spid="35"/>
                                         </p:tgtEl>
                                         <p:attrNameLst>
                                           <p:attrName>style.visibility</p:attrName>
@@ -14711,6 +15321,9 @@
       <p:bldP spid="16" grpId="0" animBg="1"/>
       <p:bldP spid="20" grpId="0" animBg="1"/>
       <p:bldP spid="20" grpId="1" animBg="1"/>
+      <p:bldP spid="3" grpId="0" animBg="1"/>
+      <p:bldP spid="6" grpId="0" animBg="1"/>
+      <p:bldP spid="11" grpId="0" animBg="1"/>
     </p:bldLst>
   </p:timing>
 </p:sld>
@@ -14808,8 +15421,8 @@
         </p:nvSpPr>
         <p:spPr>
           <a:xfrm>
-            <a:off x="900000" y="1080001"/>
-            <a:ext cx="4922302" cy="2609945"/>
+            <a:off x="899999" y="1080001"/>
+            <a:ext cx="6737929" cy="3200876"/>
           </a:xfrm>
         </p:spPr>
         <p:txBody>
@@ -14828,7 +15441,17 @@
             </a:pPr>
             <a:r>
               <a:rPr lang="en-GB" dirty="0"/>
-              <a:t>MEG: 1.5 hrs / person, single session</a:t>
+              <a:t>MEG: 1.5 hrs / person, single session			(incl. prep.)</a:t>
+            </a:r>
+          </a:p>
+          <a:p>
+            <a:pPr marL="285750" indent="-285750">
+              <a:buFont typeface="Arial" panose="020B0604020202020204" pitchFamily="34" charset="0"/>
+              <a:buChar char="•"/>
+            </a:pPr>
+            <a:r>
+              <a:rPr lang="en-GB" dirty="0"/>
+              <a:t>Structural MRI: 30 min / person, single session	(incl. prep.)</a:t>
             </a:r>
           </a:p>
           <a:p>
@@ -14873,7 +15496,16 @@
               <a:rPr lang="en-GB" dirty="0"/>
               <a:t>1.5 hrs x 30 = 45 hrs 	MEG lab</a:t>
             </a:r>
-            <a:endParaRPr lang="en-GB" sz="1600" dirty="0"/>
+          </a:p>
+          <a:p>
+            <a:pPr marL="285750" indent="-285750">
+              <a:buFont typeface="Arial" panose="020B0604020202020204" pitchFamily="34" charset="0"/>
+              <a:buChar char="•"/>
+            </a:pPr>
+            <a:r>
+              <a:rPr lang="en-GB" sz="1600" dirty="0"/>
+              <a:t>30 min x 30 = 15 hrs</a:t>
+            </a:r>
           </a:p>
           <a:p>
             <a:endParaRPr lang="en-GB" dirty="0"/>
@@ -15052,7 +15684,7 @@
                                         <p:tgtEl>
                                           <p:spTgt spid="5">
                                             <p:txEl>
-                                              <p:pRg st="3" end="3"/>
+                                              <p:pRg st="2" end="2"/>
                                             </p:txEl>
                                           </p:spTgt>
                                         </p:tgtEl>
@@ -15116,23 +15748,41 @@
                                   </p:childTnLst>
                                 </p:cTn>
                               </p:par>
+                            </p:childTnLst>
+                          </p:cTn>
+                        </p:par>
+                      </p:childTnLst>
+                    </p:cTn>
+                  </p:par>
+                  <p:par>
+                    <p:cTn id="19" fill="hold">
+                      <p:stCondLst>
+                        <p:cond delay="indefinite"/>
+                      </p:stCondLst>
+                      <p:childTnLst>
+                        <p:par>
+                          <p:cTn id="20" fill="hold">
+                            <p:stCondLst>
+                              <p:cond delay="0"/>
+                            </p:stCondLst>
+                            <p:childTnLst>
                               <p:par>
-                                <p:cTn id="19" presetID="1" presetClass="entr" presetSubtype="0" fill="hold" grpId="0" nodeType="withEffect">
+                                <p:cTn id="21" presetID="1" presetClass="entr" presetSubtype="0" fill="hold" grpId="0" nodeType="clickEffect">
                                   <p:stCondLst>
                                     <p:cond delay="0"/>
                                   </p:stCondLst>
                                   <p:childTnLst>
                                     <p:set>
                                       <p:cBhvr>
-                                        <p:cTn id="20" dur="1" fill="hold">
+                                        <p:cTn id="22" dur="1" fill="hold">
                                           <p:stCondLst>
                                             <p:cond delay="0"/>
                                           </p:stCondLst>
                                         </p:cTn>
                                         <p:tgtEl>
-                                          <p:spTgt spid="7">
+                                          <p:spTgt spid="5">
                                             <p:txEl>
-                                              <p:pRg st="0" end="0"/>
+                                              <p:pRg st="5" end="5"/>
                                             </p:txEl>
                                           </p:spTgt>
                                         </p:tgtEl>
@@ -15147,26 +15797,8 @@
                                   </p:childTnLst>
                                 </p:cTn>
                               </p:par>
-                            </p:childTnLst>
-                          </p:cTn>
-                        </p:par>
-                      </p:childTnLst>
-                    </p:cTn>
-                  </p:par>
-                  <p:par>
-                    <p:cTn id="21" fill="hold">
-                      <p:stCondLst>
-                        <p:cond delay="indefinite"/>
-                      </p:stCondLst>
-                      <p:childTnLst>
-                        <p:par>
-                          <p:cTn id="22" fill="hold">
-                            <p:stCondLst>
-                              <p:cond delay="0"/>
-                            </p:stCondLst>
-                            <p:childTnLst>
                               <p:par>
-                                <p:cTn id="23" presetID="1" presetClass="entr" presetSubtype="0" fill="hold" grpId="0" nodeType="clickEffect">
+                                <p:cTn id="23" presetID="1" presetClass="entr" presetSubtype="0" fill="hold" grpId="0" nodeType="withEffect">
                                   <p:stCondLst>
                                     <p:cond delay="0"/>
                                   </p:stCondLst>
@@ -15179,9 +15811,9 @@
                                           </p:stCondLst>
                                         </p:cTn>
                                         <p:tgtEl>
-                                          <p:spTgt spid="5">
+                                          <p:spTgt spid="7">
                                             <p:txEl>
-                                              <p:pRg st="6" end="6"/>
+                                              <p:pRg st="0" end="0"/>
                                             </p:txEl>
                                           </p:spTgt>
                                         </p:tgtEl>
@@ -15231,6 +15863,104 @@
                                           <p:spTgt spid="5">
                                             <p:txEl>
                                               <p:pRg st="7" end="7"/>
+                                            </p:txEl>
+                                          </p:spTgt>
+                                        </p:tgtEl>
+                                        <p:attrNameLst>
+                                          <p:attrName>style.visibility</p:attrName>
+                                        </p:attrNameLst>
+                                      </p:cBhvr>
+                                      <p:to>
+                                        <p:strVal val="visible"/>
+                                      </p:to>
+                                    </p:set>
+                                  </p:childTnLst>
+                                </p:cTn>
+                              </p:par>
+                            </p:childTnLst>
+                          </p:cTn>
+                        </p:par>
+                      </p:childTnLst>
+                    </p:cTn>
+                  </p:par>
+                  <p:par>
+                    <p:cTn id="29" fill="hold">
+                      <p:stCondLst>
+                        <p:cond delay="indefinite"/>
+                      </p:stCondLst>
+                      <p:childTnLst>
+                        <p:par>
+                          <p:cTn id="30" fill="hold">
+                            <p:stCondLst>
+                              <p:cond delay="0"/>
+                            </p:stCondLst>
+                            <p:childTnLst>
+                              <p:par>
+                                <p:cTn id="31" presetID="1" presetClass="entr" presetSubtype="0" fill="hold" grpId="0" nodeType="clickEffect">
+                                  <p:stCondLst>
+                                    <p:cond delay="0"/>
+                                  </p:stCondLst>
+                                  <p:childTnLst>
+                                    <p:set>
+                                      <p:cBhvr>
+                                        <p:cTn id="32" dur="1" fill="hold">
+                                          <p:stCondLst>
+                                            <p:cond delay="0"/>
+                                          </p:stCondLst>
+                                        </p:cTn>
+                                        <p:tgtEl>
+                                          <p:spTgt spid="5">
+                                            <p:txEl>
+                                              <p:pRg st="8" end="8"/>
+                                            </p:txEl>
+                                          </p:spTgt>
+                                        </p:tgtEl>
+                                        <p:attrNameLst>
+                                          <p:attrName>style.visibility</p:attrName>
+                                        </p:attrNameLst>
+                                      </p:cBhvr>
+                                      <p:to>
+                                        <p:strVal val="visible"/>
+                                      </p:to>
+                                    </p:set>
+                                  </p:childTnLst>
+                                </p:cTn>
+                              </p:par>
+                            </p:childTnLst>
+                          </p:cTn>
+                        </p:par>
+                      </p:childTnLst>
+                    </p:cTn>
+                  </p:par>
+                  <p:par>
+                    <p:cTn id="33" fill="hold">
+                      <p:stCondLst>
+                        <p:cond delay="indefinite"/>
+                      </p:stCondLst>
+                      <p:childTnLst>
+                        <p:par>
+                          <p:cTn id="34" fill="hold">
+                            <p:stCondLst>
+                              <p:cond delay="0"/>
+                            </p:stCondLst>
+                            <p:childTnLst>
+                              <p:par>
+                                <p:cTn id="35" presetID="1" presetClass="entr" presetSubtype="0" fill="hold" grpId="0" nodeType="clickEffect">
+                                  <p:stCondLst>
+                                    <p:cond delay="0"/>
+                                  </p:stCondLst>
+                                  <p:childTnLst>
+                                    <p:set>
+                                      <p:cBhvr>
+                                        <p:cTn id="36" dur="1" fill="hold">
+                                          <p:stCondLst>
+                                            <p:cond delay="0"/>
+                                          </p:stCondLst>
+                                        </p:cTn>
+                                        <p:tgtEl>
+                                          <p:spTgt spid="5">
+                                            <p:txEl>
+                                              <p:pRg st="9" end="9"/>
                                             </p:txEl>
                                           </p:spTgt>
                                         </p:tgtEl>
@@ -16115,6 +16845,37 @@
                                   </p:childTnLst>
                                 </p:cTn>
                               </p:par>
+                              <p:par>
+                                <p:cTn id="27" presetID="1" presetClass="entr" presetSubtype="0" fill="hold" grpId="0" nodeType="withEffect">
+                                  <p:stCondLst>
+                                    <p:cond delay="0"/>
+                                  </p:stCondLst>
+                                  <p:childTnLst>
+                                    <p:set>
+                                      <p:cBhvr>
+                                        <p:cTn id="28" dur="1" fill="hold">
+                                          <p:stCondLst>
+                                            <p:cond delay="0"/>
+                                          </p:stCondLst>
+                                        </p:cTn>
+                                        <p:tgtEl>
+                                          <p:spTgt spid="3">
+                                            <p:txEl>
+                                              <p:pRg st="0" end="0"/>
+                                            </p:txEl>
+                                          </p:spTgt>
+                                        </p:tgtEl>
+                                        <p:attrNameLst>
+                                          <p:attrName>style.visibility</p:attrName>
+                                        </p:attrNameLst>
+                                      </p:cBhvr>
+                                      <p:to>
+                                        <p:strVal val="visible"/>
+                                      </p:to>
+                                    </p:set>
+                                  </p:childTnLst>
+                                </p:cTn>
+                              </p:par>
                             </p:childTnLst>
                           </p:cTn>
                         </p:par>
@@ -16143,6 +16904,7 @@
       </p:par>
     </p:tnLst>
     <p:bldLst>
+      <p:bldP spid="3" grpId="0" build="p"/>
       <p:bldP spid="5" grpId="0" uiExpand="1" build="p"/>
     </p:bldLst>
   </p:timing>

</xml_diff>

<commit_message>
Improved transitions of PPM PP
</commit_message>
<xml_diff>
--- a/protocol/Invisible-Flicker_aka_MEG-AHAT_project_PPM.pptx
+++ b/protocol/Invisible-Flicker_aka_MEG-AHAT_project_PPM.pptx
@@ -5,18 +5,21 @@
     <p:sldMasterId id="2147483660" r:id="rId1"/>
   </p:sldMasterIdLst>
   <p:notesMasterIdLst>
-    <p:notesMasterId r:id="rId11"/>
+    <p:notesMasterId r:id="rId14"/>
   </p:notesMasterIdLst>
   <p:sldIdLst>
     <p:sldId id="256" r:id="rId2"/>
     <p:sldId id="270" r:id="rId3"/>
     <p:sldId id="271" r:id="rId4"/>
-    <p:sldId id="276" r:id="rId5"/>
-    <p:sldId id="281" r:id="rId6"/>
-    <p:sldId id="280" r:id="rId7"/>
-    <p:sldId id="274" r:id="rId8"/>
-    <p:sldId id="275" r:id="rId9"/>
-    <p:sldId id="266" r:id="rId10"/>
+    <p:sldId id="282" r:id="rId5"/>
+    <p:sldId id="276" r:id="rId6"/>
+    <p:sldId id="283" r:id="rId7"/>
+    <p:sldId id="281" r:id="rId8"/>
+    <p:sldId id="284" r:id="rId9"/>
+    <p:sldId id="280" r:id="rId10"/>
+    <p:sldId id="274" r:id="rId11"/>
+    <p:sldId id="275" r:id="rId12"/>
+    <p:sldId id="266" r:id="rId13"/>
   </p:sldIdLst>
   <p:sldSz cx="9144000" cy="5143500" type="screen16x9"/>
   <p:notesSz cx="6858000" cy="9144000"/>
@@ -222,7 +225,7 @@
           <a:p>
             <a:fld id="{24EB8EBF-EE54-5F4A-9A96-36AE8BE19C24}" type="datetimeFigureOut">
               <a:rPr lang="en-US" smtClean="0"/>
-              <a:t>12/6/23</a:t>
+              <a:t>12/6/2023</a:t>
             </a:fld>
             <a:endParaRPr lang="en-US"/>
           </a:p>
@@ -600,6 +603,90 @@
 </p:notes>
 </file>
 
+<file path=ppt/notesSlides/notesSlide10.xml><?xml version="1.0" encoding="utf-8"?>
+<p:notes xmlns:a="http://schemas.openxmlformats.org/drawingml/2006/main" xmlns:r="http://schemas.openxmlformats.org/officeDocument/2006/relationships" xmlns:p="http://schemas.openxmlformats.org/presentationml/2006/main">
+  <p:cSld>
+    <p:spTree>
+      <p:nvGrpSpPr>
+        <p:cNvPr id="1" name=""/>
+        <p:cNvGrpSpPr/>
+        <p:nvPr/>
+      </p:nvGrpSpPr>
+      <p:grpSpPr>
+        <a:xfrm>
+          <a:off x="0" y="0"/>
+          <a:ext cx="0" cy="0"/>
+          <a:chOff x="0" y="0"/>
+          <a:chExt cx="0" cy="0"/>
+        </a:xfrm>
+      </p:grpSpPr>
+      <p:sp>
+        <p:nvSpPr>
+          <p:cNvPr id="2" name="Slide Image Placeholder 1"/>
+          <p:cNvSpPr>
+            <a:spLocks noGrp="1" noRot="1" noChangeAspect="1"/>
+          </p:cNvSpPr>
+          <p:nvPr>
+            <p:ph type="sldImg"/>
+          </p:nvPr>
+        </p:nvSpPr>
+        <p:spPr/>
+      </p:sp>
+      <p:sp>
+        <p:nvSpPr>
+          <p:cNvPr id="3" name="Notes Placeholder 2"/>
+          <p:cNvSpPr>
+            <a:spLocks noGrp="1"/>
+          </p:cNvSpPr>
+          <p:nvPr>
+            <p:ph type="body" idx="1"/>
+          </p:nvPr>
+        </p:nvSpPr>
+        <p:spPr/>
+        <p:txBody>
+          <a:bodyPr/>
+          <a:lstStyle/>
+          <a:p>
+            <a:endParaRPr lang="en-GB" dirty="0"/>
+          </a:p>
+        </p:txBody>
+      </p:sp>
+      <p:sp>
+        <p:nvSpPr>
+          <p:cNvPr id="4" name="Slide Number Placeholder 3"/>
+          <p:cNvSpPr>
+            <a:spLocks noGrp="1"/>
+          </p:cNvSpPr>
+          <p:nvPr>
+            <p:ph type="sldNum" sz="quarter" idx="5"/>
+          </p:nvPr>
+        </p:nvSpPr>
+        <p:spPr/>
+        <p:txBody>
+          <a:bodyPr/>
+          <a:lstStyle/>
+          <a:p>
+            <a:fld id="{9CD75E1A-2839-6842-B4F8-60F935C0618A}" type="slidenum">
+              <a:rPr lang="en-US" smtClean="0"/>
+              <a:t>10</a:t>
+            </a:fld>
+            <a:endParaRPr lang="en-US"/>
+          </a:p>
+        </p:txBody>
+      </p:sp>
+    </p:spTree>
+    <p:extLst>
+      <p:ext uri="{BB962C8B-B14F-4D97-AF65-F5344CB8AC3E}">
+        <p14:creationId xmlns:p14="http://schemas.microsoft.com/office/powerpoint/2010/main" val="2227283541"/>
+      </p:ext>
+    </p:extLst>
+  </p:cSld>
+  <p:clrMapOvr>
+    <a:masterClrMapping/>
+  </p:clrMapOvr>
+</p:notes>
+</file>
+
 <file path=ppt/notesSlides/notesSlide2.xml><?xml version="1.0" encoding="utf-8"?>
 <p:notes xmlns:a="http://schemas.openxmlformats.org/drawingml/2006/main" xmlns:r="http://schemas.openxmlformats.org/officeDocument/2006/relationships" xmlns:p="http://schemas.openxmlformats.org/presentationml/2006/main">
   <p:cSld>
@@ -926,7 +1013,27 @@
           <a:bodyPr/>
           <a:lstStyle/>
           <a:p>
+            <a:r>
+              <a:rPr lang="en-US" dirty="0"/>
+              <a:t>We consider the three types of stimulation as </a:t>
+            </a:r>
+          </a:p>
+          <a:p>
             <a:endParaRPr lang="en-US" dirty="0"/>
+          </a:p>
+          <a:p>
+            <a:r>
+              <a:rPr lang="en-US" dirty="0"/>
+              <a:t>S.1: Do we see a difference in the </a:t>
+            </a:r>
+            <a:r>
+              <a:rPr lang="en-US" dirty="0" err="1"/>
+              <a:t>behavioural</a:t>
+            </a:r>
+            <a:r>
+              <a:rPr lang="en-US" dirty="0"/>
+              <a:t> response (such as detection accuracy) when stimulating with 40 Hz visible flicker? Is it improved or reduced? What about invisible flicker? Is the response pattern for invisible flicker more like visible flicker or continuous light?</a:t>
+            </a:r>
           </a:p>
         </p:txBody>
       </p:sp>
@@ -956,7 +1063,7 @@
     </p:spTree>
     <p:extLst>
       <p:ext uri="{BB962C8B-B14F-4D97-AF65-F5344CB8AC3E}">
-        <p14:creationId xmlns:p14="http://schemas.microsoft.com/office/powerpoint/2010/main" val="3927438597"/>
+        <p14:creationId xmlns:p14="http://schemas.microsoft.com/office/powerpoint/2010/main" val="2290523307"/>
       </p:ext>
     </p:extLst>
   </p:cSld>
@@ -1040,7 +1147,7 @@
     </p:spTree>
     <p:extLst>
       <p:ext uri="{BB962C8B-B14F-4D97-AF65-F5344CB8AC3E}">
-        <p14:creationId xmlns:p14="http://schemas.microsoft.com/office/powerpoint/2010/main" val="1168461310"/>
+        <p14:creationId xmlns:p14="http://schemas.microsoft.com/office/powerpoint/2010/main" val="3927438597"/>
       </p:ext>
     </p:extLst>
   </p:cSld>
@@ -1095,18 +1202,26 @@
           <a:lstStyle/>
           <a:p>
             <a:r>
-              <a:rPr lang="en-GB" sz="1200" dirty="0"/>
-              <a:t>A </a:t>
-            </a:r>
-            <a:r>
-              <a:rPr lang="en-GB" sz="1200" dirty="0" err="1"/>
-              <a:t>cohen’s</a:t>
-            </a:r>
-            <a:r>
-              <a:rPr lang="en-GB" sz="1200" dirty="0"/>
-              <a:t> d of 0.95 is reported in [8] for stroboscopic flicker at 12 and 15 Hz, but we must expect a lower effect size for spectral flicker at 40 Hz.</a:t>
-            </a:r>
+              <a:rPr lang="en-US" dirty="0"/>
+              <a:t>We consider the three types of stimulation as </a:t>
+            </a:r>
+          </a:p>
+          <a:p>
             <a:endParaRPr lang="en-US" dirty="0"/>
+          </a:p>
+          <a:p>
+            <a:r>
+              <a:rPr lang="en-US" dirty="0"/>
+              <a:t>S.1: Do we see a difference in the </a:t>
+            </a:r>
+            <a:r>
+              <a:rPr lang="en-US" dirty="0" err="1"/>
+              <a:t>behavioural</a:t>
+            </a:r>
+            <a:r>
+              <a:rPr lang="en-US" dirty="0"/>
+              <a:t> response (such as detection accuracy) when stimulating with 40 Hz visible flicker? Is it improved or reduced? What about invisible flicker? Is the response pattern for invisible flicker more like visible flicker or continuous light?</a:t>
+            </a:r>
           </a:p>
         </p:txBody>
       </p:sp>
@@ -1136,7 +1251,7 @@
     </p:spTree>
     <p:extLst>
       <p:ext uri="{BB962C8B-B14F-4D97-AF65-F5344CB8AC3E}">
-        <p14:creationId xmlns:p14="http://schemas.microsoft.com/office/powerpoint/2010/main" val="1812446027"/>
+        <p14:creationId xmlns:p14="http://schemas.microsoft.com/office/powerpoint/2010/main" val="2015141590"/>
       </p:ext>
     </p:extLst>
   </p:cSld>
@@ -1190,7 +1305,7 @@
           <a:bodyPr/>
           <a:lstStyle/>
           <a:p>
-            <a:endParaRPr lang="en-GB" dirty="0"/>
+            <a:endParaRPr lang="en-US" dirty="0"/>
           </a:p>
         </p:txBody>
       </p:sp>
@@ -1220,7 +1335,207 @@
     </p:spTree>
     <p:extLst>
       <p:ext uri="{BB962C8B-B14F-4D97-AF65-F5344CB8AC3E}">
-        <p14:creationId xmlns:p14="http://schemas.microsoft.com/office/powerpoint/2010/main" val="2227283541"/>
+        <p14:creationId xmlns:p14="http://schemas.microsoft.com/office/powerpoint/2010/main" val="1168461310"/>
+      </p:ext>
+    </p:extLst>
+  </p:cSld>
+  <p:clrMapOvr>
+    <a:masterClrMapping/>
+  </p:clrMapOvr>
+</p:notes>
+</file>
+
+<file path=ppt/notesSlides/notesSlide8.xml><?xml version="1.0" encoding="utf-8"?>
+<p:notes xmlns:a="http://schemas.openxmlformats.org/drawingml/2006/main" xmlns:r="http://schemas.openxmlformats.org/officeDocument/2006/relationships" xmlns:p="http://schemas.openxmlformats.org/presentationml/2006/main">
+  <p:cSld>
+    <p:spTree>
+      <p:nvGrpSpPr>
+        <p:cNvPr id="1" name=""/>
+        <p:cNvGrpSpPr/>
+        <p:nvPr/>
+      </p:nvGrpSpPr>
+      <p:grpSpPr>
+        <a:xfrm>
+          <a:off x="0" y="0"/>
+          <a:ext cx="0" cy="0"/>
+          <a:chOff x="0" y="0"/>
+          <a:chExt cx="0" cy="0"/>
+        </a:xfrm>
+      </p:grpSpPr>
+      <p:sp>
+        <p:nvSpPr>
+          <p:cNvPr id="2" name="Slide Image Placeholder 1"/>
+          <p:cNvSpPr>
+            <a:spLocks noGrp="1" noRot="1" noChangeAspect="1"/>
+          </p:cNvSpPr>
+          <p:nvPr>
+            <p:ph type="sldImg"/>
+          </p:nvPr>
+        </p:nvSpPr>
+        <p:spPr/>
+      </p:sp>
+      <p:sp>
+        <p:nvSpPr>
+          <p:cNvPr id="3" name="Notes Placeholder 2"/>
+          <p:cNvSpPr>
+            <a:spLocks noGrp="1"/>
+          </p:cNvSpPr>
+          <p:nvPr>
+            <p:ph type="body" idx="1"/>
+          </p:nvPr>
+        </p:nvSpPr>
+        <p:spPr/>
+        <p:txBody>
+          <a:bodyPr/>
+          <a:lstStyle/>
+          <a:p>
+            <a:r>
+              <a:rPr lang="en-US" dirty="0"/>
+              <a:t>We consider the three types of stimulation as </a:t>
+            </a:r>
+          </a:p>
+          <a:p>
+            <a:endParaRPr lang="en-US" dirty="0"/>
+          </a:p>
+          <a:p>
+            <a:r>
+              <a:rPr lang="en-US" dirty="0"/>
+              <a:t>S.1: Do we see a difference in the </a:t>
+            </a:r>
+            <a:r>
+              <a:rPr lang="en-US" dirty="0" err="1"/>
+              <a:t>behavioural</a:t>
+            </a:r>
+            <a:r>
+              <a:rPr lang="en-US" dirty="0"/>
+              <a:t> response (such as detection accuracy) when stimulating with 40 Hz visible flicker? Is it improved or reduced? What about invisible flicker? Is the response pattern for invisible flicker more like visible flicker or continuous light?</a:t>
+            </a:r>
+          </a:p>
+        </p:txBody>
+      </p:sp>
+      <p:sp>
+        <p:nvSpPr>
+          <p:cNvPr id="4" name="Slide Number Placeholder 3"/>
+          <p:cNvSpPr>
+            <a:spLocks noGrp="1"/>
+          </p:cNvSpPr>
+          <p:nvPr>
+            <p:ph type="sldNum" sz="quarter" idx="5"/>
+          </p:nvPr>
+        </p:nvSpPr>
+        <p:spPr/>
+        <p:txBody>
+          <a:bodyPr/>
+          <a:lstStyle/>
+          <a:p>
+            <a:fld id="{9CD75E1A-2839-6842-B4F8-60F935C0618A}" type="slidenum">
+              <a:rPr lang="en-US" smtClean="0"/>
+              <a:t>8</a:t>
+            </a:fld>
+            <a:endParaRPr lang="en-US"/>
+          </a:p>
+        </p:txBody>
+      </p:sp>
+    </p:spTree>
+    <p:extLst>
+      <p:ext uri="{BB962C8B-B14F-4D97-AF65-F5344CB8AC3E}">
+        <p14:creationId xmlns:p14="http://schemas.microsoft.com/office/powerpoint/2010/main" val="3926183075"/>
+      </p:ext>
+    </p:extLst>
+  </p:cSld>
+  <p:clrMapOvr>
+    <a:masterClrMapping/>
+  </p:clrMapOvr>
+</p:notes>
+</file>
+
+<file path=ppt/notesSlides/notesSlide9.xml><?xml version="1.0" encoding="utf-8"?>
+<p:notes xmlns:a="http://schemas.openxmlformats.org/drawingml/2006/main" xmlns:r="http://schemas.openxmlformats.org/officeDocument/2006/relationships" xmlns:p="http://schemas.openxmlformats.org/presentationml/2006/main">
+  <p:cSld>
+    <p:spTree>
+      <p:nvGrpSpPr>
+        <p:cNvPr id="1" name=""/>
+        <p:cNvGrpSpPr/>
+        <p:nvPr/>
+      </p:nvGrpSpPr>
+      <p:grpSpPr>
+        <a:xfrm>
+          <a:off x="0" y="0"/>
+          <a:ext cx="0" cy="0"/>
+          <a:chOff x="0" y="0"/>
+          <a:chExt cx="0" cy="0"/>
+        </a:xfrm>
+      </p:grpSpPr>
+      <p:sp>
+        <p:nvSpPr>
+          <p:cNvPr id="2" name="Slide Image Placeholder 1"/>
+          <p:cNvSpPr>
+            <a:spLocks noGrp="1" noRot="1" noChangeAspect="1"/>
+          </p:cNvSpPr>
+          <p:nvPr>
+            <p:ph type="sldImg"/>
+          </p:nvPr>
+        </p:nvSpPr>
+        <p:spPr/>
+      </p:sp>
+      <p:sp>
+        <p:nvSpPr>
+          <p:cNvPr id="3" name="Notes Placeholder 2"/>
+          <p:cNvSpPr>
+            <a:spLocks noGrp="1"/>
+          </p:cNvSpPr>
+          <p:nvPr>
+            <p:ph type="body" idx="1"/>
+          </p:nvPr>
+        </p:nvSpPr>
+        <p:spPr/>
+        <p:txBody>
+          <a:bodyPr/>
+          <a:lstStyle/>
+          <a:p>
+            <a:r>
+              <a:rPr lang="en-GB" sz="1200" dirty="0"/>
+              <a:t>A </a:t>
+            </a:r>
+            <a:r>
+              <a:rPr lang="en-GB" sz="1200" dirty="0" err="1"/>
+              <a:t>cohen’s</a:t>
+            </a:r>
+            <a:r>
+              <a:rPr lang="en-GB" sz="1200" dirty="0"/>
+              <a:t> d of 0.95 is reported in [8] for stroboscopic flicker at 12 and 15 Hz, but we must expect a lower effect size for spectral flicker at 40 Hz.</a:t>
+            </a:r>
+            <a:endParaRPr lang="en-US" dirty="0"/>
+          </a:p>
+        </p:txBody>
+      </p:sp>
+      <p:sp>
+        <p:nvSpPr>
+          <p:cNvPr id="4" name="Slide Number Placeholder 3"/>
+          <p:cNvSpPr>
+            <a:spLocks noGrp="1"/>
+          </p:cNvSpPr>
+          <p:nvPr>
+            <p:ph type="sldNum" sz="quarter" idx="5"/>
+          </p:nvPr>
+        </p:nvSpPr>
+        <p:spPr/>
+        <p:txBody>
+          <a:bodyPr/>
+          <a:lstStyle/>
+          <a:p>
+            <a:fld id="{9CD75E1A-2839-6842-B4F8-60F935C0618A}" type="slidenum">
+              <a:rPr lang="en-US" smtClean="0"/>
+              <a:t>9</a:t>
+            </a:fld>
+            <a:endParaRPr lang="en-US"/>
+          </a:p>
+        </p:txBody>
+      </p:sp>
+    </p:spTree>
+    <p:extLst>
+      <p:ext uri="{BB962C8B-B14F-4D97-AF65-F5344CB8AC3E}">
+        <p14:creationId xmlns:p14="http://schemas.microsoft.com/office/powerpoint/2010/main" val="1812446027"/>
       </p:ext>
     </p:extLst>
   </p:cSld>
@@ -6108,6 +6423,959 @@
     <p:extLst>
       <p:ext uri="{BB962C8B-B14F-4D97-AF65-F5344CB8AC3E}">
         <p14:creationId xmlns:p14="http://schemas.microsoft.com/office/powerpoint/2010/main" val="224764806"/>
+      </p:ext>
+    </p:extLst>
+  </p:cSld>
+  <p:clrMapOvr>
+    <a:masterClrMapping/>
+  </p:clrMapOvr>
+</p:sld>
+</file>
+
+<file path=ppt/slides/slide10.xml><?xml version="1.0" encoding="utf-8"?>
+<p:sld xmlns:a="http://schemas.openxmlformats.org/drawingml/2006/main" xmlns:r="http://schemas.openxmlformats.org/officeDocument/2006/relationships" xmlns:p="http://schemas.openxmlformats.org/presentationml/2006/main">
+  <p:cSld>
+    <p:spTree>
+      <p:nvGrpSpPr>
+        <p:cNvPr id="1" name=""/>
+        <p:cNvGrpSpPr/>
+        <p:nvPr/>
+      </p:nvGrpSpPr>
+      <p:grpSpPr>
+        <a:xfrm>
+          <a:off x="0" y="0"/>
+          <a:ext cx="0" cy="0"/>
+          <a:chOff x="0" y="0"/>
+          <a:chExt cx="0" cy="0"/>
+        </a:xfrm>
+      </p:grpSpPr>
+      <p:sp>
+        <p:nvSpPr>
+          <p:cNvPr id="2" name="Title 1">
+            <a:extLst>
+              <a:ext uri="{FF2B5EF4-FFF2-40B4-BE49-F238E27FC236}">
+                <a16:creationId xmlns:a16="http://schemas.microsoft.com/office/drawing/2014/main" id="{15C9CC45-7998-974B-FD75-1ADC521A27E3}"/>
+              </a:ext>
+            </a:extLst>
+          </p:cNvPr>
+          <p:cNvSpPr>
+            <a:spLocks noGrp="1"/>
+          </p:cNvSpPr>
+          <p:nvPr>
+            <p:ph type="title"/>
+          </p:nvPr>
+        </p:nvSpPr>
+        <p:spPr/>
+        <p:txBody>
+          <a:bodyPr/>
+          <a:lstStyle/>
+          <a:p>
+            <a:r>
+              <a:rPr lang="en-GB" dirty="0"/>
+              <a:t>MEG-AHAT</a:t>
+            </a:r>
+            <a:endParaRPr lang="en-US" dirty="0"/>
+          </a:p>
+        </p:txBody>
+      </p:sp>
+      <p:sp>
+        <p:nvSpPr>
+          <p:cNvPr id="3" name="Text Placeholder 2">
+            <a:extLst>
+              <a:ext uri="{FF2B5EF4-FFF2-40B4-BE49-F238E27FC236}">
+                <a16:creationId xmlns:a16="http://schemas.microsoft.com/office/drawing/2014/main" id="{3DD26902-F0DE-8D2E-8A86-76295789FE86}"/>
+              </a:ext>
+            </a:extLst>
+          </p:cNvPr>
+          <p:cNvSpPr>
+            <a:spLocks noGrp="1"/>
+          </p:cNvSpPr>
+          <p:nvPr>
+            <p:ph type="body" sz="quarter" idx="11"/>
+          </p:nvPr>
+        </p:nvSpPr>
+        <p:spPr/>
+        <p:txBody>
+          <a:bodyPr/>
+          <a:lstStyle/>
+          <a:p>
+            <a:endParaRPr lang="en-US"/>
+          </a:p>
+        </p:txBody>
+      </p:sp>
+      <p:sp>
+        <p:nvSpPr>
+          <p:cNvPr id="4" name="Text Placeholder 3">
+            <a:extLst>
+              <a:ext uri="{FF2B5EF4-FFF2-40B4-BE49-F238E27FC236}">
+                <a16:creationId xmlns:a16="http://schemas.microsoft.com/office/drawing/2014/main" id="{B76F7E2C-DCEC-4E63-0B4A-228EF6EF881E}"/>
+              </a:ext>
+            </a:extLst>
+          </p:cNvPr>
+          <p:cNvSpPr>
+            <a:spLocks noGrp="1"/>
+          </p:cNvSpPr>
+          <p:nvPr>
+            <p:ph type="body" sz="quarter" idx="12"/>
+          </p:nvPr>
+        </p:nvSpPr>
+        <p:spPr/>
+        <p:txBody>
+          <a:bodyPr/>
+          <a:lstStyle/>
+          <a:p>
+            <a:r>
+              <a:rPr lang="en-US" dirty="0"/>
+              <a:t>Data Analysis</a:t>
+            </a:r>
+          </a:p>
+        </p:txBody>
+      </p:sp>
+      <p:sp>
+        <p:nvSpPr>
+          <p:cNvPr id="5" name="Text Placeholder 4">
+            <a:extLst>
+              <a:ext uri="{FF2B5EF4-FFF2-40B4-BE49-F238E27FC236}">
+                <a16:creationId xmlns:a16="http://schemas.microsoft.com/office/drawing/2014/main" id="{7F4E64EE-B05D-0099-E6DD-E87D9856BCC4}"/>
+              </a:ext>
+            </a:extLst>
+          </p:cNvPr>
+          <p:cNvSpPr>
+            <a:spLocks noGrp="1"/>
+          </p:cNvSpPr>
+          <p:nvPr>
+            <p:ph type="body" sz="quarter" idx="16"/>
+          </p:nvPr>
+        </p:nvSpPr>
+        <p:spPr>
+          <a:xfrm>
+            <a:off x="900000" y="1080001"/>
+            <a:ext cx="7560000" cy="1034129"/>
+          </a:xfrm>
+        </p:spPr>
+        <p:txBody>
+          <a:bodyPr/>
+          <a:lstStyle/>
+          <a:p>
+            <a:pPr marL="285750" indent="-285750">
+              <a:buFont typeface="Arial" panose="020B0604020202020204" pitchFamily="34" charset="0"/>
+              <a:buChar char="•"/>
+            </a:pPr>
+            <a:r>
+              <a:rPr lang="en-GB" dirty="0"/>
+              <a:t>Stimulation artefacts are expected but are orthogonal to the design of the experiment and will be suppressed by spatial filtering such as beamforming.</a:t>
+            </a:r>
+          </a:p>
+          <a:p>
+            <a:pPr marL="285750" indent="-285750">
+              <a:buFont typeface="Arial" panose="020B0604020202020204" pitchFamily="34" charset="0"/>
+              <a:buChar char="•"/>
+            </a:pPr>
+            <a:r>
+              <a:rPr lang="en-GB" dirty="0"/>
+              <a:t>Mixed linear models with 40 Hz power as the dependent variable and stimulus (fixed effect), task (fixed effect), and subject (random effect) as independent variables.</a:t>
+            </a:r>
+          </a:p>
+        </p:txBody>
+      </p:sp>
+    </p:spTree>
+    <p:extLst>
+      <p:ext uri="{BB962C8B-B14F-4D97-AF65-F5344CB8AC3E}">
+        <p14:creationId xmlns:p14="http://schemas.microsoft.com/office/powerpoint/2010/main" val="4173196176"/>
+      </p:ext>
+    </p:extLst>
+  </p:cSld>
+  <p:clrMapOvr>
+    <a:masterClrMapping/>
+  </p:clrMapOvr>
+  <p:timing>
+    <p:tnLst>
+      <p:par>
+        <p:cTn id="1" dur="indefinite" restart="never" nodeType="tmRoot">
+          <p:childTnLst>
+            <p:seq concurrent="1" nextAc="seek">
+              <p:cTn id="2" dur="indefinite" nodeType="mainSeq">
+                <p:childTnLst>
+                  <p:par>
+                    <p:cTn id="3" fill="hold">
+                      <p:stCondLst>
+                        <p:cond delay="indefinite"/>
+                      </p:stCondLst>
+                      <p:childTnLst>
+                        <p:par>
+                          <p:cTn id="4" fill="hold">
+                            <p:stCondLst>
+                              <p:cond delay="0"/>
+                            </p:stCondLst>
+                            <p:childTnLst>
+                              <p:par>
+                                <p:cTn id="5" presetID="1" presetClass="entr" presetSubtype="0" fill="hold" grpId="0" nodeType="clickEffect">
+                                  <p:stCondLst>
+                                    <p:cond delay="0"/>
+                                  </p:stCondLst>
+                                  <p:childTnLst>
+                                    <p:set>
+                                      <p:cBhvr>
+                                        <p:cTn id="6" dur="1" fill="hold">
+                                          <p:stCondLst>
+                                            <p:cond delay="0"/>
+                                          </p:stCondLst>
+                                        </p:cTn>
+                                        <p:tgtEl>
+                                          <p:spTgt spid="5">
+                                            <p:txEl>
+                                              <p:pRg st="0" end="0"/>
+                                            </p:txEl>
+                                          </p:spTgt>
+                                        </p:tgtEl>
+                                        <p:attrNameLst>
+                                          <p:attrName>style.visibility</p:attrName>
+                                        </p:attrNameLst>
+                                      </p:cBhvr>
+                                      <p:to>
+                                        <p:strVal val="visible"/>
+                                      </p:to>
+                                    </p:set>
+                                  </p:childTnLst>
+                                </p:cTn>
+                              </p:par>
+                            </p:childTnLst>
+                          </p:cTn>
+                        </p:par>
+                      </p:childTnLst>
+                    </p:cTn>
+                  </p:par>
+                  <p:par>
+                    <p:cTn id="7" fill="hold">
+                      <p:stCondLst>
+                        <p:cond delay="indefinite"/>
+                      </p:stCondLst>
+                      <p:childTnLst>
+                        <p:par>
+                          <p:cTn id="8" fill="hold">
+                            <p:stCondLst>
+                              <p:cond delay="0"/>
+                            </p:stCondLst>
+                            <p:childTnLst>
+                              <p:par>
+                                <p:cTn id="9" presetID="1" presetClass="entr" presetSubtype="0" fill="hold" grpId="0" nodeType="clickEffect">
+                                  <p:stCondLst>
+                                    <p:cond delay="0"/>
+                                  </p:stCondLst>
+                                  <p:childTnLst>
+                                    <p:set>
+                                      <p:cBhvr>
+                                        <p:cTn id="10" dur="1" fill="hold">
+                                          <p:stCondLst>
+                                            <p:cond delay="0"/>
+                                          </p:stCondLst>
+                                        </p:cTn>
+                                        <p:tgtEl>
+                                          <p:spTgt spid="5">
+                                            <p:txEl>
+                                              <p:pRg st="1" end="1"/>
+                                            </p:txEl>
+                                          </p:spTgt>
+                                        </p:tgtEl>
+                                        <p:attrNameLst>
+                                          <p:attrName>style.visibility</p:attrName>
+                                        </p:attrNameLst>
+                                      </p:cBhvr>
+                                      <p:to>
+                                        <p:strVal val="visible"/>
+                                      </p:to>
+                                    </p:set>
+                                  </p:childTnLst>
+                                </p:cTn>
+                              </p:par>
+                            </p:childTnLst>
+                          </p:cTn>
+                        </p:par>
+                      </p:childTnLst>
+                    </p:cTn>
+                  </p:par>
+                </p:childTnLst>
+              </p:cTn>
+              <p:prevCondLst>
+                <p:cond evt="onPrev" delay="0">
+                  <p:tgtEl>
+                    <p:sldTgt/>
+                  </p:tgtEl>
+                </p:cond>
+              </p:prevCondLst>
+              <p:nextCondLst>
+                <p:cond evt="onNext" delay="0">
+                  <p:tgtEl>
+                    <p:sldTgt/>
+                  </p:tgtEl>
+                </p:cond>
+              </p:nextCondLst>
+            </p:seq>
+          </p:childTnLst>
+        </p:cTn>
+      </p:par>
+    </p:tnLst>
+    <p:bldLst>
+      <p:bldP spid="5" grpId="0" build="p"/>
+    </p:bldLst>
+  </p:timing>
+</p:sld>
+</file>
+
+<file path=ppt/slides/slide11.xml><?xml version="1.0" encoding="utf-8"?>
+<p:sld xmlns:a="http://schemas.openxmlformats.org/drawingml/2006/main" xmlns:r="http://schemas.openxmlformats.org/officeDocument/2006/relationships" xmlns:p="http://schemas.openxmlformats.org/presentationml/2006/main">
+  <p:cSld>
+    <p:spTree>
+      <p:nvGrpSpPr>
+        <p:cNvPr id="1" name=""/>
+        <p:cNvGrpSpPr/>
+        <p:nvPr/>
+      </p:nvGrpSpPr>
+      <p:grpSpPr>
+        <a:xfrm>
+          <a:off x="0" y="0"/>
+          <a:ext cx="0" cy="0"/>
+          <a:chOff x="0" y="0"/>
+          <a:chExt cx="0" cy="0"/>
+        </a:xfrm>
+      </p:grpSpPr>
+      <p:sp>
+        <p:nvSpPr>
+          <p:cNvPr id="2" name="Title 1">
+            <a:extLst>
+              <a:ext uri="{FF2B5EF4-FFF2-40B4-BE49-F238E27FC236}">
+                <a16:creationId xmlns:a16="http://schemas.microsoft.com/office/drawing/2014/main" id="{15C9CC45-7998-974B-FD75-1ADC521A27E3}"/>
+              </a:ext>
+            </a:extLst>
+          </p:cNvPr>
+          <p:cNvSpPr>
+            <a:spLocks noGrp="1"/>
+          </p:cNvSpPr>
+          <p:nvPr>
+            <p:ph type="title"/>
+          </p:nvPr>
+        </p:nvSpPr>
+        <p:spPr/>
+        <p:txBody>
+          <a:bodyPr/>
+          <a:lstStyle/>
+          <a:p>
+            <a:r>
+              <a:rPr lang="en-GB" dirty="0"/>
+              <a:t>MEG-AHAT</a:t>
+            </a:r>
+            <a:endParaRPr lang="en-US" dirty="0"/>
+          </a:p>
+        </p:txBody>
+      </p:sp>
+      <p:sp>
+        <p:nvSpPr>
+          <p:cNvPr id="3" name="Text Placeholder 2">
+            <a:extLst>
+              <a:ext uri="{FF2B5EF4-FFF2-40B4-BE49-F238E27FC236}">
+                <a16:creationId xmlns:a16="http://schemas.microsoft.com/office/drawing/2014/main" id="{3DD26902-F0DE-8D2E-8A86-76295789FE86}"/>
+              </a:ext>
+            </a:extLst>
+          </p:cNvPr>
+          <p:cNvSpPr>
+            <a:spLocks noGrp="1"/>
+          </p:cNvSpPr>
+          <p:nvPr>
+            <p:ph type="body" sz="quarter" idx="11"/>
+          </p:nvPr>
+        </p:nvSpPr>
+        <p:spPr/>
+        <p:txBody>
+          <a:bodyPr/>
+          <a:lstStyle/>
+          <a:p>
+            <a:r>
+              <a:rPr lang="en-US" dirty="0"/>
+              <a:t>* See </a:t>
+            </a:r>
+            <a:r>
+              <a:rPr lang="en-US" dirty="0" err="1"/>
+              <a:t>ClinicalTrials.gov</a:t>
+            </a:r>
+            <a:r>
+              <a:rPr lang="en-US" dirty="0"/>
+              <a:t> IDs: NCT03543878, NCT05637801, NCT03556280, NCT04574921, NCT05260177</a:t>
+            </a:r>
+          </a:p>
+        </p:txBody>
+      </p:sp>
+      <p:sp>
+        <p:nvSpPr>
+          <p:cNvPr id="4" name="Text Placeholder 3">
+            <a:extLst>
+              <a:ext uri="{FF2B5EF4-FFF2-40B4-BE49-F238E27FC236}">
+                <a16:creationId xmlns:a16="http://schemas.microsoft.com/office/drawing/2014/main" id="{B76F7E2C-DCEC-4E63-0B4A-228EF6EF881E}"/>
+              </a:ext>
+            </a:extLst>
+          </p:cNvPr>
+          <p:cNvSpPr>
+            <a:spLocks noGrp="1"/>
+          </p:cNvSpPr>
+          <p:nvPr>
+            <p:ph type="body" sz="quarter" idx="12"/>
+          </p:nvPr>
+        </p:nvSpPr>
+        <p:spPr/>
+        <p:txBody>
+          <a:bodyPr/>
+          <a:lstStyle/>
+          <a:p>
+            <a:r>
+              <a:rPr lang="en-US" dirty="0"/>
+              <a:t>Impact</a:t>
+            </a:r>
+          </a:p>
+        </p:txBody>
+      </p:sp>
+      <p:sp>
+        <p:nvSpPr>
+          <p:cNvPr id="5" name="Text Placeholder 4">
+            <a:extLst>
+              <a:ext uri="{FF2B5EF4-FFF2-40B4-BE49-F238E27FC236}">
+                <a16:creationId xmlns:a16="http://schemas.microsoft.com/office/drawing/2014/main" id="{7F4E64EE-B05D-0099-E6DD-E87D9856BCC4}"/>
+              </a:ext>
+            </a:extLst>
+          </p:cNvPr>
+          <p:cNvSpPr>
+            <a:spLocks noGrp="1"/>
+          </p:cNvSpPr>
+          <p:nvPr>
+            <p:ph type="body" sz="quarter" idx="16"/>
+          </p:nvPr>
+        </p:nvSpPr>
+        <p:spPr>
+          <a:xfrm>
+            <a:off x="496111" y="1080000"/>
+            <a:ext cx="8453336" cy="1982081"/>
+          </a:xfrm>
+        </p:spPr>
+        <p:txBody>
+          <a:bodyPr/>
+          <a:lstStyle/>
+          <a:p>
+            <a:pPr marL="285750" indent="-285750">
+              <a:buFont typeface="Arial" panose="020B0604020202020204" pitchFamily="34" charset="0"/>
+              <a:buChar char="•"/>
+            </a:pPr>
+            <a:r>
+              <a:rPr lang="en-US" sz="1400" dirty="0">
+                <a:latin typeface="Times New Roman" panose="02020603050405020304" pitchFamily="18" charset="0"/>
+                <a:cs typeface="Times New Roman" panose="02020603050405020304" pitchFamily="18" charset="0"/>
+              </a:rPr>
+              <a:t>Informative for the understanding of how 40 Hz stimulation may affect Alzheimer’s disease</a:t>
+            </a:r>
+          </a:p>
+          <a:p>
+            <a:pPr marL="285750" indent="-285750">
+              <a:buFont typeface="Arial" panose="020B0604020202020204" pitchFamily="34" charset="0"/>
+              <a:buChar char="•"/>
+            </a:pPr>
+            <a:r>
+              <a:rPr lang="en-US" sz="1400" dirty="0">
+                <a:latin typeface="Times New Roman" panose="02020603050405020304" pitchFamily="18" charset="0"/>
+                <a:cs typeface="Times New Roman" panose="02020603050405020304" pitchFamily="18" charset="0"/>
+              </a:rPr>
+              <a:t>May influence the implementation of at-home 40 Hz stimulation:</a:t>
+            </a:r>
+          </a:p>
+          <a:p>
+            <a:pPr marL="1028700" lvl="1">
+              <a:buFont typeface="Arial" panose="020B0604020202020204" pitchFamily="34" charset="0"/>
+              <a:buChar char="•"/>
+            </a:pPr>
+            <a:r>
+              <a:rPr lang="en-US" sz="1400" dirty="0">
+                <a:latin typeface="Times New Roman" panose="02020603050405020304" pitchFamily="18" charset="0"/>
+                <a:cs typeface="Times New Roman" panose="02020603050405020304" pitchFamily="18" charset="0"/>
+              </a:rPr>
+              <a:t>Is the amount of (visible) flicker important?</a:t>
+            </a:r>
+          </a:p>
+          <a:p>
+            <a:pPr marL="1028700" lvl="1">
+              <a:buFont typeface="Arial" panose="020B0604020202020204" pitchFamily="34" charset="0"/>
+              <a:buChar char="•"/>
+            </a:pPr>
+            <a:r>
+              <a:rPr lang="en-US" sz="1400" dirty="0">
+                <a:latin typeface="Times New Roman" panose="02020603050405020304" pitchFamily="18" charset="0"/>
+                <a:cs typeface="Times New Roman" panose="02020603050405020304" pitchFamily="18" charset="0"/>
+              </a:rPr>
+              <a:t>Should the user attend to the stimulation?</a:t>
+            </a:r>
+          </a:p>
+          <a:p>
+            <a:pPr marL="1028700" lvl="1">
+              <a:buFont typeface="Arial" panose="020B0604020202020204" pitchFamily="34" charset="0"/>
+              <a:buChar char="•"/>
+            </a:pPr>
+            <a:r>
+              <a:rPr lang="en-US" sz="1400" dirty="0">
+                <a:latin typeface="Times New Roman" panose="02020603050405020304" pitchFamily="18" charset="0"/>
+                <a:cs typeface="Times New Roman" panose="02020603050405020304" pitchFamily="18" charset="0"/>
+              </a:rPr>
+              <a:t>Should the user do cognitively demanding work during stimulation?</a:t>
+            </a:r>
+          </a:p>
+          <a:p>
+            <a:pPr marL="285750" indent="-285750">
+              <a:buFont typeface="Arial" panose="020B0604020202020204" pitchFamily="34" charset="0"/>
+              <a:buChar char="•"/>
+            </a:pPr>
+            <a:r>
+              <a:rPr lang="en-US" sz="1400" dirty="0">
+                <a:latin typeface="Times New Roman" panose="02020603050405020304" pitchFamily="18" charset="0"/>
+                <a:cs typeface="Times New Roman" panose="02020603050405020304" pitchFamily="18" charset="0"/>
+              </a:rPr>
+              <a:t>Does </a:t>
+            </a:r>
+            <a:r>
+              <a:rPr lang="en-US" sz="1400" i="1" dirty="0">
+                <a:latin typeface="Times New Roman" panose="02020603050405020304" pitchFamily="18" charset="0"/>
+                <a:cs typeface="Times New Roman" panose="02020603050405020304" pitchFamily="18" charset="0"/>
+              </a:rPr>
+              <a:t>not</a:t>
+            </a:r>
+            <a:r>
+              <a:rPr lang="en-US" sz="1400" dirty="0">
+                <a:latin typeface="Times New Roman" panose="02020603050405020304" pitchFamily="18" charset="0"/>
+                <a:cs typeface="Times New Roman" panose="02020603050405020304" pitchFamily="18" charset="0"/>
+              </a:rPr>
+              <a:t> directly inform about the clinical efficacy of 40 Hz stimulation, but this is pursued in ongoing clinical trials*</a:t>
+            </a:r>
+          </a:p>
+          <a:p>
+            <a:pPr marL="285750" indent="-285750">
+              <a:buFont typeface="Arial" panose="020B0604020202020204" pitchFamily="34" charset="0"/>
+              <a:buChar char="•"/>
+            </a:pPr>
+            <a:endParaRPr lang="en-US" sz="1400" dirty="0">
+              <a:latin typeface="Times New Roman" panose="02020603050405020304" pitchFamily="18" charset="0"/>
+              <a:cs typeface="Times New Roman" panose="02020603050405020304" pitchFamily="18" charset="0"/>
+            </a:endParaRPr>
+          </a:p>
+        </p:txBody>
+      </p:sp>
+    </p:spTree>
+    <p:extLst>
+      <p:ext uri="{BB962C8B-B14F-4D97-AF65-F5344CB8AC3E}">
+        <p14:creationId xmlns:p14="http://schemas.microsoft.com/office/powerpoint/2010/main" val="4271881490"/>
+      </p:ext>
+    </p:extLst>
+  </p:cSld>
+  <p:clrMapOvr>
+    <a:masterClrMapping/>
+  </p:clrMapOvr>
+  <p:timing>
+    <p:tnLst>
+      <p:par>
+        <p:cTn id="1" dur="indefinite" restart="never" nodeType="tmRoot">
+          <p:childTnLst>
+            <p:seq concurrent="1" nextAc="seek">
+              <p:cTn id="2" dur="indefinite" nodeType="mainSeq">
+                <p:childTnLst>
+                  <p:par>
+                    <p:cTn id="3" fill="hold">
+                      <p:stCondLst>
+                        <p:cond delay="indefinite"/>
+                      </p:stCondLst>
+                      <p:childTnLst>
+                        <p:par>
+                          <p:cTn id="4" fill="hold">
+                            <p:stCondLst>
+                              <p:cond delay="0"/>
+                            </p:stCondLst>
+                            <p:childTnLst>
+                              <p:par>
+                                <p:cTn id="5" presetID="1" presetClass="entr" presetSubtype="0" fill="hold" grpId="0" nodeType="clickEffect">
+                                  <p:stCondLst>
+                                    <p:cond delay="0"/>
+                                  </p:stCondLst>
+                                  <p:childTnLst>
+                                    <p:set>
+                                      <p:cBhvr>
+                                        <p:cTn id="6" dur="1" fill="hold">
+                                          <p:stCondLst>
+                                            <p:cond delay="0"/>
+                                          </p:stCondLst>
+                                        </p:cTn>
+                                        <p:tgtEl>
+                                          <p:spTgt spid="5">
+                                            <p:txEl>
+                                              <p:pRg st="0" end="0"/>
+                                            </p:txEl>
+                                          </p:spTgt>
+                                        </p:tgtEl>
+                                        <p:attrNameLst>
+                                          <p:attrName>style.visibility</p:attrName>
+                                        </p:attrNameLst>
+                                      </p:cBhvr>
+                                      <p:to>
+                                        <p:strVal val="visible"/>
+                                      </p:to>
+                                    </p:set>
+                                  </p:childTnLst>
+                                </p:cTn>
+                              </p:par>
+                            </p:childTnLst>
+                          </p:cTn>
+                        </p:par>
+                      </p:childTnLst>
+                    </p:cTn>
+                  </p:par>
+                  <p:par>
+                    <p:cTn id="7" fill="hold">
+                      <p:stCondLst>
+                        <p:cond delay="indefinite"/>
+                      </p:stCondLst>
+                      <p:childTnLst>
+                        <p:par>
+                          <p:cTn id="8" fill="hold">
+                            <p:stCondLst>
+                              <p:cond delay="0"/>
+                            </p:stCondLst>
+                            <p:childTnLst>
+                              <p:par>
+                                <p:cTn id="9" presetID="1" presetClass="entr" presetSubtype="0" fill="hold" grpId="0" nodeType="clickEffect">
+                                  <p:stCondLst>
+                                    <p:cond delay="0"/>
+                                  </p:stCondLst>
+                                  <p:childTnLst>
+                                    <p:set>
+                                      <p:cBhvr>
+                                        <p:cTn id="10" dur="1" fill="hold">
+                                          <p:stCondLst>
+                                            <p:cond delay="0"/>
+                                          </p:stCondLst>
+                                        </p:cTn>
+                                        <p:tgtEl>
+                                          <p:spTgt spid="5">
+                                            <p:txEl>
+                                              <p:pRg st="1" end="1"/>
+                                            </p:txEl>
+                                          </p:spTgt>
+                                        </p:tgtEl>
+                                        <p:attrNameLst>
+                                          <p:attrName>style.visibility</p:attrName>
+                                        </p:attrNameLst>
+                                      </p:cBhvr>
+                                      <p:to>
+                                        <p:strVal val="visible"/>
+                                      </p:to>
+                                    </p:set>
+                                  </p:childTnLst>
+                                </p:cTn>
+                              </p:par>
+                            </p:childTnLst>
+                          </p:cTn>
+                        </p:par>
+                      </p:childTnLst>
+                    </p:cTn>
+                  </p:par>
+                  <p:par>
+                    <p:cTn id="11" fill="hold">
+                      <p:stCondLst>
+                        <p:cond delay="indefinite"/>
+                      </p:stCondLst>
+                      <p:childTnLst>
+                        <p:par>
+                          <p:cTn id="12" fill="hold">
+                            <p:stCondLst>
+                              <p:cond delay="0"/>
+                            </p:stCondLst>
+                            <p:childTnLst>
+                              <p:par>
+                                <p:cTn id="13" presetID="1" presetClass="entr" presetSubtype="0" fill="hold" grpId="0" nodeType="clickEffect">
+                                  <p:stCondLst>
+                                    <p:cond delay="0"/>
+                                  </p:stCondLst>
+                                  <p:childTnLst>
+                                    <p:set>
+                                      <p:cBhvr>
+                                        <p:cTn id="14" dur="1" fill="hold">
+                                          <p:stCondLst>
+                                            <p:cond delay="0"/>
+                                          </p:stCondLst>
+                                        </p:cTn>
+                                        <p:tgtEl>
+                                          <p:spTgt spid="5">
+                                            <p:txEl>
+                                              <p:pRg st="2" end="2"/>
+                                            </p:txEl>
+                                          </p:spTgt>
+                                        </p:tgtEl>
+                                        <p:attrNameLst>
+                                          <p:attrName>style.visibility</p:attrName>
+                                        </p:attrNameLst>
+                                      </p:cBhvr>
+                                      <p:to>
+                                        <p:strVal val="visible"/>
+                                      </p:to>
+                                    </p:set>
+                                  </p:childTnLst>
+                                </p:cTn>
+                              </p:par>
+                            </p:childTnLst>
+                          </p:cTn>
+                        </p:par>
+                      </p:childTnLst>
+                    </p:cTn>
+                  </p:par>
+                  <p:par>
+                    <p:cTn id="15" fill="hold">
+                      <p:stCondLst>
+                        <p:cond delay="indefinite"/>
+                      </p:stCondLst>
+                      <p:childTnLst>
+                        <p:par>
+                          <p:cTn id="16" fill="hold">
+                            <p:stCondLst>
+                              <p:cond delay="0"/>
+                            </p:stCondLst>
+                            <p:childTnLst>
+                              <p:par>
+                                <p:cTn id="17" presetID="1" presetClass="entr" presetSubtype="0" fill="hold" grpId="0" nodeType="clickEffect">
+                                  <p:stCondLst>
+                                    <p:cond delay="0"/>
+                                  </p:stCondLst>
+                                  <p:childTnLst>
+                                    <p:set>
+                                      <p:cBhvr>
+                                        <p:cTn id="18" dur="1" fill="hold">
+                                          <p:stCondLst>
+                                            <p:cond delay="0"/>
+                                          </p:stCondLst>
+                                        </p:cTn>
+                                        <p:tgtEl>
+                                          <p:spTgt spid="5">
+                                            <p:txEl>
+                                              <p:pRg st="3" end="3"/>
+                                            </p:txEl>
+                                          </p:spTgt>
+                                        </p:tgtEl>
+                                        <p:attrNameLst>
+                                          <p:attrName>style.visibility</p:attrName>
+                                        </p:attrNameLst>
+                                      </p:cBhvr>
+                                      <p:to>
+                                        <p:strVal val="visible"/>
+                                      </p:to>
+                                    </p:set>
+                                  </p:childTnLst>
+                                </p:cTn>
+                              </p:par>
+                            </p:childTnLst>
+                          </p:cTn>
+                        </p:par>
+                      </p:childTnLst>
+                    </p:cTn>
+                  </p:par>
+                  <p:par>
+                    <p:cTn id="19" fill="hold">
+                      <p:stCondLst>
+                        <p:cond delay="indefinite"/>
+                      </p:stCondLst>
+                      <p:childTnLst>
+                        <p:par>
+                          <p:cTn id="20" fill="hold">
+                            <p:stCondLst>
+                              <p:cond delay="0"/>
+                            </p:stCondLst>
+                            <p:childTnLst>
+                              <p:par>
+                                <p:cTn id="21" presetID="1" presetClass="entr" presetSubtype="0" fill="hold" grpId="0" nodeType="clickEffect">
+                                  <p:stCondLst>
+                                    <p:cond delay="0"/>
+                                  </p:stCondLst>
+                                  <p:childTnLst>
+                                    <p:set>
+                                      <p:cBhvr>
+                                        <p:cTn id="22" dur="1" fill="hold">
+                                          <p:stCondLst>
+                                            <p:cond delay="0"/>
+                                          </p:stCondLst>
+                                        </p:cTn>
+                                        <p:tgtEl>
+                                          <p:spTgt spid="5">
+                                            <p:txEl>
+                                              <p:pRg st="4" end="4"/>
+                                            </p:txEl>
+                                          </p:spTgt>
+                                        </p:tgtEl>
+                                        <p:attrNameLst>
+                                          <p:attrName>style.visibility</p:attrName>
+                                        </p:attrNameLst>
+                                      </p:cBhvr>
+                                      <p:to>
+                                        <p:strVal val="visible"/>
+                                      </p:to>
+                                    </p:set>
+                                  </p:childTnLst>
+                                </p:cTn>
+                              </p:par>
+                            </p:childTnLst>
+                          </p:cTn>
+                        </p:par>
+                      </p:childTnLst>
+                    </p:cTn>
+                  </p:par>
+                  <p:par>
+                    <p:cTn id="23" fill="hold">
+                      <p:stCondLst>
+                        <p:cond delay="indefinite"/>
+                      </p:stCondLst>
+                      <p:childTnLst>
+                        <p:par>
+                          <p:cTn id="24" fill="hold">
+                            <p:stCondLst>
+                              <p:cond delay="0"/>
+                            </p:stCondLst>
+                            <p:childTnLst>
+                              <p:par>
+                                <p:cTn id="25" presetID="1" presetClass="entr" presetSubtype="0" fill="hold" grpId="0" nodeType="clickEffect">
+                                  <p:stCondLst>
+                                    <p:cond delay="0"/>
+                                  </p:stCondLst>
+                                  <p:childTnLst>
+                                    <p:set>
+                                      <p:cBhvr>
+                                        <p:cTn id="26" dur="1" fill="hold">
+                                          <p:stCondLst>
+                                            <p:cond delay="0"/>
+                                          </p:stCondLst>
+                                        </p:cTn>
+                                        <p:tgtEl>
+                                          <p:spTgt spid="5">
+                                            <p:txEl>
+                                              <p:pRg st="5" end="5"/>
+                                            </p:txEl>
+                                          </p:spTgt>
+                                        </p:tgtEl>
+                                        <p:attrNameLst>
+                                          <p:attrName>style.visibility</p:attrName>
+                                        </p:attrNameLst>
+                                      </p:cBhvr>
+                                      <p:to>
+                                        <p:strVal val="visible"/>
+                                      </p:to>
+                                    </p:set>
+                                  </p:childTnLst>
+                                </p:cTn>
+                              </p:par>
+                              <p:par>
+                                <p:cTn id="27" presetID="1" presetClass="entr" presetSubtype="0" fill="hold" grpId="0" nodeType="withEffect">
+                                  <p:stCondLst>
+                                    <p:cond delay="0"/>
+                                  </p:stCondLst>
+                                  <p:childTnLst>
+                                    <p:set>
+                                      <p:cBhvr>
+                                        <p:cTn id="28" dur="1" fill="hold">
+                                          <p:stCondLst>
+                                            <p:cond delay="0"/>
+                                          </p:stCondLst>
+                                        </p:cTn>
+                                        <p:tgtEl>
+                                          <p:spTgt spid="3">
+                                            <p:txEl>
+                                              <p:pRg st="0" end="0"/>
+                                            </p:txEl>
+                                          </p:spTgt>
+                                        </p:tgtEl>
+                                        <p:attrNameLst>
+                                          <p:attrName>style.visibility</p:attrName>
+                                        </p:attrNameLst>
+                                      </p:cBhvr>
+                                      <p:to>
+                                        <p:strVal val="visible"/>
+                                      </p:to>
+                                    </p:set>
+                                  </p:childTnLst>
+                                </p:cTn>
+                              </p:par>
+                            </p:childTnLst>
+                          </p:cTn>
+                        </p:par>
+                      </p:childTnLst>
+                    </p:cTn>
+                  </p:par>
+                </p:childTnLst>
+              </p:cTn>
+              <p:prevCondLst>
+                <p:cond evt="onPrev" delay="0">
+                  <p:tgtEl>
+                    <p:sldTgt/>
+                  </p:tgtEl>
+                </p:cond>
+              </p:prevCondLst>
+              <p:nextCondLst>
+                <p:cond evt="onNext" delay="0">
+                  <p:tgtEl>
+                    <p:sldTgt/>
+                  </p:tgtEl>
+                </p:cond>
+              </p:nextCondLst>
+            </p:seq>
+          </p:childTnLst>
+        </p:cTn>
+      </p:par>
+    </p:tnLst>
+    <p:bldLst>
+      <p:bldP spid="3" grpId="0" build="p"/>
+      <p:bldP spid="5" grpId="0" uiExpand="1" build="p"/>
+    </p:bldLst>
+  </p:timing>
+</p:sld>
+</file>
+
+<file path=ppt/slides/slide12.xml><?xml version="1.0" encoding="utf-8"?>
+<p:sld xmlns:a="http://schemas.openxmlformats.org/drawingml/2006/main" xmlns:r="http://schemas.openxmlformats.org/officeDocument/2006/relationships" xmlns:p="http://schemas.openxmlformats.org/presentationml/2006/main">
+  <p:cSld>
+    <p:spTree>
+      <p:nvGrpSpPr>
+        <p:cNvPr id="1" name=""/>
+        <p:cNvGrpSpPr/>
+        <p:nvPr/>
+      </p:nvGrpSpPr>
+      <p:grpSpPr>
+        <a:xfrm>
+          <a:off x="0" y="0"/>
+          <a:ext cx="0" cy="0"/>
+          <a:chOff x="0" y="0"/>
+          <a:chExt cx="0" cy="0"/>
+        </a:xfrm>
+      </p:grpSpPr>
+      <p:sp>
+        <p:nvSpPr>
+          <p:cNvPr id="2" name="Tijdelijke aanduiding voor tekst 1"/>
+          <p:cNvSpPr>
+            <a:spLocks noGrp="1"/>
+          </p:cNvSpPr>
+          <p:nvPr>
+            <p:ph type="body" sz="quarter" idx="14"/>
+          </p:nvPr>
+        </p:nvSpPr>
+        <p:spPr/>
+        <p:txBody>
+          <a:bodyPr/>
+          <a:lstStyle/>
+          <a:p>
+            <a:r>
+              <a:rPr lang="en-GB" dirty="0"/>
+              <a:t>Thanks for your attention!</a:t>
+            </a:r>
+          </a:p>
+        </p:txBody>
+      </p:sp>
+    </p:spTree>
+    <p:extLst>
+      <p:ext uri="{BB962C8B-B14F-4D97-AF65-F5344CB8AC3E}">
+        <p14:creationId xmlns:p14="http://schemas.microsoft.com/office/powerpoint/2010/main" val="4114078862"/>
       </p:ext>
     </p:extLst>
   </p:cSld>
@@ -8564,6 +9832,211 @@
 </file>
 
 <file path=ppt/slides/slide4.xml><?xml version="1.0" encoding="utf-8"?>
+<p:sld xmlns:a="http://schemas.openxmlformats.org/drawingml/2006/main" xmlns:r="http://schemas.openxmlformats.org/officeDocument/2006/relationships" xmlns:p="http://schemas.openxmlformats.org/presentationml/2006/main">
+  <p:cSld>
+    <p:spTree>
+      <p:nvGrpSpPr>
+        <p:cNvPr id="1" name=""/>
+        <p:cNvGrpSpPr/>
+        <p:nvPr/>
+      </p:nvGrpSpPr>
+      <p:grpSpPr>
+        <a:xfrm>
+          <a:off x="0" y="0"/>
+          <a:ext cx="0" cy="0"/>
+          <a:chOff x="0" y="0"/>
+          <a:chExt cx="0" cy="0"/>
+        </a:xfrm>
+      </p:grpSpPr>
+      <p:sp>
+        <p:nvSpPr>
+          <p:cNvPr id="2" name="Title 1">
+            <a:extLst>
+              <a:ext uri="{FF2B5EF4-FFF2-40B4-BE49-F238E27FC236}">
+                <a16:creationId xmlns:a16="http://schemas.microsoft.com/office/drawing/2014/main" id="{341572E4-199F-C6BF-70DC-ED20064DD870}"/>
+              </a:ext>
+            </a:extLst>
+          </p:cNvPr>
+          <p:cNvSpPr>
+            <a:spLocks noGrp="1"/>
+          </p:cNvSpPr>
+          <p:nvPr>
+            <p:ph type="title"/>
+          </p:nvPr>
+        </p:nvSpPr>
+        <p:spPr/>
+        <p:txBody>
+          <a:bodyPr/>
+          <a:lstStyle/>
+          <a:p>
+            <a:r>
+              <a:rPr lang="en-GB" dirty="0"/>
+              <a:t>MEG-AHAT</a:t>
+            </a:r>
+            <a:endParaRPr lang="en-US" dirty="0"/>
+          </a:p>
+        </p:txBody>
+      </p:sp>
+      <p:sp>
+        <p:nvSpPr>
+          <p:cNvPr id="3" name="Text Placeholder 2">
+            <a:extLst>
+              <a:ext uri="{FF2B5EF4-FFF2-40B4-BE49-F238E27FC236}">
+                <a16:creationId xmlns:a16="http://schemas.microsoft.com/office/drawing/2014/main" id="{BB162AD0-888B-5507-5AC7-038DD363B151}"/>
+              </a:ext>
+            </a:extLst>
+          </p:cNvPr>
+          <p:cNvSpPr>
+            <a:spLocks noGrp="1"/>
+          </p:cNvSpPr>
+          <p:nvPr>
+            <p:ph type="body" sz="quarter" idx="11"/>
+          </p:nvPr>
+        </p:nvSpPr>
+        <p:spPr>
+          <a:xfrm>
+            <a:off x="2307266" y="4412512"/>
+            <a:ext cx="6836732" cy="730988"/>
+          </a:xfrm>
+        </p:spPr>
+        <p:txBody>
+          <a:bodyPr/>
+          <a:lstStyle/>
+          <a:p>
+            <a:r>
+              <a:rPr lang="en-US" sz="1050" dirty="0"/>
+              <a:t>We consider the three types of visual stimulation as somewhat </a:t>
+            </a:r>
+            <a:r>
+              <a:rPr lang="en-US" sz="1050" i="1" dirty="0"/>
+              <a:t>ordinal</a:t>
+            </a:r>
+            <a:r>
+              <a:rPr lang="en-US" sz="1050" dirty="0"/>
+              <a:t>. Static light is the lower extreme, visible stroboscopic flicker is the upper extreme, and invisible spectral flicker is the middle ground.</a:t>
+            </a:r>
+          </a:p>
+        </p:txBody>
+      </p:sp>
+      <p:sp>
+        <p:nvSpPr>
+          <p:cNvPr id="4" name="Text Placeholder 3">
+            <a:extLst>
+              <a:ext uri="{FF2B5EF4-FFF2-40B4-BE49-F238E27FC236}">
+                <a16:creationId xmlns:a16="http://schemas.microsoft.com/office/drawing/2014/main" id="{1D23DD39-88F9-31CE-402A-2A201F2D4498}"/>
+              </a:ext>
+            </a:extLst>
+          </p:cNvPr>
+          <p:cNvSpPr>
+            <a:spLocks noGrp="1"/>
+          </p:cNvSpPr>
+          <p:nvPr>
+            <p:ph type="body" sz="quarter" idx="12"/>
+          </p:nvPr>
+        </p:nvSpPr>
+        <p:spPr/>
+        <p:txBody>
+          <a:bodyPr/>
+          <a:lstStyle/>
+          <a:p>
+            <a:r>
+              <a:rPr lang="en-US" dirty="0"/>
+              <a:t>Research Questions</a:t>
+            </a:r>
+          </a:p>
+        </p:txBody>
+      </p:sp>
+      <p:sp>
+        <p:nvSpPr>
+          <p:cNvPr id="5" name="Text Placeholder 4">
+            <a:extLst>
+              <a:ext uri="{FF2B5EF4-FFF2-40B4-BE49-F238E27FC236}">
+                <a16:creationId xmlns:a16="http://schemas.microsoft.com/office/drawing/2014/main" id="{F258F11B-B32D-7B7C-9025-A83405B4A800}"/>
+              </a:ext>
+            </a:extLst>
+          </p:cNvPr>
+          <p:cNvSpPr>
+            <a:spLocks noGrp="1"/>
+          </p:cNvSpPr>
+          <p:nvPr>
+            <p:ph type="body" sz="quarter" idx="16"/>
+          </p:nvPr>
+        </p:nvSpPr>
+        <p:spPr>
+          <a:xfrm>
+            <a:off x="900000" y="1080001"/>
+            <a:ext cx="7560000" cy="1920526"/>
+          </a:xfrm>
+        </p:spPr>
+        <p:txBody>
+          <a:bodyPr/>
+          <a:lstStyle/>
+          <a:p>
+            <a:pPr marL="342900" indent="-342900">
+              <a:buFont typeface="Arial"/>
+              <a:buAutoNum type="arabicPeriod"/>
+            </a:pPr>
+            <a:r>
+              <a:rPr lang="en-GB" dirty="0"/>
+              <a:t>Does spatial attention modulate the 40 Hz response propagation from visible stroboscopic flicker and invisible spectral flicker? </a:t>
+            </a:r>
+          </a:p>
+          <a:p>
+            <a:pPr marL="342900" indent="-342900">
+              <a:buFont typeface="Arial"/>
+              <a:buAutoNum type="arabicPeriod"/>
+            </a:pPr>
+            <a:r>
+              <a:rPr lang="en-GB" dirty="0">
+                <a:solidFill>
+                  <a:schemeClr val="bg1">
+                    <a:lumMod val="85000"/>
+                  </a:schemeClr>
+                </a:solidFill>
+              </a:rPr>
+              <a:t>Is the effect on propagation caused by the cognitive engagement or by a specifically visual task?</a:t>
+            </a:r>
+          </a:p>
+          <a:p>
+            <a:pPr marL="342900" indent="-342900">
+              <a:buAutoNum type="arabicPeriod"/>
+            </a:pPr>
+            <a:r>
+              <a:rPr lang="en-GB" dirty="0">
+                <a:solidFill>
+                  <a:schemeClr val="bg1">
+                    <a:lumMod val="85000"/>
+                  </a:schemeClr>
+                </a:solidFill>
+              </a:rPr>
+              <a:t>How does 40 Hz flicker affect cognitive performance?</a:t>
+            </a:r>
+          </a:p>
+          <a:p>
+            <a:pPr marL="342900" indent="-342900">
+              <a:buAutoNum type="arabicPeriod"/>
+            </a:pPr>
+            <a:endParaRPr lang="en-GB" dirty="0"/>
+          </a:p>
+          <a:p>
+            <a:endParaRPr lang="en-GB" dirty="0"/>
+          </a:p>
+        </p:txBody>
+      </p:sp>
+    </p:spTree>
+    <p:extLst>
+      <p:ext uri="{BB962C8B-B14F-4D97-AF65-F5344CB8AC3E}">
+        <p14:creationId xmlns:p14="http://schemas.microsoft.com/office/powerpoint/2010/main" val="3919324862"/>
+      </p:ext>
+    </p:extLst>
+  </p:cSld>
+  <p:clrMapOvr>
+    <a:masterClrMapping/>
+  </p:clrMapOvr>
+</p:sld>
+</file>
+
+<file path=ppt/slides/slide5.xml><?xml version="1.0" encoding="utf-8"?>
 <p:sld xmlns:a="http://schemas.openxmlformats.org/drawingml/2006/main" xmlns:r="http://schemas.openxmlformats.org/officeDocument/2006/relationships" xmlns:p="http://schemas.openxmlformats.org/presentationml/2006/main">
   <p:cSld>
     <p:spTree>
@@ -11934,7 +13407,212 @@
 </p:sld>
 </file>
 
-<file path=ppt/slides/slide5.xml><?xml version="1.0" encoding="utf-8"?>
+<file path=ppt/slides/slide6.xml><?xml version="1.0" encoding="utf-8"?>
+<p:sld xmlns:a="http://schemas.openxmlformats.org/drawingml/2006/main" xmlns:r="http://schemas.openxmlformats.org/officeDocument/2006/relationships" xmlns:p="http://schemas.openxmlformats.org/presentationml/2006/main">
+  <p:cSld>
+    <p:spTree>
+      <p:nvGrpSpPr>
+        <p:cNvPr id="1" name=""/>
+        <p:cNvGrpSpPr/>
+        <p:nvPr/>
+      </p:nvGrpSpPr>
+      <p:grpSpPr>
+        <a:xfrm>
+          <a:off x="0" y="0"/>
+          <a:ext cx="0" cy="0"/>
+          <a:chOff x="0" y="0"/>
+          <a:chExt cx="0" cy="0"/>
+        </a:xfrm>
+      </p:grpSpPr>
+      <p:sp>
+        <p:nvSpPr>
+          <p:cNvPr id="2" name="Title 1">
+            <a:extLst>
+              <a:ext uri="{FF2B5EF4-FFF2-40B4-BE49-F238E27FC236}">
+                <a16:creationId xmlns:a16="http://schemas.microsoft.com/office/drawing/2014/main" id="{341572E4-199F-C6BF-70DC-ED20064DD870}"/>
+              </a:ext>
+            </a:extLst>
+          </p:cNvPr>
+          <p:cNvSpPr>
+            <a:spLocks noGrp="1"/>
+          </p:cNvSpPr>
+          <p:nvPr>
+            <p:ph type="title"/>
+          </p:nvPr>
+        </p:nvSpPr>
+        <p:spPr/>
+        <p:txBody>
+          <a:bodyPr/>
+          <a:lstStyle/>
+          <a:p>
+            <a:r>
+              <a:rPr lang="en-GB" dirty="0"/>
+              <a:t>MEG-AHAT</a:t>
+            </a:r>
+            <a:endParaRPr lang="en-US" dirty="0"/>
+          </a:p>
+        </p:txBody>
+      </p:sp>
+      <p:sp>
+        <p:nvSpPr>
+          <p:cNvPr id="3" name="Text Placeholder 2">
+            <a:extLst>
+              <a:ext uri="{FF2B5EF4-FFF2-40B4-BE49-F238E27FC236}">
+                <a16:creationId xmlns:a16="http://schemas.microsoft.com/office/drawing/2014/main" id="{BB162AD0-888B-5507-5AC7-038DD363B151}"/>
+              </a:ext>
+            </a:extLst>
+          </p:cNvPr>
+          <p:cNvSpPr>
+            <a:spLocks noGrp="1"/>
+          </p:cNvSpPr>
+          <p:nvPr>
+            <p:ph type="body" sz="quarter" idx="11"/>
+          </p:nvPr>
+        </p:nvSpPr>
+        <p:spPr>
+          <a:xfrm>
+            <a:off x="2307266" y="4412512"/>
+            <a:ext cx="6836732" cy="730988"/>
+          </a:xfrm>
+        </p:spPr>
+        <p:txBody>
+          <a:bodyPr/>
+          <a:lstStyle/>
+          <a:p>
+            <a:r>
+              <a:rPr lang="en-US" sz="1050" dirty="0"/>
+              <a:t>We consider the three types of visual stimulation as somewhat </a:t>
+            </a:r>
+            <a:r>
+              <a:rPr lang="en-US" sz="1050" i="1" dirty="0"/>
+              <a:t>ordinal</a:t>
+            </a:r>
+            <a:r>
+              <a:rPr lang="en-US" sz="1050" dirty="0"/>
+              <a:t>. Static light is the lower extreme, visible stroboscopic flicker is the upper extreme, and invisible spectral flicker is the middle ground.</a:t>
+            </a:r>
+          </a:p>
+        </p:txBody>
+      </p:sp>
+      <p:sp>
+        <p:nvSpPr>
+          <p:cNvPr id="4" name="Text Placeholder 3">
+            <a:extLst>
+              <a:ext uri="{FF2B5EF4-FFF2-40B4-BE49-F238E27FC236}">
+                <a16:creationId xmlns:a16="http://schemas.microsoft.com/office/drawing/2014/main" id="{1D23DD39-88F9-31CE-402A-2A201F2D4498}"/>
+              </a:ext>
+            </a:extLst>
+          </p:cNvPr>
+          <p:cNvSpPr>
+            <a:spLocks noGrp="1"/>
+          </p:cNvSpPr>
+          <p:nvPr>
+            <p:ph type="body" sz="quarter" idx="12"/>
+          </p:nvPr>
+        </p:nvSpPr>
+        <p:spPr/>
+        <p:txBody>
+          <a:bodyPr/>
+          <a:lstStyle/>
+          <a:p>
+            <a:r>
+              <a:rPr lang="en-US" dirty="0"/>
+              <a:t>Research Questions</a:t>
+            </a:r>
+          </a:p>
+        </p:txBody>
+      </p:sp>
+      <p:sp>
+        <p:nvSpPr>
+          <p:cNvPr id="5" name="Text Placeholder 4">
+            <a:extLst>
+              <a:ext uri="{FF2B5EF4-FFF2-40B4-BE49-F238E27FC236}">
+                <a16:creationId xmlns:a16="http://schemas.microsoft.com/office/drawing/2014/main" id="{F258F11B-B32D-7B7C-9025-A83405B4A800}"/>
+              </a:ext>
+            </a:extLst>
+          </p:cNvPr>
+          <p:cNvSpPr>
+            <a:spLocks noGrp="1"/>
+          </p:cNvSpPr>
+          <p:nvPr>
+            <p:ph type="body" sz="quarter" idx="16"/>
+          </p:nvPr>
+        </p:nvSpPr>
+        <p:spPr>
+          <a:xfrm>
+            <a:off x="900000" y="1080001"/>
+            <a:ext cx="7560000" cy="1920526"/>
+          </a:xfrm>
+        </p:spPr>
+        <p:txBody>
+          <a:bodyPr/>
+          <a:lstStyle/>
+          <a:p>
+            <a:pPr marL="342900" indent="-342900">
+              <a:buFont typeface="Arial"/>
+              <a:buAutoNum type="arabicPeriod"/>
+            </a:pPr>
+            <a:r>
+              <a:rPr lang="en-GB" dirty="0">
+                <a:solidFill>
+                  <a:schemeClr val="bg1">
+                    <a:lumMod val="75000"/>
+                  </a:schemeClr>
+                </a:solidFill>
+              </a:rPr>
+              <a:t>Does spatial attention modulate the 40 Hz response propagation from visible stroboscopic flicker and invisible spectral flicker? </a:t>
+            </a:r>
+          </a:p>
+          <a:p>
+            <a:pPr marL="342900" indent="-342900">
+              <a:buFont typeface="Arial"/>
+              <a:buAutoNum type="arabicPeriod"/>
+            </a:pPr>
+            <a:r>
+              <a:rPr lang="en-GB" dirty="0"/>
+              <a:t>Is the effect on propagation caused by the cognitive engagement or by a specifically visual task?</a:t>
+            </a:r>
+          </a:p>
+          <a:p>
+            <a:pPr marL="342900" indent="-342900">
+              <a:buAutoNum type="arabicPeriod"/>
+            </a:pPr>
+            <a:r>
+              <a:rPr lang="en-GB" dirty="0">
+                <a:solidFill>
+                  <a:schemeClr val="bg1">
+                    <a:lumMod val="85000"/>
+                  </a:schemeClr>
+                </a:solidFill>
+              </a:rPr>
+              <a:t>How does 40 Hz flicker affect cognitive performance?</a:t>
+            </a:r>
+          </a:p>
+          <a:p>
+            <a:pPr marL="342900" indent="-342900">
+              <a:buAutoNum type="arabicPeriod"/>
+            </a:pPr>
+            <a:endParaRPr lang="en-GB" dirty="0"/>
+          </a:p>
+          <a:p>
+            <a:endParaRPr lang="en-GB" dirty="0"/>
+          </a:p>
+        </p:txBody>
+      </p:sp>
+    </p:spTree>
+    <p:extLst>
+      <p:ext uri="{BB962C8B-B14F-4D97-AF65-F5344CB8AC3E}">
+        <p14:creationId xmlns:p14="http://schemas.microsoft.com/office/powerpoint/2010/main" val="3681294078"/>
+      </p:ext>
+    </p:extLst>
+  </p:cSld>
+  <p:clrMapOvr>
+    <a:masterClrMapping/>
+  </p:clrMapOvr>
+</p:sld>
+</file>
+
+<file path=ppt/slides/slide7.xml><?xml version="1.0" encoding="utf-8"?>
 <p:sld xmlns:a="http://schemas.openxmlformats.org/drawingml/2006/main" xmlns:r="http://schemas.openxmlformats.org/officeDocument/2006/relationships" xmlns:p="http://schemas.openxmlformats.org/presentationml/2006/main">
   <p:cSld>
     <p:spTree>
@@ -15329,7 +17007,334 @@
 </p:sld>
 </file>
 
-<file path=ppt/slides/slide6.xml><?xml version="1.0" encoding="utf-8"?>
+<file path=ppt/slides/slide8.xml><?xml version="1.0" encoding="utf-8"?>
+<p:sld xmlns:a="http://schemas.openxmlformats.org/drawingml/2006/main" xmlns:r="http://schemas.openxmlformats.org/officeDocument/2006/relationships" xmlns:p="http://schemas.openxmlformats.org/presentationml/2006/main">
+  <p:cSld>
+    <p:spTree>
+      <p:nvGrpSpPr>
+        <p:cNvPr id="1" name=""/>
+        <p:cNvGrpSpPr/>
+        <p:nvPr/>
+      </p:nvGrpSpPr>
+      <p:grpSpPr>
+        <a:xfrm>
+          <a:off x="0" y="0"/>
+          <a:ext cx="0" cy="0"/>
+          <a:chOff x="0" y="0"/>
+          <a:chExt cx="0" cy="0"/>
+        </a:xfrm>
+      </p:grpSpPr>
+      <p:sp>
+        <p:nvSpPr>
+          <p:cNvPr id="2" name="Title 1">
+            <a:extLst>
+              <a:ext uri="{FF2B5EF4-FFF2-40B4-BE49-F238E27FC236}">
+                <a16:creationId xmlns:a16="http://schemas.microsoft.com/office/drawing/2014/main" id="{341572E4-199F-C6BF-70DC-ED20064DD870}"/>
+              </a:ext>
+            </a:extLst>
+          </p:cNvPr>
+          <p:cNvSpPr>
+            <a:spLocks noGrp="1"/>
+          </p:cNvSpPr>
+          <p:nvPr>
+            <p:ph type="title"/>
+          </p:nvPr>
+        </p:nvSpPr>
+        <p:spPr/>
+        <p:txBody>
+          <a:bodyPr/>
+          <a:lstStyle/>
+          <a:p>
+            <a:r>
+              <a:rPr lang="en-GB" dirty="0"/>
+              <a:t>MEG-AHAT</a:t>
+            </a:r>
+            <a:endParaRPr lang="en-US" dirty="0"/>
+          </a:p>
+        </p:txBody>
+      </p:sp>
+      <p:sp>
+        <p:nvSpPr>
+          <p:cNvPr id="4" name="Text Placeholder 3">
+            <a:extLst>
+              <a:ext uri="{FF2B5EF4-FFF2-40B4-BE49-F238E27FC236}">
+                <a16:creationId xmlns:a16="http://schemas.microsoft.com/office/drawing/2014/main" id="{1D23DD39-88F9-31CE-402A-2A201F2D4498}"/>
+              </a:ext>
+            </a:extLst>
+          </p:cNvPr>
+          <p:cNvSpPr>
+            <a:spLocks noGrp="1"/>
+          </p:cNvSpPr>
+          <p:nvPr>
+            <p:ph type="body" sz="quarter" idx="12"/>
+          </p:nvPr>
+        </p:nvSpPr>
+        <p:spPr/>
+        <p:txBody>
+          <a:bodyPr/>
+          <a:lstStyle/>
+          <a:p>
+            <a:r>
+              <a:rPr lang="en-US" dirty="0"/>
+              <a:t>Research Questions</a:t>
+            </a:r>
+          </a:p>
+        </p:txBody>
+      </p:sp>
+      <p:sp>
+        <p:nvSpPr>
+          <p:cNvPr id="5" name="Text Placeholder 4">
+            <a:extLst>
+              <a:ext uri="{FF2B5EF4-FFF2-40B4-BE49-F238E27FC236}">
+                <a16:creationId xmlns:a16="http://schemas.microsoft.com/office/drawing/2014/main" id="{F258F11B-B32D-7B7C-9025-A83405B4A800}"/>
+              </a:ext>
+            </a:extLst>
+          </p:cNvPr>
+          <p:cNvSpPr>
+            <a:spLocks noGrp="1"/>
+          </p:cNvSpPr>
+          <p:nvPr>
+            <p:ph type="body" sz="quarter" idx="16"/>
+          </p:nvPr>
+        </p:nvSpPr>
+        <p:spPr>
+          <a:xfrm>
+            <a:off x="900000" y="1080001"/>
+            <a:ext cx="7560000" cy="1920526"/>
+          </a:xfrm>
+        </p:spPr>
+        <p:txBody>
+          <a:bodyPr/>
+          <a:lstStyle/>
+          <a:p>
+            <a:pPr marL="342900" indent="-342900">
+              <a:buFont typeface="Arial"/>
+              <a:buAutoNum type="arabicPeriod"/>
+            </a:pPr>
+            <a:r>
+              <a:rPr lang="en-GB" dirty="0">
+                <a:solidFill>
+                  <a:schemeClr val="bg1">
+                    <a:lumMod val="75000"/>
+                  </a:schemeClr>
+                </a:solidFill>
+              </a:rPr>
+              <a:t>Does spatial attention modulate the 40 Hz response propagation from visible stroboscopic flicker and invisible spectral flicker? </a:t>
+            </a:r>
+          </a:p>
+          <a:p>
+            <a:pPr marL="342900" indent="-342900">
+              <a:buFont typeface="Arial"/>
+              <a:buAutoNum type="arabicPeriod"/>
+            </a:pPr>
+            <a:r>
+              <a:rPr lang="en-GB" dirty="0">
+                <a:solidFill>
+                  <a:schemeClr val="bg1">
+                    <a:lumMod val="75000"/>
+                  </a:schemeClr>
+                </a:solidFill>
+              </a:rPr>
+              <a:t>Is the effect on propagation caused by the cognitive engagement or by a specifically visual task?</a:t>
+            </a:r>
+            <a:endParaRPr lang="en-GB" dirty="0"/>
+          </a:p>
+          <a:p>
+            <a:pPr marL="342900" indent="-342900">
+              <a:buAutoNum type="arabicPeriod"/>
+            </a:pPr>
+            <a:r>
+              <a:rPr lang="en-GB" dirty="0"/>
+              <a:t>How does 40 Hz flicker affect cognitive performance?</a:t>
+            </a:r>
+          </a:p>
+          <a:p>
+            <a:pPr marL="342900" indent="-342900">
+              <a:buAutoNum type="arabicPeriod"/>
+            </a:pPr>
+            <a:endParaRPr lang="en-GB" dirty="0">
+              <a:solidFill>
+                <a:schemeClr val="bg1">
+                  <a:lumMod val="75000"/>
+                </a:schemeClr>
+              </a:solidFill>
+            </a:endParaRPr>
+          </a:p>
+          <a:p>
+            <a:endParaRPr lang="en-GB" dirty="0">
+              <a:solidFill>
+                <a:schemeClr val="bg1">
+                  <a:lumMod val="75000"/>
+                </a:schemeClr>
+              </a:solidFill>
+            </a:endParaRPr>
+          </a:p>
+        </p:txBody>
+      </p:sp>
+      <p:pic>
+        <p:nvPicPr>
+          <p:cNvPr id="6" name="Picture 2" descr="Big Red - Accessibility Switches">
+            <a:extLst>
+              <a:ext uri="{FF2B5EF4-FFF2-40B4-BE49-F238E27FC236}">
+                <a16:creationId xmlns:a16="http://schemas.microsoft.com/office/drawing/2014/main" id="{7F85FB6C-2CAC-497E-BBD1-C982D7690EF8}"/>
+              </a:ext>
+            </a:extLst>
+          </p:cNvPr>
+          <p:cNvPicPr>
+            <a:picLocks noChangeAspect="1" noChangeArrowheads="1"/>
+          </p:cNvPicPr>
+          <p:nvPr/>
+        </p:nvPicPr>
+        <p:blipFill>
+          <a:blip r:embed="rId3">
+            <a:extLst>
+              <a:ext uri="{28A0092B-C50C-407E-A947-70E740481C1C}">
+                <a14:useLocalDpi xmlns:a14="http://schemas.microsoft.com/office/drawing/2010/main" val="0"/>
+              </a:ext>
+            </a:extLst>
+          </a:blip>
+          <a:srcRect/>
+          <a:stretch>
+            <a:fillRect/>
+          </a:stretch>
+        </p:blipFill>
+        <p:spPr bwMode="auto">
+          <a:xfrm>
+            <a:off x="6052088" y="2161177"/>
+            <a:ext cx="1865593" cy="1865593"/>
+          </a:xfrm>
+          <a:prstGeom prst="rect">
+            <a:avLst/>
+          </a:prstGeom>
+          <a:noFill/>
+          <a:extLst>
+            <a:ext uri="{909E8E84-426E-40DD-AFC4-6F175D3DCCD1}">
+              <a14:hiddenFill xmlns:a14="http://schemas.microsoft.com/office/drawing/2010/main">
+                <a:solidFill>
+                  <a:srgbClr val="FFFFFF"/>
+                </a:solidFill>
+              </a14:hiddenFill>
+            </a:ext>
+          </a:extLst>
+        </p:spPr>
+      </p:pic>
+      <p:sp>
+        <p:nvSpPr>
+          <p:cNvPr id="8" name="Text Placeholder 7">
+            <a:extLst>
+              <a:ext uri="{FF2B5EF4-FFF2-40B4-BE49-F238E27FC236}">
+                <a16:creationId xmlns:a16="http://schemas.microsoft.com/office/drawing/2014/main" id="{186CC43A-218D-4D3D-854D-E1EDEF5243CF}"/>
+              </a:ext>
+            </a:extLst>
+          </p:cNvPr>
+          <p:cNvSpPr>
+            <a:spLocks noGrp="1"/>
+          </p:cNvSpPr>
+          <p:nvPr>
+            <p:ph type="body" sz="quarter" idx="11"/>
+          </p:nvPr>
+        </p:nvSpPr>
+        <p:spPr/>
+        <p:txBody>
+          <a:bodyPr/>
+          <a:lstStyle/>
+          <a:p>
+            <a:endParaRPr lang="en-US"/>
+          </a:p>
+        </p:txBody>
+      </p:sp>
+    </p:spTree>
+    <p:extLst>
+      <p:ext uri="{BB962C8B-B14F-4D97-AF65-F5344CB8AC3E}">
+        <p14:creationId xmlns:p14="http://schemas.microsoft.com/office/powerpoint/2010/main" val="139034675"/>
+      </p:ext>
+    </p:extLst>
+  </p:cSld>
+  <p:clrMapOvr>
+    <a:masterClrMapping/>
+  </p:clrMapOvr>
+  <p:timing>
+    <p:tnLst>
+      <p:par>
+        <p:cTn id="1" dur="indefinite" restart="never" nodeType="tmRoot">
+          <p:childTnLst>
+            <p:seq concurrent="1" nextAc="seek">
+              <p:cTn id="2" dur="indefinite" nodeType="mainSeq">
+                <p:childTnLst>
+                  <p:par>
+                    <p:cTn id="3" fill="hold">
+                      <p:stCondLst>
+                        <p:cond delay="indefinite"/>
+                        <p:cond evt="onBegin" delay="0">
+                          <p:tn val="2"/>
+                        </p:cond>
+                      </p:stCondLst>
+                      <p:childTnLst>
+                        <p:par>
+                          <p:cTn id="4" fill="hold">
+                            <p:stCondLst>
+                              <p:cond delay="0"/>
+                            </p:stCondLst>
+                            <p:childTnLst>
+                              <p:par>
+                                <p:cTn id="5" presetID="1" presetClass="entr" presetSubtype="0" fill="hold" nodeType="withEffect">
+                                  <p:stCondLst>
+                                    <p:cond delay="0"/>
+                                  </p:stCondLst>
+                                  <p:childTnLst>
+                                    <p:set>
+                                      <p:cBhvr>
+                                        <p:cTn id="6" dur="1" fill="hold">
+                                          <p:stCondLst>
+                                            <p:cond delay="0"/>
+                                          </p:stCondLst>
+                                        </p:cTn>
+                                        <p:tgtEl>
+                                          <p:spTgt spid="6"/>
+                                        </p:tgtEl>
+                                        <p:attrNameLst>
+                                          <p:attrName>style.visibility</p:attrName>
+                                        </p:attrNameLst>
+                                      </p:cBhvr>
+                                      <p:to>
+                                        <p:strVal val="visible"/>
+                                      </p:to>
+                                    </p:set>
+                                  </p:childTnLst>
+                                </p:cTn>
+                              </p:par>
+                            </p:childTnLst>
+                          </p:cTn>
+                        </p:par>
+                      </p:childTnLst>
+                    </p:cTn>
+                  </p:par>
+                </p:childTnLst>
+              </p:cTn>
+              <p:prevCondLst>
+                <p:cond evt="onPrev" delay="0">
+                  <p:tgtEl>
+                    <p:sldTgt/>
+                  </p:tgtEl>
+                </p:cond>
+              </p:prevCondLst>
+              <p:nextCondLst>
+                <p:cond evt="onNext" delay="0">
+                  <p:tgtEl>
+                    <p:sldTgt/>
+                  </p:tgtEl>
+                </p:cond>
+              </p:nextCondLst>
+            </p:seq>
+          </p:childTnLst>
+        </p:cTn>
+      </p:par>
+    </p:tnLst>
+  </p:timing>
+</p:sld>
+</file>
+
+<file path=ppt/slides/slide9.xml><?xml version="1.0" encoding="utf-8"?>
 <p:sld xmlns:a="http://schemas.openxmlformats.org/drawingml/2006/main" xmlns:r="http://schemas.openxmlformats.org/officeDocument/2006/relationships" xmlns:p="http://schemas.openxmlformats.org/presentationml/2006/main">
   <p:cSld>
     <p:spTree>
@@ -16007,959 +18012,6 @@
       <p:bldP spid="7" grpId="0" build="p"/>
     </p:bldLst>
   </p:timing>
-</p:sld>
-</file>
-
-<file path=ppt/slides/slide7.xml><?xml version="1.0" encoding="utf-8"?>
-<p:sld xmlns:a="http://schemas.openxmlformats.org/drawingml/2006/main" xmlns:r="http://schemas.openxmlformats.org/officeDocument/2006/relationships" xmlns:p="http://schemas.openxmlformats.org/presentationml/2006/main">
-  <p:cSld>
-    <p:spTree>
-      <p:nvGrpSpPr>
-        <p:cNvPr id="1" name=""/>
-        <p:cNvGrpSpPr/>
-        <p:nvPr/>
-      </p:nvGrpSpPr>
-      <p:grpSpPr>
-        <a:xfrm>
-          <a:off x="0" y="0"/>
-          <a:ext cx="0" cy="0"/>
-          <a:chOff x="0" y="0"/>
-          <a:chExt cx="0" cy="0"/>
-        </a:xfrm>
-      </p:grpSpPr>
-      <p:sp>
-        <p:nvSpPr>
-          <p:cNvPr id="2" name="Title 1">
-            <a:extLst>
-              <a:ext uri="{FF2B5EF4-FFF2-40B4-BE49-F238E27FC236}">
-                <a16:creationId xmlns:a16="http://schemas.microsoft.com/office/drawing/2014/main" id="{15C9CC45-7998-974B-FD75-1ADC521A27E3}"/>
-              </a:ext>
-            </a:extLst>
-          </p:cNvPr>
-          <p:cNvSpPr>
-            <a:spLocks noGrp="1"/>
-          </p:cNvSpPr>
-          <p:nvPr>
-            <p:ph type="title"/>
-          </p:nvPr>
-        </p:nvSpPr>
-        <p:spPr/>
-        <p:txBody>
-          <a:bodyPr/>
-          <a:lstStyle/>
-          <a:p>
-            <a:r>
-              <a:rPr lang="en-GB" dirty="0"/>
-              <a:t>MEG-AHAT</a:t>
-            </a:r>
-            <a:endParaRPr lang="en-US" dirty="0"/>
-          </a:p>
-        </p:txBody>
-      </p:sp>
-      <p:sp>
-        <p:nvSpPr>
-          <p:cNvPr id="3" name="Text Placeholder 2">
-            <a:extLst>
-              <a:ext uri="{FF2B5EF4-FFF2-40B4-BE49-F238E27FC236}">
-                <a16:creationId xmlns:a16="http://schemas.microsoft.com/office/drawing/2014/main" id="{3DD26902-F0DE-8D2E-8A86-76295789FE86}"/>
-              </a:ext>
-            </a:extLst>
-          </p:cNvPr>
-          <p:cNvSpPr>
-            <a:spLocks noGrp="1"/>
-          </p:cNvSpPr>
-          <p:nvPr>
-            <p:ph type="body" sz="quarter" idx="11"/>
-          </p:nvPr>
-        </p:nvSpPr>
-        <p:spPr/>
-        <p:txBody>
-          <a:bodyPr/>
-          <a:lstStyle/>
-          <a:p>
-            <a:endParaRPr lang="en-US"/>
-          </a:p>
-        </p:txBody>
-      </p:sp>
-      <p:sp>
-        <p:nvSpPr>
-          <p:cNvPr id="4" name="Text Placeholder 3">
-            <a:extLst>
-              <a:ext uri="{FF2B5EF4-FFF2-40B4-BE49-F238E27FC236}">
-                <a16:creationId xmlns:a16="http://schemas.microsoft.com/office/drawing/2014/main" id="{B76F7E2C-DCEC-4E63-0B4A-228EF6EF881E}"/>
-              </a:ext>
-            </a:extLst>
-          </p:cNvPr>
-          <p:cNvSpPr>
-            <a:spLocks noGrp="1"/>
-          </p:cNvSpPr>
-          <p:nvPr>
-            <p:ph type="body" sz="quarter" idx="12"/>
-          </p:nvPr>
-        </p:nvSpPr>
-        <p:spPr/>
-        <p:txBody>
-          <a:bodyPr/>
-          <a:lstStyle/>
-          <a:p>
-            <a:r>
-              <a:rPr lang="en-US" dirty="0"/>
-              <a:t>Data Analysis</a:t>
-            </a:r>
-          </a:p>
-        </p:txBody>
-      </p:sp>
-      <p:sp>
-        <p:nvSpPr>
-          <p:cNvPr id="5" name="Text Placeholder 4">
-            <a:extLst>
-              <a:ext uri="{FF2B5EF4-FFF2-40B4-BE49-F238E27FC236}">
-                <a16:creationId xmlns:a16="http://schemas.microsoft.com/office/drawing/2014/main" id="{7F4E64EE-B05D-0099-E6DD-E87D9856BCC4}"/>
-              </a:ext>
-            </a:extLst>
-          </p:cNvPr>
-          <p:cNvSpPr>
-            <a:spLocks noGrp="1"/>
-          </p:cNvSpPr>
-          <p:nvPr>
-            <p:ph type="body" sz="quarter" idx="16"/>
-          </p:nvPr>
-        </p:nvSpPr>
-        <p:spPr>
-          <a:xfrm>
-            <a:off x="900000" y="1080001"/>
-            <a:ext cx="7560000" cy="1034129"/>
-          </a:xfrm>
-        </p:spPr>
-        <p:txBody>
-          <a:bodyPr/>
-          <a:lstStyle/>
-          <a:p>
-            <a:pPr marL="285750" indent="-285750">
-              <a:buFont typeface="Arial" panose="020B0604020202020204" pitchFamily="34" charset="0"/>
-              <a:buChar char="•"/>
-            </a:pPr>
-            <a:r>
-              <a:rPr lang="en-GB" dirty="0"/>
-              <a:t>Stimulation artefacts are expected but are orthogonal to the design of the experiment and will be suppressed by spatial filtering such as beamforming.</a:t>
-            </a:r>
-          </a:p>
-          <a:p>
-            <a:pPr marL="285750" indent="-285750">
-              <a:buFont typeface="Arial" panose="020B0604020202020204" pitchFamily="34" charset="0"/>
-              <a:buChar char="•"/>
-            </a:pPr>
-            <a:r>
-              <a:rPr lang="en-GB" dirty="0"/>
-              <a:t>Mixed linear models with 40 Hz power as the dependent variable and stimulus (fixed effect), task (fixed effect), and subject (random effect) as independent variables.</a:t>
-            </a:r>
-          </a:p>
-        </p:txBody>
-      </p:sp>
-    </p:spTree>
-    <p:extLst>
-      <p:ext uri="{BB962C8B-B14F-4D97-AF65-F5344CB8AC3E}">
-        <p14:creationId xmlns:p14="http://schemas.microsoft.com/office/powerpoint/2010/main" val="4173196176"/>
-      </p:ext>
-    </p:extLst>
-  </p:cSld>
-  <p:clrMapOvr>
-    <a:masterClrMapping/>
-  </p:clrMapOvr>
-  <p:timing>
-    <p:tnLst>
-      <p:par>
-        <p:cTn id="1" dur="indefinite" restart="never" nodeType="tmRoot">
-          <p:childTnLst>
-            <p:seq concurrent="1" nextAc="seek">
-              <p:cTn id="2" dur="indefinite" nodeType="mainSeq">
-                <p:childTnLst>
-                  <p:par>
-                    <p:cTn id="3" fill="hold">
-                      <p:stCondLst>
-                        <p:cond delay="indefinite"/>
-                      </p:stCondLst>
-                      <p:childTnLst>
-                        <p:par>
-                          <p:cTn id="4" fill="hold">
-                            <p:stCondLst>
-                              <p:cond delay="0"/>
-                            </p:stCondLst>
-                            <p:childTnLst>
-                              <p:par>
-                                <p:cTn id="5" presetID="1" presetClass="entr" presetSubtype="0" fill="hold" grpId="0" nodeType="clickEffect">
-                                  <p:stCondLst>
-                                    <p:cond delay="0"/>
-                                  </p:stCondLst>
-                                  <p:childTnLst>
-                                    <p:set>
-                                      <p:cBhvr>
-                                        <p:cTn id="6" dur="1" fill="hold">
-                                          <p:stCondLst>
-                                            <p:cond delay="0"/>
-                                          </p:stCondLst>
-                                        </p:cTn>
-                                        <p:tgtEl>
-                                          <p:spTgt spid="5">
-                                            <p:txEl>
-                                              <p:pRg st="0" end="0"/>
-                                            </p:txEl>
-                                          </p:spTgt>
-                                        </p:tgtEl>
-                                        <p:attrNameLst>
-                                          <p:attrName>style.visibility</p:attrName>
-                                        </p:attrNameLst>
-                                      </p:cBhvr>
-                                      <p:to>
-                                        <p:strVal val="visible"/>
-                                      </p:to>
-                                    </p:set>
-                                  </p:childTnLst>
-                                </p:cTn>
-                              </p:par>
-                            </p:childTnLst>
-                          </p:cTn>
-                        </p:par>
-                      </p:childTnLst>
-                    </p:cTn>
-                  </p:par>
-                  <p:par>
-                    <p:cTn id="7" fill="hold">
-                      <p:stCondLst>
-                        <p:cond delay="indefinite"/>
-                      </p:stCondLst>
-                      <p:childTnLst>
-                        <p:par>
-                          <p:cTn id="8" fill="hold">
-                            <p:stCondLst>
-                              <p:cond delay="0"/>
-                            </p:stCondLst>
-                            <p:childTnLst>
-                              <p:par>
-                                <p:cTn id="9" presetID="1" presetClass="entr" presetSubtype="0" fill="hold" grpId="0" nodeType="clickEffect">
-                                  <p:stCondLst>
-                                    <p:cond delay="0"/>
-                                  </p:stCondLst>
-                                  <p:childTnLst>
-                                    <p:set>
-                                      <p:cBhvr>
-                                        <p:cTn id="10" dur="1" fill="hold">
-                                          <p:stCondLst>
-                                            <p:cond delay="0"/>
-                                          </p:stCondLst>
-                                        </p:cTn>
-                                        <p:tgtEl>
-                                          <p:spTgt spid="5">
-                                            <p:txEl>
-                                              <p:pRg st="1" end="1"/>
-                                            </p:txEl>
-                                          </p:spTgt>
-                                        </p:tgtEl>
-                                        <p:attrNameLst>
-                                          <p:attrName>style.visibility</p:attrName>
-                                        </p:attrNameLst>
-                                      </p:cBhvr>
-                                      <p:to>
-                                        <p:strVal val="visible"/>
-                                      </p:to>
-                                    </p:set>
-                                  </p:childTnLst>
-                                </p:cTn>
-                              </p:par>
-                            </p:childTnLst>
-                          </p:cTn>
-                        </p:par>
-                      </p:childTnLst>
-                    </p:cTn>
-                  </p:par>
-                </p:childTnLst>
-              </p:cTn>
-              <p:prevCondLst>
-                <p:cond evt="onPrev" delay="0">
-                  <p:tgtEl>
-                    <p:sldTgt/>
-                  </p:tgtEl>
-                </p:cond>
-              </p:prevCondLst>
-              <p:nextCondLst>
-                <p:cond evt="onNext" delay="0">
-                  <p:tgtEl>
-                    <p:sldTgt/>
-                  </p:tgtEl>
-                </p:cond>
-              </p:nextCondLst>
-            </p:seq>
-          </p:childTnLst>
-        </p:cTn>
-      </p:par>
-    </p:tnLst>
-    <p:bldLst>
-      <p:bldP spid="5" grpId="0" build="p"/>
-    </p:bldLst>
-  </p:timing>
-</p:sld>
-</file>
-
-<file path=ppt/slides/slide8.xml><?xml version="1.0" encoding="utf-8"?>
-<p:sld xmlns:a="http://schemas.openxmlformats.org/drawingml/2006/main" xmlns:r="http://schemas.openxmlformats.org/officeDocument/2006/relationships" xmlns:p="http://schemas.openxmlformats.org/presentationml/2006/main">
-  <p:cSld>
-    <p:spTree>
-      <p:nvGrpSpPr>
-        <p:cNvPr id="1" name=""/>
-        <p:cNvGrpSpPr/>
-        <p:nvPr/>
-      </p:nvGrpSpPr>
-      <p:grpSpPr>
-        <a:xfrm>
-          <a:off x="0" y="0"/>
-          <a:ext cx="0" cy="0"/>
-          <a:chOff x="0" y="0"/>
-          <a:chExt cx="0" cy="0"/>
-        </a:xfrm>
-      </p:grpSpPr>
-      <p:sp>
-        <p:nvSpPr>
-          <p:cNvPr id="2" name="Title 1">
-            <a:extLst>
-              <a:ext uri="{FF2B5EF4-FFF2-40B4-BE49-F238E27FC236}">
-                <a16:creationId xmlns:a16="http://schemas.microsoft.com/office/drawing/2014/main" id="{15C9CC45-7998-974B-FD75-1ADC521A27E3}"/>
-              </a:ext>
-            </a:extLst>
-          </p:cNvPr>
-          <p:cNvSpPr>
-            <a:spLocks noGrp="1"/>
-          </p:cNvSpPr>
-          <p:nvPr>
-            <p:ph type="title"/>
-          </p:nvPr>
-        </p:nvSpPr>
-        <p:spPr/>
-        <p:txBody>
-          <a:bodyPr/>
-          <a:lstStyle/>
-          <a:p>
-            <a:r>
-              <a:rPr lang="en-GB" dirty="0"/>
-              <a:t>MEG-AHAT</a:t>
-            </a:r>
-            <a:endParaRPr lang="en-US" dirty="0"/>
-          </a:p>
-        </p:txBody>
-      </p:sp>
-      <p:sp>
-        <p:nvSpPr>
-          <p:cNvPr id="3" name="Text Placeholder 2">
-            <a:extLst>
-              <a:ext uri="{FF2B5EF4-FFF2-40B4-BE49-F238E27FC236}">
-                <a16:creationId xmlns:a16="http://schemas.microsoft.com/office/drawing/2014/main" id="{3DD26902-F0DE-8D2E-8A86-76295789FE86}"/>
-              </a:ext>
-            </a:extLst>
-          </p:cNvPr>
-          <p:cNvSpPr>
-            <a:spLocks noGrp="1"/>
-          </p:cNvSpPr>
-          <p:nvPr>
-            <p:ph type="body" sz="quarter" idx="11"/>
-          </p:nvPr>
-        </p:nvSpPr>
-        <p:spPr/>
-        <p:txBody>
-          <a:bodyPr/>
-          <a:lstStyle/>
-          <a:p>
-            <a:r>
-              <a:rPr lang="en-US" dirty="0"/>
-              <a:t>* See </a:t>
-            </a:r>
-            <a:r>
-              <a:rPr lang="en-US" dirty="0" err="1"/>
-              <a:t>ClinicalTrials.gov</a:t>
-            </a:r>
-            <a:r>
-              <a:rPr lang="en-US" dirty="0"/>
-              <a:t> IDs: NCT03543878, NCT05637801, NCT03556280, NCT04574921, NCT05260177</a:t>
-            </a:r>
-          </a:p>
-        </p:txBody>
-      </p:sp>
-      <p:sp>
-        <p:nvSpPr>
-          <p:cNvPr id="4" name="Text Placeholder 3">
-            <a:extLst>
-              <a:ext uri="{FF2B5EF4-FFF2-40B4-BE49-F238E27FC236}">
-                <a16:creationId xmlns:a16="http://schemas.microsoft.com/office/drawing/2014/main" id="{B76F7E2C-DCEC-4E63-0B4A-228EF6EF881E}"/>
-              </a:ext>
-            </a:extLst>
-          </p:cNvPr>
-          <p:cNvSpPr>
-            <a:spLocks noGrp="1"/>
-          </p:cNvSpPr>
-          <p:nvPr>
-            <p:ph type="body" sz="quarter" idx="12"/>
-          </p:nvPr>
-        </p:nvSpPr>
-        <p:spPr/>
-        <p:txBody>
-          <a:bodyPr/>
-          <a:lstStyle/>
-          <a:p>
-            <a:r>
-              <a:rPr lang="en-US" dirty="0"/>
-              <a:t>Impact</a:t>
-            </a:r>
-          </a:p>
-        </p:txBody>
-      </p:sp>
-      <p:sp>
-        <p:nvSpPr>
-          <p:cNvPr id="5" name="Text Placeholder 4">
-            <a:extLst>
-              <a:ext uri="{FF2B5EF4-FFF2-40B4-BE49-F238E27FC236}">
-                <a16:creationId xmlns:a16="http://schemas.microsoft.com/office/drawing/2014/main" id="{7F4E64EE-B05D-0099-E6DD-E87D9856BCC4}"/>
-              </a:ext>
-            </a:extLst>
-          </p:cNvPr>
-          <p:cNvSpPr>
-            <a:spLocks noGrp="1"/>
-          </p:cNvSpPr>
-          <p:nvPr>
-            <p:ph type="body" sz="quarter" idx="16"/>
-          </p:nvPr>
-        </p:nvSpPr>
-        <p:spPr>
-          <a:xfrm>
-            <a:off x="496111" y="1080000"/>
-            <a:ext cx="8453336" cy="1982081"/>
-          </a:xfrm>
-        </p:spPr>
-        <p:txBody>
-          <a:bodyPr/>
-          <a:lstStyle/>
-          <a:p>
-            <a:pPr marL="285750" indent="-285750">
-              <a:buFont typeface="Arial" panose="020B0604020202020204" pitchFamily="34" charset="0"/>
-              <a:buChar char="•"/>
-            </a:pPr>
-            <a:r>
-              <a:rPr lang="en-US" sz="1400" dirty="0">
-                <a:latin typeface="Times New Roman" panose="02020603050405020304" pitchFamily="18" charset="0"/>
-                <a:cs typeface="Times New Roman" panose="02020603050405020304" pitchFamily="18" charset="0"/>
-              </a:rPr>
-              <a:t>Informative for the understanding of how 40 Hz stimulation may affect Alzheimer’s disease</a:t>
-            </a:r>
-          </a:p>
-          <a:p>
-            <a:pPr marL="285750" indent="-285750">
-              <a:buFont typeface="Arial" panose="020B0604020202020204" pitchFamily="34" charset="0"/>
-              <a:buChar char="•"/>
-            </a:pPr>
-            <a:r>
-              <a:rPr lang="en-US" sz="1400" dirty="0">
-                <a:latin typeface="Times New Roman" panose="02020603050405020304" pitchFamily="18" charset="0"/>
-                <a:cs typeface="Times New Roman" panose="02020603050405020304" pitchFamily="18" charset="0"/>
-              </a:rPr>
-              <a:t>May influence the implementation of at-home 40 Hz stimulation:</a:t>
-            </a:r>
-          </a:p>
-          <a:p>
-            <a:pPr marL="1028700" lvl="1">
-              <a:buFont typeface="Arial" panose="020B0604020202020204" pitchFamily="34" charset="0"/>
-              <a:buChar char="•"/>
-            </a:pPr>
-            <a:r>
-              <a:rPr lang="en-US" sz="1400" dirty="0">
-                <a:latin typeface="Times New Roman" panose="02020603050405020304" pitchFamily="18" charset="0"/>
-                <a:cs typeface="Times New Roman" panose="02020603050405020304" pitchFamily="18" charset="0"/>
-              </a:rPr>
-              <a:t>Is the amount of (visible) flicker important?</a:t>
-            </a:r>
-          </a:p>
-          <a:p>
-            <a:pPr marL="1028700" lvl="1">
-              <a:buFont typeface="Arial" panose="020B0604020202020204" pitchFamily="34" charset="0"/>
-              <a:buChar char="•"/>
-            </a:pPr>
-            <a:r>
-              <a:rPr lang="en-US" sz="1400" dirty="0">
-                <a:latin typeface="Times New Roman" panose="02020603050405020304" pitchFamily="18" charset="0"/>
-                <a:cs typeface="Times New Roman" panose="02020603050405020304" pitchFamily="18" charset="0"/>
-              </a:rPr>
-              <a:t>Should the user attend to the stimulation?</a:t>
-            </a:r>
-          </a:p>
-          <a:p>
-            <a:pPr marL="1028700" lvl="1">
-              <a:buFont typeface="Arial" panose="020B0604020202020204" pitchFamily="34" charset="0"/>
-              <a:buChar char="•"/>
-            </a:pPr>
-            <a:r>
-              <a:rPr lang="en-US" sz="1400" dirty="0">
-                <a:latin typeface="Times New Roman" panose="02020603050405020304" pitchFamily="18" charset="0"/>
-                <a:cs typeface="Times New Roman" panose="02020603050405020304" pitchFamily="18" charset="0"/>
-              </a:rPr>
-              <a:t>Should the user do cognitively demanding work during stimulation?</a:t>
-            </a:r>
-          </a:p>
-          <a:p>
-            <a:pPr marL="285750" indent="-285750">
-              <a:buFont typeface="Arial" panose="020B0604020202020204" pitchFamily="34" charset="0"/>
-              <a:buChar char="•"/>
-            </a:pPr>
-            <a:r>
-              <a:rPr lang="en-US" sz="1400" dirty="0">
-                <a:latin typeface="Times New Roman" panose="02020603050405020304" pitchFamily="18" charset="0"/>
-                <a:cs typeface="Times New Roman" panose="02020603050405020304" pitchFamily="18" charset="0"/>
-              </a:rPr>
-              <a:t>Does </a:t>
-            </a:r>
-            <a:r>
-              <a:rPr lang="en-US" sz="1400" i="1" dirty="0">
-                <a:latin typeface="Times New Roman" panose="02020603050405020304" pitchFamily="18" charset="0"/>
-                <a:cs typeface="Times New Roman" panose="02020603050405020304" pitchFamily="18" charset="0"/>
-              </a:rPr>
-              <a:t>not</a:t>
-            </a:r>
-            <a:r>
-              <a:rPr lang="en-US" sz="1400" dirty="0">
-                <a:latin typeface="Times New Roman" panose="02020603050405020304" pitchFamily="18" charset="0"/>
-                <a:cs typeface="Times New Roman" panose="02020603050405020304" pitchFamily="18" charset="0"/>
-              </a:rPr>
-              <a:t> directly inform about the clinical efficacy of 40 Hz stimulation, but this is pursued in ongoing clinical trials*</a:t>
-            </a:r>
-          </a:p>
-          <a:p>
-            <a:pPr marL="285750" indent="-285750">
-              <a:buFont typeface="Arial" panose="020B0604020202020204" pitchFamily="34" charset="0"/>
-              <a:buChar char="•"/>
-            </a:pPr>
-            <a:endParaRPr lang="en-US" sz="1400" dirty="0">
-              <a:latin typeface="Times New Roman" panose="02020603050405020304" pitchFamily="18" charset="0"/>
-              <a:cs typeface="Times New Roman" panose="02020603050405020304" pitchFamily="18" charset="0"/>
-            </a:endParaRPr>
-          </a:p>
-        </p:txBody>
-      </p:sp>
-    </p:spTree>
-    <p:extLst>
-      <p:ext uri="{BB962C8B-B14F-4D97-AF65-F5344CB8AC3E}">
-        <p14:creationId xmlns:p14="http://schemas.microsoft.com/office/powerpoint/2010/main" val="4271881490"/>
-      </p:ext>
-    </p:extLst>
-  </p:cSld>
-  <p:clrMapOvr>
-    <a:masterClrMapping/>
-  </p:clrMapOvr>
-  <p:timing>
-    <p:tnLst>
-      <p:par>
-        <p:cTn id="1" dur="indefinite" restart="never" nodeType="tmRoot">
-          <p:childTnLst>
-            <p:seq concurrent="1" nextAc="seek">
-              <p:cTn id="2" dur="indefinite" nodeType="mainSeq">
-                <p:childTnLst>
-                  <p:par>
-                    <p:cTn id="3" fill="hold">
-                      <p:stCondLst>
-                        <p:cond delay="indefinite"/>
-                      </p:stCondLst>
-                      <p:childTnLst>
-                        <p:par>
-                          <p:cTn id="4" fill="hold">
-                            <p:stCondLst>
-                              <p:cond delay="0"/>
-                            </p:stCondLst>
-                            <p:childTnLst>
-                              <p:par>
-                                <p:cTn id="5" presetID="1" presetClass="entr" presetSubtype="0" fill="hold" grpId="0" nodeType="clickEffect">
-                                  <p:stCondLst>
-                                    <p:cond delay="0"/>
-                                  </p:stCondLst>
-                                  <p:childTnLst>
-                                    <p:set>
-                                      <p:cBhvr>
-                                        <p:cTn id="6" dur="1" fill="hold">
-                                          <p:stCondLst>
-                                            <p:cond delay="0"/>
-                                          </p:stCondLst>
-                                        </p:cTn>
-                                        <p:tgtEl>
-                                          <p:spTgt spid="5">
-                                            <p:txEl>
-                                              <p:pRg st="0" end="0"/>
-                                            </p:txEl>
-                                          </p:spTgt>
-                                        </p:tgtEl>
-                                        <p:attrNameLst>
-                                          <p:attrName>style.visibility</p:attrName>
-                                        </p:attrNameLst>
-                                      </p:cBhvr>
-                                      <p:to>
-                                        <p:strVal val="visible"/>
-                                      </p:to>
-                                    </p:set>
-                                  </p:childTnLst>
-                                </p:cTn>
-                              </p:par>
-                            </p:childTnLst>
-                          </p:cTn>
-                        </p:par>
-                      </p:childTnLst>
-                    </p:cTn>
-                  </p:par>
-                  <p:par>
-                    <p:cTn id="7" fill="hold">
-                      <p:stCondLst>
-                        <p:cond delay="indefinite"/>
-                      </p:stCondLst>
-                      <p:childTnLst>
-                        <p:par>
-                          <p:cTn id="8" fill="hold">
-                            <p:stCondLst>
-                              <p:cond delay="0"/>
-                            </p:stCondLst>
-                            <p:childTnLst>
-                              <p:par>
-                                <p:cTn id="9" presetID="1" presetClass="entr" presetSubtype="0" fill="hold" grpId="0" nodeType="clickEffect">
-                                  <p:stCondLst>
-                                    <p:cond delay="0"/>
-                                  </p:stCondLst>
-                                  <p:childTnLst>
-                                    <p:set>
-                                      <p:cBhvr>
-                                        <p:cTn id="10" dur="1" fill="hold">
-                                          <p:stCondLst>
-                                            <p:cond delay="0"/>
-                                          </p:stCondLst>
-                                        </p:cTn>
-                                        <p:tgtEl>
-                                          <p:spTgt spid="5">
-                                            <p:txEl>
-                                              <p:pRg st="1" end="1"/>
-                                            </p:txEl>
-                                          </p:spTgt>
-                                        </p:tgtEl>
-                                        <p:attrNameLst>
-                                          <p:attrName>style.visibility</p:attrName>
-                                        </p:attrNameLst>
-                                      </p:cBhvr>
-                                      <p:to>
-                                        <p:strVal val="visible"/>
-                                      </p:to>
-                                    </p:set>
-                                  </p:childTnLst>
-                                </p:cTn>
-                              </p:par>
-                            </p:childTnLst>
-                          </p:cTn>
-                        </p:par>
-                      </p:childTnLst>
-                    </p:cTn>
-                  </p:par>
-                  <p:par>
-                    <p:cTn id="11" fill="hold">
-                      <p:stCondLst>
-                        <p:cond delay="indefinite"/>
-                      </p:stCondLst>
-                      <p:childTnLst>
-                        <p:par>
-                          <p:cTn id="12" fill="hold">
-                            <p:stCondLst>
-                              <p:cond delay="0"/>
-                            </p:stCondLst>
-                            <p:childTnLst>
-                              <p:par>
-                                <p:cTn id="13" presetID="1" presetClass="entr" presetSubtype="0" fill="hold" grpId="0" nodeType="clickEffect">
-                                  <p:stCondLst>
-                                    <p:cond delay="0"/>
-                                  </p:stCondLst>
-                                  <p:childTnLst>
-                                    <p:set>
-                                      <p:cBhvr>
-                                        <p:cTn id="14" dur="1" fill="hold">
-                                          <p:stCondLst>
-                                            <p:cond delay="0"/>
-                                          </p:stCondLst>
-                                        </p:cTn>
-                                        <p:tgtEl>
-                                          <p:spTgt spid="5">
-                                            <p:txEl>
-                                              <p:pRg st="2" end="2"/>
-                                            </p:txEl>
-                                          </p:spTgt>
-                                        </p:tgtEl>
-                                        <p:attrNameLst>
-                                          <p:attrName>style.visibility</p:attrName>
-                                        </p:attrNameLst>
-                                      </p:cBhvr>
-                                      <p:to>
-                                        <p:strVal val="visible"/>
-                                      </p:to>
-                                    </p:set>
-                                  </p:childTnLst>
-                                </p:cTn>
-                              </p:par>
-                            </p:childTnLst>
-                          </p:cTn>
-                        </p:par>
-                      </p:childTnLst>
-                    </p:cTn>
-                  </p:par>
-                  <p:par>
-                    <p:cTn id="15" fill="hold">
-                      <p:stCondLst>
-                        <p:cond delay="indefinite"/>
-                      </p:stCondLst>
-                      <p:childTnLst>
-                        <p:par>
-                          <p:cTn id="16" fill="hold">
-                            <p:stCondLst>
-                              <p:cond delay="0"/>
-                            </p:stCondLst>
-                            <p:childTnLst>
-                              <p:par>
-                                <p:cTn id="17" presetID="1" presetClass="entr" presetSubtype="0" fill="hold" grpId="0" nodeType="clickEffect">
-                                  <p:stCondLst>
-                                    <p:cond delay="0"/>
-                                  </p:stCondLst>
-                                  <p:childTnLst>
-                                    <p:set>
-                                      <p:cBhvr>
-                                        <p:cTn id="18" dur="1" fill="hold">
-                                          <p:stCondLst>
-                                            <p:cond delay="0"/>
-                                          </p:stCondLst>
-                                        </p:cTn>
-                                        <p:tgtEl>
-                                          <p:spTgt spid="5">
-                                            <p:txEl>
-                                              <p:pRg st="3" end="3"/>
-                                            </p:txEl>
-                                          </p:spTgt>
-                                        </p:tgtEl>
-                                        <p:attrNameLst>
-                                          <p:attrName>style.visibility</p:attrName>
-                                        </p:attrNameLst>
-                                      </p:cBhvr>
-                                      <p:to>
-                                        <p:strVal val="visible"/>
-                                      </p:to>
-                                    </p:set>
-                                  </p:childTnLst>
-                                </p:cTn>
-                              </p:par>
-                            </p:childTnLst>
-                          </p:cTn>
-                        </p:par>
-                      </p:childTnLst>
-                    </p:cTn>
-                  </p:par>
-                  <p:par>
-                    <p:cTn id="19" fill="hold">
-                      <p:stCondLst>
-                        <p:cond delay="indefinite"/>
-                      </p:stCondLst>
-                      <p:childTnLst>
-                        <p:par>
-                          <p:cTn id="20" fill="hold">
-                            <p:stCondLst>
-                              <p:cond delay="0"/>
-                            </p:stCondLst>
-                            <p:childTnLst>
-                              <p:par>
-                                <p:cTn id="21" presetID="1" presetClass="entr" presetSubtype="0" fill="hold" grpId="0" nodeType="clickEffect">
-                                  <p:stCondLst>
-                                    <p:cond delay="0"/>
-                                  </p:stCondLst>
-                                  <p:childTnLst>
-                                    <p:set>
-                                      <p:cBhvr>
-                                        <p:cTn id="22" dur="1" fill="hold">
-                                          <p:stCondLst>
-                                            <p:cond delay="0"/>
-                                          </p:stCondLst>
-                                        </p:cTn>
-                                        <p:tgtEl>
-                                          <p:spTgt spid="5">
-                                            <p:txEl>
-                                              <p:pRg st="4" end="4"/>
-                                            </p:txEl>
-                                          </p:spTgt>
-                                        </p:tgtEl>
-                                        <p:attrNameLst>
-                                          <p:attrName>style.visibility</p:attrName>
-                                        </p:attrNameLst>
-                                      </p:cBhvr>
-                                      <p:to>
-                                        <p:strVal val="visible"/>
-                                      </p:to>
-                                    </p:set>
-                                  </p:childTnLst>
-                                </p:cTn>
-                              </p:par>
-                            </p:childTnLst>
-                          </p:cTn>
-                        </p:par>
-                      </p:childTnLst>
-                    </p:cTn>
-                  </p:par>
-                  <p:par>
-                    <p:cTn id="23" fill="hold">
-                      <p:stCondLst>
-                        <p:cond delay="indefinite"/>
-                      </p:stCondLst>
-                      <p:childTnLst>
-                        <p:par>
-                          <p:cTn id="24" fill="hold">
-                            <p:stCondLst>
-                              <p:cond delay="0"/>
-                            </p:stCondLst>
-                            <p:childTnLst>
-                              <p:par>
-                                <p:cTn id="25" presetID="1" presetClass="entr" presetSubtype="0" fill="hold" grpId="0" nodeType="clickEffect">
-                                  <p:stCondLst>
-                                    <p:cond delay="0"/>
-                                  </p:stCondLst>
-                                  <p:childTnLst>
-                                    <p:set>
-                                      <p:cBhvr>
-                                        <p:cTn id="26" dur="1" fill="hold">
-                                          <p:stCondLst>
-                                            <p:cond delay="0"/>
-                                          </p:stCondLst>
-                                        </p:cTn>
-                                        <p:tgtEl>
-                                          <p:spTgt spid="5">
-                                            <p:txEl>
-                                              <p:pRg st="5" end="5"/>
-                                            </p:txEl>
-                                          </p:spTgt>
-                                        </p:tgtEl>
-                                        <p:attrNameLst>
-                                          <p:attrName>style.visibility</p:attrName>
-                                        </p:attrNameLst>
-                                      </p:cBhvr>
-                                      <p:to>
-                                        <p:strVal val="visible"/>
-                                      </p:to>
-                                    </p:set>
-                                  </p:childTnLst>
-                                </p:cTn>
-                              </p:par>
-                              <p:par>
-                                <p:cTn id="27" presetID="1" presetClass="entr" presetSubtype="0" fill="hold" grpId="0" nodeType="withEffect">
-                                  <p:stCondLst>
-                                    <p:cond delay="0"/>
-                                  </p:stCondLst>
-                                  <p:childTnLst>
-                                    <p:set>
-                                      <p:cBhvr>
-                                        <p:cTn id="28" dur="1" fill="hold">
-                                          <p:stCondLst>
-                                            <p:cond delay="0"/>
-                                          </p:stCondLst>
-                                        </p:cTn>
-                                        <p:tgtEl>
-                                          <p:spTgt spid="3">
-                                            <p:txEl>
-                                              <p:pRg st="0" end="0"/>
-                                            </p:txEl>
-                                          </p:spTgt>
-                                        </p:tgtEl>
-                                        <p:attrNameLst>
-                                          <p:attrName>style.visibility</p:attrName>
-                                        </p:attrNameLst>
-                                      </p:cBhvr>
-                                      <p:to>
-                                        <p:strVal val="visible"/>
-                                      </p:to>
-                                    </p:set>
-                                  </p:childTnLst>
-                                </p:cTn>
-                              </p:par>
-                            </p:childTnLst>
-                          </p:cTn>
-                        </p:par>
-                      </p:childTnLst>
-                    </p:cTn>
-                  </p:par>
-                </p:childTnLst>
-              </p:cTn>
-              <p:prevCondLst>
-                <p:cond evt="onPrev" delay="0">
-                  <p:tgtEl>
-                    <p:sldTgt/>
-                  </p:tgtEl>
-                </p:cond>
-              </p:prevCondLst>
-              <p:nextCondLst>
-                <p:cond evt="onNext" delay="0">
-                  <p:tgtEl>
-                    <p:sldTgt/>
-                  </p:tgtEl>
-                </p:cond>
-              </p:nextCondLst>
-            </p:seq>
-          </p:childTnLst>
-        </p:cTn>
-      </p:par>
-    </p:tnLst>
-    <p:bldLst>
-      <p:bldP spid="3" grpId="0" build="p"/>
-      <p:bldP spid="5" grpId="0" uiExpand="1" build="p"/>
-    </p:bldLst>
-  </p:timing>
-</p:sld>
-</file>
-
-<file path=ppt/slides/slide9.xml><?xml version="1.0" encoding="utf-8"?>
-<p:sld xmlns:a="http://schemas.openxmlformats.org/drawingml/2006/main" xmlns:r="http://schemas.openxmlformats.org/officeDocument/2006/relationships" xmlns:p="http://schemas.openxmlformats.org/presentationml/2006/main">
-  <p:cSld>
-    <p:spTree>
-      <p:nvGrpSpPr>
-        <p:cNvPr id="1" name=""/>
-        <p:cNvGrpSpPr/>
-        <p:nvPr/>
-      </p:nvGrpSpPr>
-      <p:grpSpPr>
-        <a:xfrm>
-          <a:off x="0" y="0"/>
-          <a:ext cx="0" cy="0"/>
-          <a:chOff x="0" y="0"/>
-          <a:chExt cx="0" cy="0"/>
-        </a:xfrm>
-      </p:grpSpPr>
-      <p:sp>
-        <p:nvSpPr>
-          <p:cNvPr id="2" name="Tijdelijke aanduiding voor tekst 1"/>
-          <p:cNvSpPr>
-            <a:spLocks noGrp="1"/>
-          </p:cNvSpPr>
-          <p:nvPr>
-            <p:ph type="body" sz="quarter" idx="14"/>
-          </p:nvPr>
-        </p:nvSpPr>
-        <p:spPr/>
-        <p:txBody>
-          <a:bodyPr/>
-          <a:lstStyle/>
-          <a:p>
-            <a:r>
-              <a:rPr lang="en-GB" dirty="0"/>
-              <a:t>Thanks for your attention!</a:t>
-            </a:r>
-          </a:p>
-        </p:txBody>
-      </p:sp>
-    </p:spTree>
-    <p:extLst>
-      <p:ext uri="{BB962C8B-B14F-4D97-AF65-F5344CB8AC3E}">
-        <p14:creationId xmlns:p14="http://schemas.microsoft.com/office/powerpoint/2010/main" val="4114078862"/>
-      </p:ext>
-    </p:extLst>
-  </p:cSld>
-  <p:clrMapOvr>
-    <a:masterClrMapping/>
-  </p:clrMapOvr>
 </p:sld>
 </file>
 

</xml_diff>

<commit_message>
Added OVERTURE notes to PPM slide
</commit_message>
<xml_diff>
--- a/protocol/Invisible-Flicker_aka_MEG-AHAT_project_PPM.pptx
+++ b/protocol/Invisible-Flicker_aka_MEG-AHAT_project_PPM.pptx
@@ -225,7 +225,7 @@
           <a:p>
             <a:fld id="{24EB8EBF-EE54-5F4A-9A96-36AE8BE19C24}" type="datetimeFigureOut">
               <a:rPr lang="en-US" smtClean="0"/>
-              <a:t>12/6/2023</a:t>
+              <a:t>12/7/23</a:t>
             </a:fld>
             <a:endParaRPr lang="en-US"/>
           </a:p>
@@ -678,6 +678,499 @@
     <p:extLst>
       <p:ext uri="{BB962C8B-B14F-4D97-AF65-F5344CB8AC3E}">
         <p14:creationId xmlns:p14="http://schemas.microsoft.com/office/powerpoint/2010/main" val="2227283541"/>
+      </p:ext>
+    </p:extLst>
+  </p:cSld>
+  <p:clrMapOvr>
+    <a:masterClrMapping/>
+  </p:clrMapOvr>
+</p:notes>
+</file>
+
+<file path=ppt/notesSlides/notesSlide11.xml><?xml version="1.0" encoding="utf-8"?>
+<p:notes xmlns:a="http://schemas.openxmlformats.org/drawingml/2006/main" xmlns:r="http://schemas.openxmlformats.org/officeDocument/2006/relationships" xmlns:p="http://schemas.openxmlformats.org/presentationml/2006/main">
+  <p:cSld>
+    <p:spTree>
+      <p:nvGrpSpPr>
+        <p:cNvPr id="1" name=""/>
+        <p:cNvGrpSpPr/>
+        <p:nvPr/>
+      </p:nvGrpSpPr>
+      <p:grpSpPr>
+        <a:xfrm>
+          <a:off x="0" y="0"/>
+          <a:ext cx="0" cy="0"/>
+          <a:chOff x="0" y="0"/>
+          <a:chExt cx="0" cy="0"/>
+        </a:xfrm>
+      </p:grpSpPr>
+      <p:sp>
+        <p:nvSpPr>
+          <p:cNvPr id="2" name="Slide Image Placeholder 1"/>
+          <p:cNvSpPr>
+            <a:spLocks noGrp="1" noRot="1" noChangeAspect="1"/>
+          </p:cNvSpPr>
+          <p:nvPr>
+            <p:ph type="sldImg"/>
+          </p:nvPr>
+        </p:nvSpPr>
+        <p:spPr/>
+      </p:sp>
+      <p:sp>
+        <p:nvSpPr>
+          <p:cNvPr id="3" name="Notes Placeholder 2"/>
+          <p:cNvSpPr>
+            <a:spLocks noGrp="1"/>
+          </p:cNvSpPr>
+          <p:nvPr>
+            <p:ph type="body" idx="1"/>
+          </p:nvPr>
+        </p:nvSpPr>
+        <p:spPr/>
+        <p:txBody>
+          <a:bodyPr/>
+          <a:lstStyle/>
+          <a:p>
+            <a:pPr rtl="0">
+              <a:spcBef>
+                <a:spcPts val="0"/>
+              </a:spcBef>
+              <a:spcAft>
+                <a:spcPts val="0"/>
+              </a:spcAft>
+            </a:pPr>
+            <a:r>
+              <a:rPr lang="en-GB" sz="1800" b="1" i="0" u="none" strike="noStrike" dirty="0">
+                <a:solidFill>
+                  <a:srgbClr val="FFFFFF"/>
+                </a:solidFill>
+                <a:effectLst/>
+                <a:latin typeface="Montserrat" pitchFamily="2" charset="77"/>
+              </a:rPr>
+              <a:t>RCT </a:t>
+            </a:r>
+            <a:r>
+              <a:rPr lang="en-GB" sz="1800" b="0" i="0" u="none" strike="noStrike" dirty="0">
+                <a:solidFill>
+                  <a:srgbClr val="FFFFFF"/>
+                </a:solidFill>
+                <a:effectLst/>
+                <a:latin typeface="Montserrat" pitchFamily="2" charset="77"/>
+              </a:rPr>
+              <a:t>(</a:t>
+            </a:r>
+            <a:r>
+              <a:rPr lang="en-GB" sz="1800" b="1" i="0" u="none" strike="noStrike" dirty="0">
+                <a:solidFill>
+                  <a:srgbClr val="FFFFFF"/>
+                </a:solidFill>
+                <a:effectLst/>
+                <a:latin typeface="Montserrat" pitchFamily="2" charset="77"/>
+              </a:rPr>
+              <a:t>R</a:t>
+            </a:r>
+            <a:r>
+              <a:rPr lang="en-GB" sz="1800" b="0" i="0" u="none" strike="noStrike" dirty="0">
+                <a:solidFill>
+                  <a:srgbClr val="FFFFFF"/>
+                </a:solidFill>
+                <a:effectLst/>
+                <a:latin typeface="Montserrat" pitchFamily="2" charset="77"/>
+              </a:rPr>
+              <a:t>andomized </a:t>
+            </a:r>
+            <a:r>
+              <a:rPr lang="en-GB" sz="1800" b="1" i="0" u="none" strike="noStrike" dirty="0">
+                <a:solidFill>
+                  <a:srgbClr val="FFFFFF"/>
+                </a:solidFill>
+                <a:effectLst/>
+                <a:latin typeface="Montserrat" pitchFamily="2" charset="77"/>
+              </a:rPr>
+              <a:t>C</a:t>
+            </a:r>
+            <a:r>
+              <a:rPr lang="en-GB" sz="1800" b="0" i="0" u="none" strike="noStrike" dirty="0">
+                <a:solidFill>
+                  <a:srgbClr val="FFFFFF"/>
+                </a:solidFill>
+                <a:effectLst/>
+                <a:latin typeface="Montserrat" pitchFamily="2" charset="77"/>
+              </a:rPr>
+              <a:t>linical </a:t>
+            </a:r>
+            <a:r>
+              <a:rPr lang="en-GB" sz="1800" b="1" i="0" u="none" strike="noStrike" dirty="0">
+                <a:solidFill>
+                  <a:srgbClr val="FFFFFF"/>
+                </a:solidFill>
+                <a:effectLst/>
+                <a:latin typeface="Montserrat" pitchFamily="2" charset="77"/>
+              </a:rPr>
+              <a:t>T</a:t>
+            </a:r>
+            <a:r>
+              <a:rPr lang="en-GB" sz="1800" b="0" i="0" u="none" strike="noStrike" dirty="0">
+                <a:solidFill>
+                  <a:srgbClr val="FFFFFF"/>
+                </a:solidFill>
+                <a:effectLst/>
+                <a:latin typeface="Montserrat" pitchFamily="2" charset="77"/>
+              </a:rPr>
+              <a:t>rial)</a:t>
+            </a:r>
+            <a:endParaRPr lang="en-GB" b="0" dirty="0">
+              <a:effectLst/>
+            </a:endParaRPr>
+          </a:p>
+          <a:p>
+            <a:pPr rtl="0" fontAlgn="base">
+              <a:spcBef>
+                <a:spcPts val="0"/>
+              </a:spcBef>
+              <a:spcAft>
+                <a:spcPts val="0"/>
+              </a:spcAft>
+              <a:buFont typeface="Arial" panose="020B0604020202020204" pitchFamily="34" charset="0"/>
+              <a:buChar char="•"/>
+            </a:pPr>
+            <a:r>
+              <a:rPr lang="en-GB" sz="1800" b="0" i="0" u="none" strike="noStrike" dirty="0">
+                <a:solidFill>
+                  <a:srgbClr val="FFFFFF"/>
+                </a:solidFill>
+                <a:effectLst/>
+                <a:latin typeface="Montserrat" pitchFamily="2" charset="77"/>
+              </a:rPr>
+              <a:t>78% slowing in functional decline (ADCS-ADL)</a:t>
+            </a:r>
+          </a:p>
+          <a:p>
+            <a:pPr rtl="0" fontAlgn="base">
+              <a:spcBef>
+                <a:spcPts val="0"/>
+              </a:spcBef>
+              <a:spcAft>
+                <a:spcPts val="0"/>
+              </a:spcAft>
+              <a:buFont typeface="Arial" panose="020B0604020202020204" pitchFamily="34" charset="0"/>
+              <a:buChar char="•"/>
+            </a:pPr>
+            <a:r>
+              <a:rPr lang="en-GB" sz="1800" b="0" i="0" u="none" strike="noStrike" dirty="0">
+                <a:solidFill>
+                  <a:srgbClr val="FFFFFF"/>
+                </a:solidFill>
+                <a:effectLst/>
+                <a:latin typeface="Montserrat" pitchFamily="2" charset="77"/>
+              </a:rPr>
+              <a:t>83 % reduction in cognitive decline (MMSE)</a:t>
+            </a:r>
+          </a:p>
+          <a:p>
+            <a:pPr rtl="0" fontAlgn="base">
+              <a:spcBef>
+                <a:spcPts val="0"/>
+              </a:spcBef>
+              <a:spcAft>
+                <a:spcPts val="0"/>
+              </a:spcAft>
+              <a:buFont typeface="Arial" panose="020B0604020202020204" pitchFamily="34" charset="0"/>
+              <a:buChar char="•"/>
+            </a:pPr>
+            <a:r>
+              <a:rPr lang="en-GB" sz="1800" b="0" i="0" u="none" strike="noStrike" dirty="0">
+                <a:solidFill>
+                  <a:srgbClr val="FFFFFF"/>
+                </a:solidFill>
+                <a:effectLst/>
+                <a:latin typeface="Montserrat" pitchFamily="2" charset="77"/>
+              </a:rPr>
+              <a:t>72 % reduction in brain atrophy</a:t>
+            </a:r>
+          </a:p>
+          <a:p>
+            <a:pPr rtl="0" fontAlgn="base">
+              <a:spcBef>
+                <a:spcPts val="0"/>
+              </a:spcBef>
+              <a:spcAft>
+                <a:spcPts val="0"/>
+              </a:spcAft>
+              <a:buFont typeface="Arial" panose="020B0604020202020204" pitchFamily="34" charset="0"/>
+              <a:buChar char="•"/>
+            </a:pPr>
+            <a:r>
+              <a:rPr lang="en-GB" sz="1800" b="0" i="0" u="none" strike="noStrike" dirty="0">
+                <a:solidFill>
+                  <a:srgbClr val="FFFFFF"/>
+                </a:solidFill>
+                <a:effectLst/>
+                <a:latin typeface="Montserrat" pitchFamily="2" charset="77"/>
+              </a:rPr>
+              <a:t>No unexpected SAE</a:t>
+            </a:r>
+          </a:p>
+          <a:p>
+            <a:pPr rtl="0">
+              <a:spcBef>
+                <a:spcPts val="0"/>
+              </a:spcBef>
+              <a:spcAft>
+                <a:spcPts val="0"/>
+              </a:spcAft>
+            </a:pPr>
+            <a:endParaRPr lang="en-GB" dirty="0"/>
+          </a:p>
+          <a:p>
+            <a:pPr rtl="0">
+              <a:spcBef>
+                <a:spcPts val="0"/>
+              </a:spcBef>
+              <a:spcAft>
+                <a:spcPts val="0"/>
+              </a:spcAft>
+            </a:pPr>
+            <a:r>
+              <a:rPr lang="en-GB" sz="1800" b="1" i="0" u="none" strike="noStrike" dirty="0">
+                <a:solidFill>
+                  <a:srgbClr val="FFFFFF"/>
+                </a:solidFill>
+                <a:effectLst/>
+                <a:latin typeface="Montserrat" pitchFamily="2" charset="77"/>
+              </a:rPr>
+              <a:t>OLE </a:t>
+            </a:r>
+            <a:r>
+              <a:rPr lang="en-GB" sz="1800" b="0" i="0" u="none" strike="noStrike" dirty="0">
+                <a:solidFill>
+                  <a:srgbClr val="FFFFFF"/>
+                </a:solidFill>
+                <a:effectLst/>
+                <a:latin typeface="Montserrat" pitchFamily="2" charset="77"/>
+              </a:rPr>
+              <a:t>(</a:t>
+            </a:r>
+            <a:r>
+              <a:rPr lang="en-GB" sz="1800" b="1" i="0" u="none" strike="noStrike" dirty="0">
+                <a:solidFill>
+                  <a:srgbClr val="FFFFFF"/>
+                </a:solidFill>
+                <a:effectLst/>
+                <a:latin typeface="Montserrat" pitchFamily="2" charset="77"/>
+              </a:rPr>
+              <a:t>O</a:t>
+            </a:r>
+            <a:r>
+              <a:rPr lang="en-GB" sz="1800" b="0" i="0" u="none" strike="noStrike" dirty="0">
+                <a:solidFill>
+                  <a:srgbClr val="FFFFFF"/>
+                </a:solidFill>
+                <a:effectLst/>
+                <a:latin typeface="Montserrat" pitchFamily="2" charset="77"/>
+              </a:rPr>
+              <a:t>pen </a:t>
+            </a:r>
+            <a:r>
+              <a:rPr lang="en-GB" sz="1800" b="1" i="0" u="none" strike="noStrike" dirty="0">
+                <a:solidFill>
+                  <a:srgbClr val="FFFFFF"/>
+                </a:solidFill>
+                <a:effectLst/>
+                <a:latin typeface="Montserrat" pitchFamily="2" charset="77"/>
+              </a:rPr>
+              <a:t>L</a:t>
+            </a:r>
+            <a:r>
+              <a:rPr lang="en-GB" sz="1800" b="0" i="0" u="none" strike="noStrike" dirty="0">
+                <a:solidFill>
+                  <a:srgbClr val="FFFFFF"/>
+                </a:solidFill>
+                <a:effectLst/>
+                <a:latin typeface="Montserrat" pitchFamily="2" charset="77"/>
+              </a:rPr>
+              <a:t>abel </a:t>
+            </a:r>
+            <a:r>
+              <a:rPr lang="en-GB" sz="1800" b="1" i="0" u="none" strike="noStrike" dirty="0">
+                <a:solidFill>
+                  <a:srgbClr val="FFFFFF"/>
+                </a:solidFill>
+                <a:effectLst/>
+                <a:latin typeface="Montserrat" pitchFamily="2" charset="77"/>
+              </a:rPr>
+              <a:t>E</a:t>
+            </a:r>
+            <a:r>
+              <a:rPr lang="en-GB" sz="1800" b="0" i="0" u="none" strike="noStrike" dirty="0">
+                <a:solidFill>
+                  <a:srgbClr val="FFFFFF"/>
+                </a:solidFill>
+                <a:effectLst/>
+                <a:latin typeface="Montserrat" pitchFamily="2" charset="77"/>
+              </a:rPr>
+              <a:t>xtension Study)</a:t>
+            </a:r>
+            <a:endParaRPr lang="en-GB" b="0" dirty="0">
+              <a:effectLst/>
+            </a:endParaRPr>
+          </a:p>
+          <a:p>
+            <a:pPr rtl="0" fontAlgn="base">
+              <a:spcBef>
+                <a:spcPts val="0"/>
+              </a:spcBef>
+              <a:spcAft>
+                <a:spcPts val="0"/>
+              </a:spcAft>
+              <a:buFont typeface="Arial" panose="020B0604020202020204" pitchFamily="34" charset="0"/>
+              <a:buChar char="•"/>
+            </a:pPr>
+            <a:r>
+              <a:rPr lang="en-GB" sz="1800" b="0" i="0" u="none" strike="noStrike" dirty="0">
+                <a:solidFill>
+                  <a:srgbClr val="FFFFFF"/>
+                </a:solidFill>
+                <a:effectLst/>
+                <a:latin typeface="Montserrat" pitchFamily="2" charset="77"/>
+              </a:rPr>
+              <a:t>44/53 continued to OLE with active treatment (22 completed all assessments)</a:t>
+            </a:r>
+          </a:p>
+          <a:p>
+            <a:pPr rtl="0" fontAlgn="base">
+              <a:spcBef>
+                <a:spcPts val="0"/>
+              </a:spcBef>
+              <a:spcAft>
+                <a:spcPts val="0"/>
+              </a:spcAft>
+              <a:buFont typeface="Arial" panose="020B0604020202020204" pitchFamily="34" charset="0"/>
+              <a:buChar char="•"/>
+            </a:pPr>
+            <a:r>
+              <a:rPr lang="en-GB" sz="1800" b="0" i="0" u="none" strike="noStrike" dirty="0">
+                <a:solidFill>
+                  <a:srgbClr val="FFFFFF"/>
+                </a:solidFill>
+                <a:effectLst/>
+                <a:latin typeface="Montserrat" pitchFamily="2" charset="77"/>
+              </a:rPr>
+              <a:t>80 % adherence</a:t>
+            </a:r>
+          </a:p>
+          <a:p>
+            <a:pPr rtl="0" fontAlgn="base">
+              <a:spcBef>
+                <a:spcPts val="0"/>
+              </a:spcBef>
+              <a:spcAft>
+                <a:spcPts val="0"/>
+              </a:spcAft>
+              <a:buFont typeface="Arial" panose="020B0604020202020204" pitchFamily="34" charset="0"/>
+              <a:buChar char="•"/>
+            </a:pPr>
+            <a:r>
+              <a:rPr lang="en-GB" sz="1800" b="0" i="0" u="none" strike="noStrike" dirty="0">
+                <a:solidFill>
+                  <a:srgbClr val="FFFFFF"/>
+                </a:solidFill>
+                <a:effectLst/>
+                <a:latin typeface="Montserrat" pitchFamily="2" charset="77"/>
+              </a:rPr>
+              <a:t>“no treatment limiting SAEs or reported ARIA”</a:t>
+            </a:r>
+          </a:p>
+          <a:p>
+            <a:pPr rtl="0" fontAlgn="base">
+              <a:spcBef>
+                <a:spcPts val="0"/>
+              </a:spcBef>
+              <a:spcAft>
+                <a:spcPts val="0"/>
+              </a:spcAft>
+              <a:buFont typeface="Arial" panose="020B0604020202020204" pitchFamily="34" charset="0"/>
+              <a:buChar char="•"/>
+            </a:pPr>
+            <a:r>
+              <a:rPr lang="en-GB" sz="1800" b="0" i="0" u="none" strike="noStrike" dirty="0">
+                <a:solidFill>
+                  <a:srgbClr val="FFFFFF"/>
+                </a:solidFill>
+                <a:effectLst/>
+                <a:latin typeface="Montserrat" pitchFamily="2" charset="77"/>
+              </a:rPr>
+              <a:t>Comparable estimated ADCS-ADL and WBV 18-month slopes between early and delayed start groups</a:t>
+            </a:r>
+          </a:p>
+          <a:p>
+            <a:pPr rtl="0" fontAlgn="base">
+              <a:spcBef>
+                <a:spcPts val="0"/>
+              </a:spcBef>
+              <a:spcAft>
+                <a:spcPts val="0"/>
+              </a:spcAft>
+              <a:buFont typeface="Arial" panose="020B0604020202020204" pitchFamily="34" charset="0"/>
+              <a:buChar char="•"/>
+            </a:pPr>
+            <a:r>
+              <a:rPr lang="en-GB" sz="1800" b="0" i="0" u="none" strike="noStrike" dirty="0">
+                <a:solidFill>
+                  <a:srgbClr val="FFFFFF"/>
+                </a:solidFill>
+                <a:effectLst/>
+                <a:latin typeface="Montserrat" pitchFamily="2" charset="77"/>
+              </a:rPr>
+              <a:t>“Longer time to &gt; 15% decline in ADCS-ADL total score vs. sham (mean days 422.27 versus 150.96 </a:t>
+            </a:r>
+            <a:r>
+              <a:rPr lang="en-GB" sz="1800" b="0" i="0" u="none" strike="noStrike">
+                <a:solidFill>
+                  <a:srgbClr val="FFFFFF"/>
+                </a:solidFill>
+                <a:effectLst/>
+                <a:latin typeface="Montserrat" pitchFamily="2" charset="77"/>
+              </a:rPr>
+              <a:t>respectively)”</a:t>
+            </a:r>
+            <a:endParaRPr lang="en-GB" sz="1800" b="0" i="0" u="none" strike="noStrike" dirty="0">
+              <a:solidFill>
+                <a:srgbClr val="FFFFFF"/>
+              </a:solidFill>
+              <a:effectLst/>
+              <a:latin typeface="Montserrat" pitchFamily="2" charset="77"/>
+            </a:endParaRPr>
+          </a:p>
+        </p:txBody>
+      </p:sp>
+      <p:sp>
+        <p:nvSpPr>
+          <p:cNvPr id="4" name="Slide Number Placeholder 3"/>
+          <p:cNvSpPr>
+            <a:spLocks noGrp="1"/>
+          </p:cNvSpPr>
+          <p:nvPr>
+            <p:ph type="sldNum" sz="quarter" idx="5"/>
+          </p:nvPr>
+        </p:nvSpPr>
+        <p:spPr/>
+        <p:txBody>
+          <a:bodyPr/>
+          <a:lstStyle/>
+          <a:p>
+            <a:fld id="{9CD75E1A-2839-6842-B4F8-60F935C0618A}" type="slidenum">
+              <a:rPr lang="en-US" smtClean="0"/>
+              <a:t>11</a:t>
+            </a:fld>
+            <a:endParaRPr lang="en-US"/>
+          </a:p>
+        </p:txBody>
+      </p:sp>
+    </p:spTree>
+    <p:extLst>
+      <p:ext uri="{BB962C8B-B14F-4D97-AF65-F5344CB8AC3E}">
+        <p14:creationId xmlns:p14="http://schemas.microsoft.com/office/powerpoint/2010/main" val="3323784523"/>
       </p:ext>
     </p:extLst>
   </p:cSld>

</xml_diff>